<commit_message>
Added question to slide 24
</commit_message>
<xml_diff>
--- a/slides/10_logistic_regression.pptx
+++ b/slides/10_logistic_regression.pptx
@@ -285,7 +285,7 @@
           <a:p>
             <a:fld id="{DB92F479-4B50-F243-9713-1B12EC2B4BDB}" type="datetimeFigureOut">
               <a:rPr lang="en-US" smtClean="0"/>
-              <a:t>11/3/2014</a:t>
+              <a:t>11/4/2014</a:t>
             </a:fld>
             <a:endParaRPr lang="en-US"/>
           </a:p>
@@ -2386,8 +2386,54 @@
                 <a:latin typeface="ArialMT"/>
                 <a:sym typeface="Wingdings"/>
               </a:rPr>
-              <a:t>Complement: 1 – p</a:t>
-            </a:r>
+              <a:t>Q: What is the range of probability?</a:t>
+            </a:r>
+          </a:p>
+          <a:p>
+            <a:pPr marL="0" marR="0" indent="0" algn="l" defTabSz="457200" rtl="0" eaLnBrk="1" fontAlgn="auto" latinLnBrk="0" hangingPunct="1">
+              <a:lnSpc>
+                <a:spcPct val="100000"/>
+              </a:lnSpc>
+              <a:spcBef>
+                <a:spcPts val="0"/>
+              </a:spcBef>
+              <a:spcAft>
+                <a:spcPts val="0"/>
+              </a:spcAft>
+              <a:buClrTx/>
+              <a:buSzTx/>
+              <a:buFontTx/>
+              <a:buNone/>
+              <a:tabLst/>
+              <a:defRPr/>
+            </a:pPr>
+            <a:r>
+              <a:rPr lang="en-US" sz="1200" baseline="0" dirty="0" smtClean="0">
+                <a:solidFill>
+                  <a:prstClr val="black"/>
+                </a:solidFill>
+                <a:latin typeface="ArialMT"/>
+                <a:sym typeface="Wingdings"/>
+              </a:rPr>
+              <a:t>Q: What is the range of the odds </a:t>
+            </a:r>
+            <a:r>
+              <a:rPr lang="en-US" sz="1200" baseline="0" smtClean="0">
+                <a:solidFill>
+                  <a:prstClr val="black"/>
+                </a:solidFill>
+                <a:latin typeface="ArialMT"/>
+                <a:sym typeface="Wingdings"/>
+              </a:rPr>
+              <a:t>ratio?</a:t>
+            </a:r>
+            <a:endParaRPr lang="en-US" sz="1200" baseline="0" dirty="0" smtClean="0">
+              <a:solidFill>
+                <a:prstClr val="black"/>
+              </a:solidFill>
+              <a:latin typeface="ArialMT"/>
+              <a:sym typeface="Wingdings"/>
+            </a:endParaRPr>
           </a:p>
         </p:txBody>
       </p:sp>
@@ -19178,7 +19224,7 @@
           <a:graphicData uri="http://schemas.openxmlformats.org/presentationml/2006/ole">
             <mc:AlternateContent xmlns:mc="http://schemas.openxmlformats.org/markup-compatibility/2006">
               <mc:Choice xmlns:v="urn:schemas-microsoft-com:vml" Requires="v">
-                <p:oleObj spid="_x0000_s10358" name="Equation" r:id="rId4" imgW="1726920" imgH="419040" progId="Equation.3">
+                <p:oleObj spid="_x0000_s10360" name="Equation" r:id="rId4" imgW="1726920" imgH="419040" progId="Equation.3">
                   <p:embed/>
                 </p:oleObj>
               </mc:Choice>
@@ -19261,7 +19307,7 @@
           <a:graphicData uri="http://schemas.openxmlformats.org/presentationml/2006/ole">
             <mc:AlternateContent xmlns:mc="http://schemas.openxmlformats.org/markup-compatibility/2006">
               <mc:Choice xmlns:v="urn:schemas-microsoft-com:vml" Requires="v">
-                <p:oleObj spid="_x0000_s10359" name="Equation" r:id="rId6" imgW="787320" imgH="228600" progId="Equation.3">
+                <p:oleObj spid="_x0000_s10361" name="Equation" r:id="rId6" imgW="787320" imgH="228600" progId="Equation.3">
                   <p:embed/>
                 </p:oleObj>
               </mc:Choice>
@@ -19516,7 +19562,7 @@
           <a:graphicData uri="http://schemas.openxmlformats.org/presentationml/2006/ole">
             <mc:AlternateContent xmlns:mc="http://schemas.openxmlformats.org/markup-compatibility/2006">
               <mc:Choice xmlns:v="urn:schemas-microsoft-com:vml" Requires="v">
-                <p:oleObj spid="_x0000_s14449" name="Equation" r:id="rId4" imgW="1726920" imgH="419040" progId="Equation.3">
+                <p:oleObj spid="_x0000_s14451" name="Equation" r:id="rId4" imgW="1726920" imgH="419040" progId="Equation.3">
                   <p:embed/>
                 </p:oleObj>
               </mc:Choice>
@@ -19599,7 +19645,7 @@
           <a:graphicData uri="http://schemas.openxmlformats.org/presentationml/2006/ole">
             <mc:AlternateContent xmlns:mc="http://schemas.openxmlformats.org/markup-compatibility/2006">
               <mc:Choice xmlns:v="urn:schemas-microsoft-com:vml" Requires="v">
-                <p:oleObj spid="_x0000_s14450" name="Equation" r:id="rId6" imgW="787320" imgH="228600" progId="Equation.3">
+                <p:oleObj spid="_x0000_s14452" name="Equation" r:id="rId6" imgW="787320" imgH="228600" progId="Equation.3">
                   <p:embed/>
                 </p:oleObj>
               </mc:Choice>
@@ -19906,7 +19952,7 @@
           <a:graphicData uri="http://schemas.openxmlformats.org/presentationml/2006/ole">
             <mc:AlternateContent xmlns:mc="http://schemas.openxmlformats.org/markup-compatibility/2006">
               <mc:Choice xmlns:v="urn:schemas-microsoft-com:vml" Requires="v">
-                <p:oleObj spid="_x0000_s18490" name="Equation" r:id="rId4" imgW="876240" imgH="419040" progId="Equation.3">
+                <p:oleObj spid="_x0000_s18491" name="Equation" r:id="rId4" imgW="876240" imgH="419040" progId="Equation.3">
                   <p:embed/>
                 </p:oleObj>
               </mc:Choice>
@@ -20167,7 +20213,7 @@
           <a:graphicData uri="http://schemas.openxmlformats.org/presentationml/2006/ole">
             <mc:AlternateContent xmlns:mc="http://schemas.openxmlformats.org/markup-compatibility/2006">
               <mc:Choice xmlns:v="urn:schemas-microsoft-com:vml" Requires="v">
-                <p:oleObj spid="_x0000_s19514" name="Equation" r:id="rId4" imgW="876240" imgH="419040" progId="Equation.3">
+                <p:oleObj spid="_x0000_s19515" name="Equation" r:id="rId4" imgW="876240" imgH="419040" progId="Equation.3">
                   <p:embed/>
                 </p:oleObj>
               </mc:Choice>
@@ -20383,7 +20429,7 @@
           <a:graphicData uri="http://schemas.openxmlformats.org/presentationml/2006/ole">
             <mc:AlternateContent xmlns:mc="http://schemas.openxmlformats.org/markup-compatibility/2006">
               <mc:Choice xmlns:v="urn:schemas-microsoft-com:vml" Requires="v">
-                <p:oleObj spid="_x0000_s11380" name="Equation" r:id="rId4" imgW="876240" imgH="419040" progId="Equation.3">
+                <p:oleObj spid="_x0000_s11381" name="Equation" r:id="rId4" imgW="876240" imgH="419040" progId="Equation.3">
                   <p:embed/>
                 </p:oleObj>
               </mc:Choice>
@@ -20681,7 +20727,7 @@
           <a:graphicData uri="http://schemas.openxmlformats.org/presentationml/2006/ole">
             <mc:AlternateContent xmlns:mc="http://schemas.openxmlformats.org/markup-compatibility/2006">
               <mc:Choice xmlns:v="urn:schemas-microsoft-com:vml" Requires="v">
-                <p:oleObj spid="_x0000_s15473" name="Equation" r:id="rId5" imgW="876240" imgH="419040" progId="Equation.3">
+                <p:oleObj spid="_x0000_s15474" name="Equation" r:id="rId5" imgW="876240" imgH="419040" progId="Equation.3">
                   <p:embed/>
                 </p:oleObj>
               </mc:Choice>
@@ -21427,7 +21473,7 @@
               </a14:hiddenLine>
             </a:ext>
             <a:ext uri="{FAA26D3D-D897-4be2-8F04-BA451C77F1D7}">
-              <ma14:placeholderFlag xmlns="" xmlns:ma14="http://schemas.microsoft.com/office/mac/drawingml/2011/main" val="1"/>
+              <ma14:placeholderFlag xmlns:ma14="http://schemas.microsoft.com/office/mac/drawingml/2011/main" xmlns="" val="1"/>
             </a:ext>
           </a:extLst>
         </p:spPr>
@@ -22241,7 +22287,7 @@
           <a:graphicData uri="http://schemas.openxmlformats.org/presentationml/2006/ole">
             <mc:AlternateContent xmlns:mc="http://schemas.openxmlformats.org/markup-compatibility/2006">
               <mc:Choice xmlns:v="urn:schemas-microsoft-com:vml" Requires="v">
-                <p:oleObj spid="_x0000_s31802" name="Equation" r:id="rId4" imgW="825480" imgH="393480" progId="Equation.3">
+                <p:oleObj spid="_x0000_s31803" name="Equation" r:id="rId4" imgW="825480" imgH="393480" progId="Equation.3">
                   <p:embed/>
                 </p:oleObj>
               </mc:Choice>
@@ -22506,7 +22552,7 @@
           <a:graphicData uri="http://schemas.openxmlformats.org/presentationml/2006/ole">
             <mc:AlternateContent xmlns:mc="http://schemas.openxmlformats.org/markup-compatibility/2006">
               <mc:Choice xmlns:v="urn:schemas-microsoft-com:vml" Requires="v">
-                <p:oleObj spid="_x0000_s49186" name="Equation" r:id="rId4" imgW="825480" imgH="393480" progId="Equation.3">
+                <p:oleObj spid="_x0000_s49187" name="Equation" r:id="rId4" imgW="825480" imgH="393480" progId="Equation.3">
                   <p:embed/>
                 </p:oleObj>
               </mc:Choice>
@@ -22702,7 +22748,7 @@
                   <a:cs typeface="ＭＳ Ｐゴシック" charset="0"/>
                   <a:sym typeface="PFDinTextCompPro-Bold" charset="0"/>
                 </a:rPr>
-                <a:t>NOTE</a:t>
+                <a:t>QUESTION</a:t>
               </a:r>
               <a:endParaRPr lang="en-US" sz="1800" dirty="0">
                 <a:solidFill>
@@ -22761,6 +22807,18 @@
             <a:lstStyle/>
             <a:p>
               <a:pPr algn="l"/>
+              <a:endParaRPr lang="en-US" sz="1400" dirty="0" smtClean="0">
+                <a:solidFill>
+                  <a:schemeClr val="tx1"/>
+                </a:solidFill>
+                <a:latin typeface="+mn-lt"/>
+                <a:ea typeface="ＭＳ Ｐゴシック" charset="0"/>
+                <a:cs typeface="PFDinTextCompPro-Italic"/>
+                <a:sym typeface="News706 BT" charset="0"/>
+              </a:endParaRPr>
+            </a:p>
+            <a:p>
+              <a:pPr algn="l"/>
               <a:r>
                 <a:rPr lang="en-US" sz="1400" dirty="0" smtClean="0">
                   <a:solidFill>
@@ -22771,8 +22829,29 @@
                   <a:cs typeface="PFDinTextCompPro-Italic"/>
                   <a:sym typeface="News706 BT" charset="0"/>
                 </a:rPr>
-                <a:t>Using the terms: “odds” and “odds ratio” interchangeably</a:t>
+                <a:t>What is th</a:t>
               </a:r>
+              <a:r>
+                <a:rPr lang="en-US" sz="1400" dirty="0" smtClean="0">
+                  <a:solidFill>
+                    <a:schemeClr val="tx1"/>
+                  </a:solidFill>
+                  <a:latin typeface="+mn-lt"/>
+                  <a:ea typeface="ＭＳ Ｐゴシック" charset="0"/>
+                  <a:cs typeface="PFDinTextCompPro-Italic"/>
+                  <a:sym typeface="News706 BT" charset="0"/>
+                </a:rPr>
+                <a:t>e range of the odds? </a:t>
+              </a:r>
+              <a:endParaRPr lang="en-US" sz="1400" dirty="0" smtClean="0">
+                <a:solidFill>
+                  <a:schemeClr val="tx1"/>
+                </a:solidFill>
+                <a:latin typeface="+mn-lt"/>
+                <a:ea typeface="ＭＳ Ｐゴシック" charset="0"/>
+                <a:cs typeface="PFDinTextCompPro-Italic"/>
+                <a:sym typeface="News706 BT" charset="0"/>
+              </a:endParaRPr>
             </a:p>
           </p:txBody>
         </p:sp>
@@ -23137,7 +23216,7 @@
           <a:graphicData uri="http://schemas.openxmlformats.org/presentationml/2006/ole">
             <mc:AlternateContent xmlns:mc="http://schemas.openxmlformats.org/markup-compatibility/2006">
               <mc:Choice xmlns:v="urn:schemas-microsoft-com:vml" Requires="v">
-                <p:oleObj spid="_x0000_s30780" name="Equation" r:id="rId4" imgW="825480" imgH="393480" progId="Equation.3">
+                <p:oleObj spid="_x0000_s30781" name="Equation" r:id="rId4" imgW="825480" imgH="393480" progId="Equation.3">
                   <p:embed/>
                 </p:oleObj>
               </mc:Choice>
@@ -23321,7 +23400,7 @@
           <a:graphicData uri="http://schemas.openxmlformats.org/presentationml/2006/ole">
             <mc:AlternateContent xmlns:mc="http://schemas.openxmlformats.org/markup-compatibility/2006">
               <mc:Choice xmlns:v="urn:schemas-microsoft-com:vml" Requires="v">
-                <p:oleObj spid="_x0000_s28737" name="Equation" r:id="rId4" imgW="1587240" imgH="393480" progId="Equation.3">
+                <p:oleObj spid="_x0000_s28738" name="Equation" r:id="rId4" imgW="1587240" imgH="393480" progId="Equation.3">
                   <p:embed/>
                 </p:oleObj>
               </mc:Choice>
@@ -23593,21 +23672,7 @@
                 <a:latin typeface="PFDinTextCompPro-Italic"/>
                 <a:cs typeface="PFDinTextCompPro-Italic"/>
               </a:rPr>
-              <a:t>trying to determine whether a customer will convert or not. The customer conversion rate is </a:t>
-            </a:r>
-            <a:r>
-              <a:rPr lang="en-US" sz="3000" dirty="0" smtClean="0">
-                <a:latin typeface="PFDinTextCompPro-Italic"/>
-                <a:cs typeface="PFDinTextCompPro-Italic"/>
-              </a:rPr>
-              <a:t>33.33%. </a:t>
-            </a:r>
-            <a:r>
-              <a:rPr lang="en-US" sz="3000" dirty="0" smtClean="0">
-                <a:latin typeface="PFDinTextCompPro-Italic"/>
-                <a:cs typeface="PFDinTextCompPro-Italic"/>
-              </a:rPr>
-              <a:t>what are the odds that a customer will convert? </a:t>
+              <a:t>trying to determine whether a customer will convert or not. The customer conversion rate is 33.33%. what are the odds that a customer will convert? </a:t>
             </a:r>
           </a:p>
           <a:p>
@@ -23859,7 +23924,7 @@
           <a:graphicData uri="http://schemas.openxmlformats.org/presentationml/2006/ole">
             <mc:AlternateContent xmlns:mc="http://schemas.openxmlformats.org/markup-compatibility/2006">
               <mc:Choice xmlns:v="urn:schemas-microsoft-com:vml" Requires="v">
-                <p:oleObj spid="_x0000_s39995" name="Equation" r:id="rId5" imgW="1587240" imgH="393480" progId="Equation.3">
+                <p:oleObj spid="_x0000_s39996" name="Equation" r:id="rId5" imgW="1587240" imgH="393480" progId="Equation.3">
                   <p:embed/>
                 </p:oleObj>
               </mc:Choice>
@@ -24110,7 +24175,7 @@
           <a:graphicData uri="http://schemas.openxmlformats.org/presentationml/2006/ole">
             <mc:AlternateContent xmlns:mc="http://schemas.openxmlformats.org/markup-compatibility/2006">
               <mc:Choice xmlns:v="urn:schemas-microsoft-com:vml" Requires="v">
-                <p:oleObj spid="_x0000_s41012" name="Equation" r:id="rId4" imgW="1815840" imgH="457200" progId="Equation.3">
+                <p:oleObj spid="_x0000_s41013" name="Equation" r:id="rId4" imgW="1815840" imgH="457200" progId="Equation.3">
                   <p:embed/>
                 </p:oleObj>
               </mc:Choice>
@@ -24472,7 +24537,7 @@
           <a:graphicData uri="http://schemas.openxmlformats.org/presentationml/2006/ole">
             <mc:AlternateContent xmlns:mc="http://schemas.openxmlformats.org/markup-compatibility/2006">
               <mc:Choice xmlns:v="urn:schemas-microsoft-com:vml" Requires="v">
-                <p:oleObj spid="_x0000_s35948" name="Equation" r:id="rId4" imgW="1815840" imgH="457200" progId="Equation.3">
+                <p:oleObj spid="_x0000_s35950" name="Equation" r:id="rId4" imgW="1815840" imgH="457200" progId="Equation.3">
                   <p:embed/>
                 </p:oleObj>
               </mc:Choice>
@@ -24555,7 +24620,7 @@
           <a:graphicData uri="http://schemas.openxmlformats.org/presentationml/2006/ole">
             <mc:AlternateContent xmlns:mc="http://schemas.openxmlformats.org/markup-compatibility/2006">
               <mc:Choice xmlns:v="urn:schemas-microsoft-com:vml" Requires="v">
-                <p:oleObj spid="_x0000_s35949" name="Equation" r:id="rId6" imgW="2603160" imgH="457200" progId="Equation.3">
+                <p:oleObj spid="_x0000_s35951" name="Equation" r:id="rId6" imgW="2603160" imgH="457200" progId="Equation.3">
                   <p:embed/>
                 </p:oleObj>
               </mc:Choice>
@@ -24800,7 +24865,7 @@
           <a:graphicData uri="http://schemas.openxmlformats.org/presentationml/2006/ole">
             <mc:AlternateContent xmlns:mc="http://schemas.openxmlformats.org/markup-compatibility/2006">
               <mc:Choice xmlns:v="urn:schemas-microsoft-com:vml" Requires="v">
-                <p:oleObj spid="_x0000_s34874" name="Equation" r:id="rId4" imgW="2120760" imgH="393480" progId="Equation.3">
+                <p:oleObj spid="_x0000_s34875" name="Equation" r:id="rId4" imgW="2120760" imgH="393480" progId="Equation.3">
                   <p:embed/>
                 </p:oleObj>
               </mc:Choice>
@@ -25076,7 +25141,7 @@
           <a:graphicData uri="http://schemas.openxmlformats.org/presentationml/2006/ole">
             <mc:AlternateContent xmlns:mc="http://schemas.openxmlformats.org/markup-compatibility/2006">
               <mc:Choice xmlns:v="urn:schemas-microsoft-com:vml" Requires="v">
-                <p:oleObj spid="_x0000_s37948" name="Equation" r:id="rId4" imgW="2120760" imgH="393480" progId="Equation.3">
+                <p:oleObj spid="_x0000_s37949" name="Equation" r:id="rId4" imgW="2120760" imgH="393480" progId="Equation.3">
                   <p:embed/>
                 </p:oleObj>
               </mc:Choice>
@@ -25760,40 +25825,22 @@
                 <a:latin typeface="PFDinTextCompPro-Italic"/>
                 <a:cs typeface="PFDinTextCompPro-Italic"/>
               </a:rPr>
-              <a:t>This means that        </a:t>
+              <a:t>This means that        gives us the change in the </a:t>
+            </a:r>
+            <a:r>
+              <a:rPr lang="en-US" sz="3000" b="1" dirty="0" smtClean="0">
+                <a:latin typeface="PFDinTextCompPro-Italic"/>
+                <a:cs typeface="PFDinTextCompPro-Italic"/>
+              </a:rPr>
+              <a:t>odds</a:t>
             </a:r>
             <a:r>
               <a:rPr lang="en-US" sz="3000" dirty="0" smtClean="0">
                 <a:latin typeface="PFDinTextCompPro-Italic"/>
                 <a:cs typeface="PFDinTextCompPro-Italic"/>
               </a:rPr>
-              <a:t>gives us the change in the </a:t>
-            </a:r>
-            <a:r>
-              <a:rPr lang="en-US" sz="3000" b="1" dirty="0" smtClean="0">
-                <a:latin typeface="PFDinTextCompPro-Italic"/>
-                <a:cs typeface="PFDinTextCompPro-Italic"/>
-              </a:rPr>
-              <a:t>odds</a:t>
-            </a:r>
-            <a:r>
-              <a:rPr lang="en-US" sz="3000" dirty="0" smtClean="0">
-                <a:latin typeface="PFDinTextCompPro-Italic"/>
-                <a:cs typeface="PFDinTextCompPro-Italic"/>
-              </a:rPr>
-              <a:t> for a unit change in x</a:t>
-            </a:r>
-            <a:r>
-              <a:rPr lang="en-US" sz="3000" dirty="0" smtClean="0">
-                <a:latin typeface="PFDinTextCompPro-Italic"/>
-                <a:cs typeface="PFDinTextCompPro-Italic"/>
-              </a:rPr>
-              <a:t>. </a:t>
-            </a:r>
-            <a:endParaRPr lang="en-US" sz="3000" dirty="0" smtClean="0">
-              <a:latin typeface="PFDinTextCompPro-Italic"/>
-              <a:cs typeface="PFDinTextCompPro-Italic"/>
-            </a:endParaRPr>
+              <a:t> for a unit change in x. </a:t>
+            </a:r>
           </a:p>
         </p:txBody>
       </p:sp>
@@ -25819,7 +25866,7 @@
           <a:graphicData uri="http://schemas.openxmlformats.org/presentationml/2006/ole">
             <mc:AlternateContent xmlns:mc="http://schemas.openxmlformats.org/markup-compatibility/2006">
               <mc:Choice xmlns:v="urn:schemas-microsoft-com:vml" Requires="v">
-                <p:oleObj spid="_x0000_s44076" name="Equation" r:id="rId4" imgW="215640" imgH="203040" progId="Equation.3">
+                <p:oleObj spid="_x0000_s44077" name="Equation" r:id="rId4" imgW="215640" imgH="203040" progId="Equation.3">
                   <p:embed/>
                 </p:oleObj>
               </mc:Choice>
@@ -27276,7 +27323,7 @@
           <a:graphicData uri="http://schemas.openxmlformats.org/presentationml/2006/ole">
             <mc:AlternateContent xmlns:mc="http://schemas.openxmlformats.org/markup-compatibility/2006">
               <mc:Choice xmlns:v="urn:schemas-microsoft-com:vml" Requires="v">
-                <p:oleObj spid="_x0000_s47144" name="Equation" r:id="rId4" imgW="2425680" imgH="393480" progId="Equation.3">
+                <p:oleObj spid="_x0000_s47145" name="Equation" r:id="rId4" imgW="2425680" imgH="393480" progId="Equation.3">
                   <p:embed/>
                 </p:oleObj>
               </mc:Choice>
@@ -27578,7 +27625,7 @@
           <a:graphicData uri="http://schemas.openxmlformats.org/presentationml/2006/ole">
             <mc:AlternateContent xmlns:mc="http://schemas.openxmlformats.org/markup-compatibility/2006">
               <mc:Choice xmlns:v="urn:schemas-microsoft-com:vml" Requires="v">
-                <p:oleObj spid="_x0000_s48204" name="Equation" r:id="rId4" imgW="2425680" imgH="393480" progId="Equation.3">
+                <p:oleObj spid="_x0000_s48206" name="Equation" r:id="rId4" imgW="2425680" imgH="393480" progId="Equation.3">
                   <p:embed/>
                 </p:oleObj>
               </mc:Choice>
@@ -27661,7 +27708,7 @@
           <a:graphicData uri="http://schemas.openxmlformats.org/presentationml/2006/ole">
             <mc:AlternateContent xmlns:mc="http://schemas.openxmlformats.org/markup-compatibility/2006">
               <mc:Choice xmlns:v="urn:schemas-microsoft-com:vml" Requires="v">
-                <p:oleObj spid="_x0000_s48205" name="Equation" r:id="rId6" imgW="1523880" imgH="444240" progId="Equation.3">
+                <p:oleObj spid="_x0000_s48207" name="Equation" r:id="rId6" imgW="1523880" imgH="444240" progId="Equation.3">
                   <p:embed/>
                 </p:oleObj>
               </mc:Choice>
@@ -28380,14 +28427,19 @@
                 <a:latin typeface="PFDinTextCompPro-Italic"/>
                 <a:cs typeface="PFDinTextCompPro-Italic"/>
               </a:rPr>
-              <a:t>Create </a:t>
-            </a:r>
+              <a:t>Create a histogram of all variables</a:t>
+            </a:r>
+          </a:p>
+          <a:p>
+            <a:pPr marL="514350" indent="-514350" algn="l">
+              <a:buAutoNum type="arabicParenR"/>
+            </a:pPr>
             <a:r>
               <a:rPr lang="en-US" sz="2400" dirty="0" smtClean="0">
                 <a:latin typeface="PFDinTextCompPro-Italic"/>
                 <a:cs typeface="PFDinTextCompPro-Italic"/>
               </a:rPr>
-              <a:t>a histogram of all variables</a:t>
+              <a:t>Create a scatter plot of the income vs. balance</a:t>
             </a:r>
           </a:p>
           <a:p>
@@ -28399,31 +28451,8 @@
                 <a:latin typeface="PFDinTextCompPro-Italic"/>
                 <a:cs typeface="PFDinTextCompPro-Italic"/>
               </a:rPr>
-              <a:t>Create a scatter plot of the income vs. balance</a:t>
-            </a:r>
-          </a:p>
-          <a:p>
-            <a:pPr marL="514350" indent="-514350" algn="l">
-              <a:buAutoNum type="arabicParenR"/>
-            </a:pPr>
-            <a:r>
-              <a:rPr lang="en-US" sz="2400" dirty="0" smtClean="0">
-                <a:latin typeface="PFDinTextCompPro-Italic"/>
-                <a:cs typeface="PFDinTextCompPro-Italic"/>
-              </a:rPr>
-              <a:t>Mark defaults with a different color </a:t>
-            </a:r>
-            <a:r>
-              <a:rPr lang="en-US" sz="2400" dirty="0" smtClean="0">
-                <a:latin typeface="PFDinTextCompPro-Italic"/>
-                <a:cs typeface="PFDinTextCompPro-Italic"/>
-              </a:rPr>
-              <a:t>(and symbol)</a:t>
-            </a:r>
-            <a:endParaRPr lang="en-US" sz="2400" dirty="0" smtClean="0">
-              <a:latin typeface="PFDinTextCompPro-Italic"/>
-              <a:cs typeface="PFDinTextCompPro-Italic"/>
-            </a:endParaRPr>
+              <a:t>Mark defaults with a different color (and symbol)</a:t>
+            </a:r>
           </a:p>
           <a:p>
             <a:pPr marL="514350" indent="-514350" algn="l">
@@ -28579,14 +28608,7 @@
                 <a:latin typeface="PFDinTextCompPro-Italic"/>
                 <a:cs typeface="PFDinTextCompPro-Italic"/>
               </a:rPr>
-              <a:t>Run a logistic regression </a:t>
-            </a:r>
-            <a:r>
-              <a:rPr lang="en-US" sz="2400" dirty="0" smtClean="0">
-                <a:latin typeface="PFDinTextCompPro-Italic"/>
-                <a:cs typeface="PFDinTextCompPro-Italic"/>
-              </a:rPr>
-              <a:t>on the balance variable </a:t>
+              <a:t>Run a logistic regression on the balance variable </a:t>
             </a:r>
           </a:p>
           <a:p>
@@ -28726,10 +28748,6 @@
               </a:rPr>
               <a:t>Create predictions using the test set</a:t>
             </a:r>
-            <a:endParaRPr lang="en-US" sz="2400" dirty="0" smtClean="0">
-              <a:latin typeface="PFDinTextCompPro-Italic"/>
-              <a:cs typeface="PFDinTextCompPro-Italic"/>
-            </a:endParaRPr>
           </a:p>
           <a:p>
             <a:pPr marL="514350" indent="-514350" algn="l">
@@ -28743,10 +28761,6 @@
               </a:rPr>
               <a:t>Compute the overall accuracy, the sensitivity and specificity</a:t>
             </a:r>
-            <a:endParaRPr lang="en-US" sz="2400" dirty="0" smtClean="0">
-              <a:latin typeface="PFDinTextCompPro-Italic"/>
-              <a:cs typeface="PFDinTextCompPro-Italic"/>
-            </a:endParaRPr>
           </a:p>
         </p:txBody>
       </p:sp>
@@ -30038,7 +30052,7 @@
           <a:graphicData uri="http://schemas.openxmlformats.org/presentationml/2006/ole">
             <mc:AlternateContent xmlns:mc="http://schemas.openxmlformats.org/markup-compatibility/2006">
               <mc:Choice xmlns:v="urn:schemas-microsoft-com:vml" Requires="v">
-                <p:oleObj spid="_x0000_s43140" name="Equation" r:id="rId4" imgW="634680" imgH="419040" progId="Equation.3">
+                <p:oleObj spid="_x0000_s43143" name="Equation" r:id="rId4" imgW="634680" imgH="419040" progId="Equation.3">
                   <p:embed/>
                 </p:oleObj>
               </mc:Choice>
@@ -30121,7 +30135,7 @@
           <a:graphicData uri="http://schemas.openxmlformats.org/presentationml/2006/ole">
             <mc:AlternateContent xmlns:mc="http://schemas.openxmlformats.org/markup-compatibility/2006">
               <mc:Choice xmlns:v="urn:schemas-microsoft-com:vml" Requires="v">
-                <p:oleObj spid="_x0000_s43141" name="Equation" r:id="rId6" imgW="685800" imgH="393480" progId="Equation.3">
+                <p:oleObj spid="_x0000_s43144" name="Equation" r:id="rId6" imgW="685800" imgH="393480" progId="Equation.3">
                   <p:embed/>
                 </p:oleObj>
               </mc:Choice>
@@ -30204,7 +30218,7 @@
           <a:graphicData uri="http://schemas.openxmlformats.org/presentationml/2006/ole">
             <mc:AlternateContent xmlns:mc="http://schemas.openxmlformats.org/markup-compatibility/2006">
               <mc:Choice xmlns:v="urn:schemas-microsoft-com:vml" Requires="v">
-                <p:oleObj spid="_x0000_s43142" name="Equation" r:id="rId8" imgW="444240" imgH="393480" progId="Equation.3">
+                <p:oleObj spid="_x0000_s43145" name="Equation" r:id="rId8" imgW="444240" imgH="393480" progId="Equation.3">
                   <p:embed/>
                 </p:oleObj>
               </mc:Choice>

</xml_diff>

<commit_message>
Updated formula on slide 30
</commit_message>
<xml_diff>
--- a/slides/10_logistic_regression.pptx
+++ b/slides/10_logistic_regression.pptx
@@ -2415,17 +2415,7 @@
                 <a:latin typeface="ArialMT"/>
                 <a:sym typeface="Wingdings"/>
               </a:rPr>
-              <a:t>Q: What is the range of the odds </a:t>
-            </a:r>
-            <a:r>
-              <a:rPr lang="en-US" sz="1200" baseline="0" smtClean="0">
-                <a:solidFill>
-                  <a:prstClr val="black"/>
-                </a:solidFill>
-                <a:latin typeface="ArialMT"/>
-                <a:sym typeface="Wingdings"/>
-              </a:rPr>
-              <a:t>ratio?</a:t>
+              <a:t>Q: What is the range of the odds ratio?</a:t>
             </a:r>
             <a:endParaRPr lang="en-US" sz="1200" baseline="0" dirty="0" smtClean="0">
               <a:solidFill>
@@ -19224,7 +19214,7 @@
           <a:graphicData uri="http://schemas.openxmlformats.org/presentationml/2006/ole">
             <mc:AlternateContent xmlns:mc="http://schemas.openxmlformats.org/markup-compatibility/2006">
               <mc:Choice xmlns:v="urn:schemas-microsoft-com:vml" Requires="v">
-                <p:oleObj spid="_x0000_s10360" name="Equation" r:id="rId4" imgW="1726920" imgH="419040" progId="Equation.3">
+                <p:oleObj spid="_x0000_s10362" name="Equation" r:id="rId4" imgW="1726920" imgH="419040" progId="Equation.3">
                   <p:embed/>
                 </p:oleObj>
               </mc:Choice>
@@ -19307,7 +19297,7 @@
           <a:graphicData uri="http://schemas.openxmlformats.org/presentationml/2006/ole">
             <mc:AlternateContent xmlns:mc="http://schemas.openxmlformats.org/markup-compatibility/2006">
               <mc:Choice xmlns:v="urn:schemas-microsoft-com:vml" Requires="v">
-                <p:oleObj spid="_x0000_s10361" name="Equation" r:id="rId6" imgW="787320" imgH="228600" progId="Equation.3">
+                <p:oleObj spid="_x0000_s10363" name="Equation" r:id="rId6" imgW="787320" imgH="228600" progId="Equation.3">
                   <p:embed/>
                 </p:oleObj>
               </mc:Choice>
@@ -19562,7 +19552,7 @@
           <a:graphicData uri="http://schemas.openxmlformats.org/presentationml/2006/ole">
             <mc:AlternateContent xmlns:mc="http://schemas.openxmlformats.org/markup-compatibility/2006">
               <mc:Choice xmlns:v="urn:schemas-microsoft-com:vml" Requires="v">
-                <p:oleObj spid="_x0000_s14451" name="Equation" r:id="rId4" imgW="1726920" imgH="419040" progId="Equation.3">
+                <p:oleObj spid="_x0000_s14453" name="Equation" r:id="rId4" imgW="1726920" imgH="419040" progId="Equation.3">
                   <p:embed/>
                 </p:oleObj>
               </mc:Choice>
@@ -19645,7 +19635,7 @@
           <a:graphicData uri="http://schemas.openxmlformats.org/presentationml/2006/ole">
             <mc:AlternateContent xmlns:mc="http://schemas.openxmlformats.org/markup-compatibility/2006">
               <mc:Choice xmlns:v="urn:schemas-microsoft-com:vml" Requires="v">
-                <p:oleObj spid="_x0000_s14452" name="Equation" r:id="rId6" imgW="787320" imgH="228600" progId="Equation.3">
+                <p:oleObj spid="_x0000_s14454" name="Equation" r:id="rId6" imgW="787320" imgH="228600" progId="Equation.3">
                   <p:embed/>
                 </p:oleObj>
               </mc:Choice>
@@ -19952,7 +19942,7 @@
           <a:graphicData uri="http://schemas.openxmlformats.org/presentationml/2006/ole">
             <mc:AlternateContent xmlns:mc="http://schemas.openxmlformats.org/markup-compatibility/2006">
               <mc:Choice xmlns:v="urn:schemas-microsoft-com:vml" Requires="v">
-                <p:oleObj spid="_x0000_s18491" name="Equation" r:id="rId4" imgW="876240" imgH="419040" progId="Equation.3">
+                <p:oleObj spid="_x0000_s18492" name="Equation" r:id="rId4" imgW="876240" imgH="419040" progId="Equation.3">
                   <p:embed/>
                 </p:oleObj>
               </mc:Choice>
@@ -20213,7 +20203,7 @@
           <a:graphicData uri="http://schemas.openxmlformats.org/presentationml/2006/ole">
             <mc:AlternateContent xmlns:mc="http://schemas.openxmlformats.org/markup-compatibility/2006">
               <mc:Choice xmlns:v="urn:schemas-microsoft-com:vml" Requires="v">
-                <p:oleObj spid="_x0000_s19515" name="Equation" r:id="rId4" imgW="876240" imgH="419040" progId="Equation.3">
+                <p:oleObj spid="_x0000_s19516" name="Equation" r:id="rId4" imgW="876240" imgH="419040" progId="Equation.3">
                   <p:embed/>
                 </p:oleObj>
               </mc:Choice>
@@ -20429,7 +20419,7 @@
           <a:graphicData uri="http://schemas.openxmlformats.org/presentationml/2006/ole">
             <mc:AlternateContent xmlns:mc="http://schemas.openxmlformats.org/markup-compatibility/2006">
               <mc:Choice xmlns:v="urn:schemas-microsoft-com:vml" Requires="v">
-                <p:oleObj spid="_x0000_s11381" name="Equation" r:id="rId4" imgW="876240" imgH="419040" progId="Equation.3">
+                <p:oleObj spid="_x0000_s11382" name="Equation" r:id="rId4" imgW="876240" imgH="419040" progId="Equation.3">
                   <p:embed/>
                 </p:oleObj>
               </mc:Choice>
@@ -20727,7 +20717,7 @@
           <a:graphicData uri="http://schemas.openxmlformats.org/presentationml/2006/ole">
             <mc:AlternateContent xmlns:mc="http://schemas.openxmlformats.org/markup-compatibility/2006">
               <mc:Choice xmlns:v="urn:schemas-microsoft-com:vml" Requires="v">
-                <p:oleObj spid="_x0000_s15474" name="Equation" r:id="rId5" imgW="876240" imgH="419040" progId="Equation.3">
+                <p:oleObj spid="_x0000_s15475" name="Equation" r:id="rId5" imgW="876240" imgH="419040" progId="Equation.3">
                   <p:embed/>
                 </p:oleObj>
               </mc:Choice>
@@ -22287,7 +22277,7 @@
           <a:graphicData uri="http://schemas.openxmlformats.org/presentationml/2006/ole">
             <mc:AlternateContent xmlns:mc="http://schemas.openxmlformats.org/markup-compatibility/2006">
               <mc:Choice xmlns:v="urn:schemas-microsoft-com:vml" Requires="v">
-                <p:oleObj spid="_x0000_s31803" name="Equation" r:id="rId4" imgW="825480" imgH="393480" progId="Equation.3">
+                <p:oleObj spid="_x0000_s31804" name="Equation" r:id="rId4" imgW="825480" imgH="393480" progId="Equation.3">
                   <p:embed/>
                 </p:oleObj>
               </mc:Choice>
@@ -22552,7 +22542,7 @@
           <a:graphicData uri="http://schemas.openxmlformats.org/presentationml/2006/ole">
             <mc:AlternateContent xmlns:mc="http://schemas.openxmlformats.org/markup-compatibility/2006">
               <mc:Choice xmlns:v="urn:schemas-microsoft-com:vml" Requires="v">
-                <p:oleObj spid="_x0000_s49187" name="Equation" r:id="rId4" imgW="825480" imgH="393480" progId="Equation.3">
+                <p:oleObj spid="_x0000_s49188" name="Equation" r:id="rId4" imgW="825480" imgH="393480" progId="Equation.3">
                   <p:embed/>
                 </p:oleObj>
               </mc:Choice>
@@ -23216,7 +23206,7 @@
           <a:graphicData uri="http://schemas.openxmlformats.org/presentationml/2006/ole">
             <mc:AlternateContent xmlns:mc="http://schemas.openxmlformats.org/markup-compatibility/2006">
               <mc:Choice xmlns:v="urn:schemas-microsoft-com:vml" Requires="v">
-                <p:oleObj spid="_x0000_s30781" name="Equation" r:id="rId4" imgW="825480" imgH="393480" progId="Equation.3">
+                <p:oleObj spid="_x0000_s30782" name="Equation" r:id="rId4" imgW="825480" imgH="393480" progId="Equation.3">
                   <p:embed/>
                 </p:oleObj>
               </mc:Choice>
@@ -23400,7 +23390,7 @@
           <a:graphicData uri="http://schemas.openxmlformats.org/presentationml/2006/ole">
             <mc:AlternateContent xmlns:mc="http://schemas.openxmlformats.org/markup-compatibility/2006">
               <mc:Choice xmlns:v="urn:schemas-microsoft-com:vml" Requires="v">
-                <p:oleObj spid="_x0000_s28738" name="Equation" r:id="rId4" imgW="1587240" imgH="393480" progId="Equation.3">
+                <p:oleObj spid="_x0000_s28739" name="Equation" r:id="rId4" imgW="1587240" imgH="393480" progId="Equation.3">
                   <p:embed/>
                 </p:oleObj>
               </mc:Choice>
@@ -23924,7 +23914,7 @@
           <a:graphicData uri="http://schemas.openxmlformats.org/presentationml/2006/ole">
             <mc:AlternateContent xmlns:mc="http://schemas.openxmlformats.org/markup-compatibility/2006">
               <mc:Choice xmlns:v="urn:schemas-microsoft-com:vml" Requires="v">
-                <p:oleObj spid="_x0000_s39996" name="Equation" r:id="rId5" imgW="1587240" imgH="393480" progId="Equation.3">
+                <p:oleObj spid="_x0000_s39997" name="Equation" r:id="rId5" imgW="1587240" imgH="393480" progId="Equation.3">
                   <p:embed/>
                 </p:oleObj>
               </mc:Choice>
@@ -24175,7 +24165,7 @@
           <a:graphicData uri="http://schemas.openxmlformats.org/presentationml/2006/ole">
             <mc:AlternateContent xmlns:mc="http://schemas.openxmlformats.org/markup-compatibility/2006">
               <mc:Choice xmlns:v="urn:schemas-microsoft-com:vml" Requires="v">
-                <p:oleObj spid="_x0000_s41013" name="Equation" r:id="rId4" imgW="1815840" imgH="457200" progId="Equation.3">
+                <p:oleObj spid="_x0000_s41014" name="Equation" r:id="rId4" imgW="1815840" imgH="457200" progId="Equation.3">
                   <p:embed/>
                 </p:oleObj>
               </mc:Choice>
@@ -24537,7 +24527,7 @@
           <a:graphicData uri="http://schemas.openxmlformats.org/presentationml/2006/ole">
             <mc:AlternateContent xmlns:mc="http://schemas.openxmlformats.org/markup-compatibility/2006">
               <mc:Choice xmlns:v="urn:schemas-microsoft-com:vml" Requires="v">
-                <p:oleObj spid="_x0000_s35950" name="Equation" r:id="rId4" imgW="1815840" imgH="457200" progId="Equation.3">
+                <p:oleObj spid="_x0000_s35952" name="Equation" r:id="rId4" imgW="1815840" imgH="457200" progId="Equation.3">
                   <p:embed/>
                 </p:oleObj>
               </mc:Choice>
@@ -24607,25 +24597,25 @@
           <p:nvPr>
             <p:extLst>
               <p:ext uri="{D42A27DB-BD31-4B8C-83A1-F6EECF244321}">
-                <p14:modId xmlns:p14="http://schemas.microsoft.com/office/powerpoint/2010/main" val="4189052441"/>
+                <p14:modId xmlns:p14="http://schemas.microsoft.com/office/powerpoint/2010/main" val="1057403389"/>
               </p:ext>
             </p:extLst>
           </p:nvPr>
         </p:nvGraphicFramePr>
         <p:xfrm>
-          <a:off x="1698625" y="3532188"/>
-          <a:ext cx="6216650" cy="1077912"/>
+          <a:off x="819150" y="3532188"/>
+          <a:ext cx="7975600" cy="1077912"/>
         </p:xfrm>
         <a:graphic>
           <a:graphicData uri="http://schemas.openxmlformats.org/presentationml/2006/ole">
             <mc:AlternateContent xmlns:mc="http://schemas.openxmlformats.org/markup-compatibility/2006">
               <mc:Choice xmlns:v="urn:schemas-microsoft-com:vml" Requires="v">
-                <p:oleObj spid="_x0000_s35951" name="Equation" r:id="rId6" imgW="2603160" imgH="457200" progId="Equation.3">
+                <p:oleObj spid="_x0000_s35953" name="Equation" r:id="rId6" imgW="3340080" imgH="457200" progId="Equation.3">
                   <p:embed/>
                 </p:oleObj>
               </mc:Choice>
               <mc:Fallback>
-                <p:oleObj name="Equation" r:id="rId6" imgW="2603160" imgH="457200" progId="Equation.3">
+                <p:oleObj name="Equation" r:id="rId6" imgW="3340080" imgH="457200" progId="Equation.3">
                   <p:embed/>
                   <p:pic>
                     <p:nvPicPr>
@@ -24644,8 +24634,8 @@
                     </p:blipFill>
                     <p:spPr bwMode="auto">
                       <a:xfrm>
-                        <a:off x="1698625" y="3532188"/>
-                        <a:ext cx="6216650" cy="1077912"/>
+                        <a:off x="819150" y="3532188"/>
+                        <a:ext cx="7975600" cy="1077912"/>
                       </a:xfrm>
                       <a:prstGeom prst="rect">
                         <a:avLst/>
@@ -24865,7 +24855,7 @@
           <a:graphicData uri="http://schemas.openxmlformats.org/presentationml/2006/ole">
             <mc:AlternateContent xmlns:mc="http://schemas.openxmlformats.org/markup-compatibility/2006">
               <mc:Choice xmlns:v="urn:schemas-microsoft-com:vml" Requires="v">
-                <p:oleObj spid="_x0000_s34875" name="Equation" r:id="rId4" imgW="2120760" imgH="393480" progId="Equation.3">
+                <p:oleObj spid="_x0000_s34876" name="Equation" r:id="rId4" imgW="2120760" imgH="393480" progId="Equation.3">
                   <p:embed/>
                 </p:oleObj>
               </mc:Choice>
@@ -25141,7 +25131,7 @@
           <a:graphicData uri="http://schemas.openxmlformats.org/presentationml/2006/ole">
             <mc:AlternateContent xmlns:mc="http://schemas.openxmlformats.org/markup-compatibility/2006">
               <mc:Choice xmlns:v="urn:schemas-microsoft-com:vml" Requires="v">
-                <p:oleObj spid="_x0000_s37949" name="Equation" r:id="rId4" imgW="2120760" imgH="393480" progId="Equation.3">
+                <p:oleObj spid="_x0000_s37950" name="Equation" r:id="rId4" imgW="2120760" imgH="393480" progId="Equation.3">
                   <p:embed/>
                 </p:oleObj>
               </mc:Choice>
@@ -25866,7 +25856,7 @@
           <a:graphicData uri="http://schemas.openxmlformats.org/presentationml/2006/ole">
             <mc:AlternateContent xmlns:mc="http://schemas.openxmlformats.org/markup-compatibility/2006">
               <mc:Choice xmlns:v="urn:schemas-microsoft-com:vml" Requires="v">
-                <p:oleObj spid="_x0000_s44077" name="Equation" r:id="rId4" imgW="215640" imgH="203040" progId="Equation.3">
+                <p:oleObj spid="_x0000_s44078" name="Equation" r:id="rId4" imgW="215640" imgH="203040" progId="Equation.3">
                   <p:embed/>
                 </p:oleObj>
               </mc:Choice>
@@ -27323,7 +27313,7 @@
           <a:graphicData uri="http://schemas.openxmlformats.org/presentationml/2006/ole">
             <mc:AlternateContent xmlns:mc="http://schemas.openxmlformats.org/markup-compatibility/2006">
               <mc:Choice xmlns:v="urn:schemas-microsoft-com:vml" Requires="v">
-                <p:oleObj spid="_x0000_s47145" name="Equation" r:id="rId4" imgW="2425680" imgH="393480" progId="Equation.3">
+                <p:oleObj spid="_x0000_s47146" name="Equation" r:id="rId4" imgW="2425680" imgH="393480" progId="Equation.3">
                   <p:embed/>
                 </p:oleObj>
               </mc:Choice>
@@ -27625,7 +27615,7 @@
           <a:graphicData uri="http://schemas.openxmlformats.org/presentationml/2006/ole">
             <mc:AlternateContent xmlns:mc="http://schemas.openxmlformats.org/markup-compatibility/2006">
               <mc:Choice xmlns:v="urn:schemas-microsoft-com:vml" Requires="v">
-                <p:oleObj spid="_x0000_s48206" name="Equation" r:id="rId4" imgW="2425680" imgH="393480" progId="Equation.3">
+                <p:oleObj spid="_x0000_s48208" name="Equation" r:id="rId4" imgW="2425680" imgH="393480" progId="Equation.3">
                   <p:embed/>
                 </p:oleObj>
               </mc:Choice>
@@ -27708,7 +27698,7 @@
           <a:graphicData uri="http://schemas.openxmlformats.org/presentationml/2006/ole">
             <mc:AlternateContent xmlns:mc="http://schemas.openxmlformats.org/markup-compatibility/2006">
               <mc:Choice xmlns:v="urn:schemas-microsoft-com:vml" Requires="v">
-                <p:oleObj spid="_x0000_s48207" name="Equation" r:id="rId6" imgW="1523880" imgH="444240" progId="Equation.3">
+                <p:oleObj spid="_x0000_s48209" name="Equation" r:id="rId6" imgW="1523880" imgH="444240" progId="Equation.3">
                   <p:embed/>
                 </p:oleObj>
               </mc:Choice>
@@ -30052,7 +30042,7 @@
           <a:graphicData uri="http://schemas.openxmlformats.org/presentationml/2006/ole">
             <mc:AlternateContent xmlns:mc="http://schemas.openxmlformats.org/markup-compatibility/2006">
               <mc:Choice xmlns:v="urn:schemas-microsoft-com:vml" Requires="v">
-                <p:oleObj spid="_x0000_s43143" name="Equation" r:id="rId4" imgW="634680" imgH="419040" progId="Equation.3">
+                <p:oleObj spid="_x0000_s43146" name="Equation" r:id="rId4" imgW="634680" imgH="419040" progId="Equation.3">
                   <p:embed/>
                 </p:oleObj>
               </mc:Choice>
@@ -30135,7 +30125,7 @@
           <a:graphicData uri="http://schemas.openxmlformats.org/presentationml/2006/ole">
             <mc:AlternateContent xmlns:mc="http://schemas.openxmlformats.org/markup-compatibility/2006">
               <mc:Choice xmlns:v="urn:schemas-microsoft-com:vml" Requires="v">
-                <p:oleObj spid="_x0000_s43144" name="Equation" r:id="rId6" imgW="685800" imgH="393480" progId="Equation.3">
+                <p:oleObj spid="_x0000_s43147" name="Equation" r:id="rId6" imgW="685800" imgH="393480" progId="Equation.3">
                   <p:embed/>
                 </p:oleObj>
               </mc:Choice>
@@ -30218,7 +30208,7 @@
           <a:graphicData uri="http://schemas.openxmlformats.org/presentationml/2006/ole">
             <mc:AlternateContent xmlns:mc="http://schemas.openxmlformats.org/markup-compatibility/2006">
               <mc:Choice xmlns:v="urn:schemas-microsoft-com:vml" Requires="v">
-                <p:oleObj spid="_x0000_s43145" name="Equation" r:id="rId8" imgW="444240" imgH="393480" progId="Equation.3">
+                <p:oleObj spid="_x0000_s43148" name="Equation" r:id="rId8" imgW="444240" imgH="393480" progId="Equation.3">
                   <p:embed/>
                 </p:oleObj>
               </mc:Choice>

</xml_diff>

<commit_message>
Added question to s32
</commit_message>
<xml_diff>
--- a/slides/10_logistic_regression.pptx
+++ b/slides/10_logistic_regression.pptx
@@ -7,7 +7,7 @@
     <p:sldMasterId id="2147484116" r:id="rId3"/>
   </p:sldMasterIdLst>
   <p:notesMasterIdLst>
-    <p:notesMasterId r:id="rId57"/>
+    <p:notesMasterId r:id="rId58"/>
   </p:notesMasterIdLst>
   <p:sldIdLst>
     <p:sldId id="258" r:id="rId4"/>
@@ -41,28 +41,29 @@
     <p:sldId id="784" r:id="rId32"/>
     <p:sldId id="777" r:id="rId33"/>
     <p:sldId id="778" r:id="rId34"/>
-    <p:sldId id="779" r:id="rId35"/>
-    <p:sldId id="741" r:id="rId36"/>
-    <p:sldId id="793" r:id="rId37"/>
-    <p:sldId id="794" r:id="rId38"/>
-    <p:sldId id="796" r:id="rId39"/>
-    <p:sldId id="800" r:id="rId40"/>
-    <p:sldId id="781" r:id="rId41"/>
-    <p:sldId id="802" r:id="rId42"/>
-    <p:sldId id="795" r:id="rId43"/>
-    <p:sldId id="798" r:id="rId44"/>
-    <p:sldId id="799" r:id="rId45"/>
-    <p:sldId id="797" r:id="rId46"/>
-    <p:sldId id="787" r:id="rId47"/>
-    <p:sldId id="803" r:id="rId48"/>
-    <p:sldId id="804" r:id="rId49"/>
-    <p:sldId id="724" r:id="rId50"/>
-    <p:sldId id="752" r:id="rId51"/>
-    <p:sldId id="785" r:id="rId52"/>
-    <p:sldId id="786" r:id="rId53"/>
-    <p:sldId id="790" r:id="rId54"/>
-    <p:sldId id="753" r:id="rId55"/>
-    <p:sldId id="805" r:id="rId56"/>
+    <p:sldId id="806" r:id="rId35"/>
+    <p:sldId id="779" r:id="rId36"/>
+    <p:sldId id="741" r:id="rId37"/>
+    <p:sldId id="793" r:id="rId38"/>
+    <p:sldId id="794" r:id="rId39"/>
+    <p:sldId id="796" r:id="rId40"/>
+    <p:sldId id="800" r:id="rId41"/>
+    <p:sldId id="781" r:id="rId42"/>
+    <p:sldId id="802" r:id="rId43"/>
+    <p:sldId id="795" r:id="rId44"/>
+    <p:sldId id="798" r:id="rId45"/>
+    <p:sldId id="799" r:id="rId46"/>
+    <p:sldId id="797" r:id="rId47"/>
+    <p:sldId id="787" r:id="rId48"/>
+    <p:sldId id="803" r:id="rId49"/>
+    <p:sldId id="804" r:id="rId50"/>
+    <p:sldId id="724" r:id="rId51"/>
+    <p:sldId id="752" r:id="rId52"/>
+    <p:sldId id="785" r:id="rId53"/>
+    <p:sldId id="786" r:id="rId54"/>
+    <p:sldId id="790" r:id="rId55"/>
+    <p:sldId id="753" r:id="rId56"/>
+    <p:sldId id="805" r:id="rId57"/>
   </p:sldIdLst>
   <p:sldSz cx="9363075" cy="5257800"/>
   <p:notesSz cx="6858000" cy="9144000"/>
@@ -3524,7 +3525,21 @@
                 <a:latin typeface="PFDinTextCompPro-Italic"/>
                 <a:cs typeface="PFDinTextCompPro-Italic"/>
               </a:rPr>
-              <a:t> function.</a:t>
+              <a:t> function. Note that the base used here is </a:t>
+            </a:r>
+            <a:r>
+              <a:rPr lang="en-US" sz="1200" baseline="0" dirty="0" err="1" smtClean="0">
+                <a:latin typeface="PFDinTextCompPro-Italic"/>
+                <a:cs typeface="PFDinTextCompPro-Italic"/>
+              </a:rPr>
+              <a:t>Eulers</a:t>
+            </a:r>
+            <a:r>
+              <a:rPr lang="en-US" sz="1200" baseline="0" dirty="0" smtClean="0">
+                <a:latin typeface="PFDinTextCompPro-Italic"/>
+                <a:cs typeface="PFDinTextCompPro-Italic"/>
+              </a:rPr>
+              <a:t> number (e). </a:t>
             </a:r>
             <a:endParaRPr lang="en-US" sz="1200" dirty="0" smtClean="0">
               <a:latin typeface="PFDinTextCompPro-Italic"/>
@@ -3637,10 +3652,65 @@
                   <a:prstClr val="black"/>
                 </a:solidFill>
                 <a:latin typeface="ArialMT"/>
+                <a:cs typeface="+mn-cs"/>
                 <a:sym typeface="Wingdings"/>
               </a:rPr>
-              <a:t>Q: What do you think that the b1 represents in the case of the logistic function?</a:t>
-            </a:r>
+              <a:t>The process we just went through is known as the </a:t>
+            </a:r>
+            <a:r>
+              <a:rPr lang="en-US" sz="1200" baseline="0" dirty="0" err="1" smtClean="0">
+                <a:solidFill>
+                  <a:prstClr val="black"/>
+                </a:solidFill>
+                <a:latin typeface="ArialMT"/>
+                <a:cs typeface="+mn-cs"/>
+                <a:sym typeface="Wingdings"/>
+              </a:rPr>
+              <a:t>logit</a:t>
+            </a:r>
+            <a:r>
+              <a:rPr lang="en-US" sz="1200" baseline="0" dirty="0" smtClean="0">
+                <a:solidFill>
+                  <a:prstClr val="black"/>
+                </a:solidFill>
+                <a:latin typeface="ArialMT"/>
+                <a:cs typeface="+mn-cs"/>
+                <a:sym typeface="Wingdings"/>
+              </a:rPr>
+              <a:t> transformation. The output form is </a:t>
+            </a:r>
+            <a:r>
+              <a:rPr lang="en-US" sz="1200" dirty="0" smtClean="0">
+                <a:latin typeface="PFDinTextCompPro-Italic"/>
+                <a:cs typeface="PFDinTextCompPro-Italic"/>
+              </a:rPr>
+              <a:t>referred to as the </a:t>
+            </a:r>
+            <a:r>
+              <a:rPr lang="en-US" sz="1200" dirty="0" err="1" smtClean="0">
+                <a:latin typeface="PFDinTextCompPro-Italic"/>
+                <a:cs typeface="PFDinTextCompPro-Italic"/>
+              </a:rPr>
+              <a:t>logit</a:t>
+            </a:r>
+            <a:r>
+              <a:rPr lang="en-US" sz="1200" dirty="0" smtClean="0">
+                <a:latin typeface="PFDinTextCompPro-Italic"/>
+                <a:cs typeface="PFDinTextCompPro-Italic"/>
+              </a:rPr>
+              <a:t> function and also the log-odds</a:t>
+            </a:r>
+            <a:r>
+              <a:rPr lang="en-US" sz="1200" baseline="0" dirty="0" smtClean="0">
+                <a:latin typeface="PFDinTextCompPro-Italic"/>
+                <a:cs typeface="PFDinTextCompPro-Italic"/>
+              </a:rPr>
+              <a:t> function.</a:t>
+            </a:r>
+            <a:endParaRPr lang="en-US" sz="1200" dirty="0" smtClean="0">
+              <a:latin typeface="PFDinTextCompPro-Italic"/>
+              <a:cs typeface="PFDinTextCompPro-Italic"/>
+            </a:endParaRPr>
           </a:p>
         </p:txBody>
       </p:sp>
@@ -3661,6 +3731,7 @@
           <a:p>
             <a:fld id="{ADD4B5B7-85EF-4E48-AC80-2380FACD9C23}" type="slidenum">
               <a:rPr lang="en-US" smtClean="0"/>
+              <a:pPr/>
               <a:t>33</a:t>
             </a:fld>
             <a:endParaRPr lang="en-US"/>
@@ -3749,7 +3820,7 @@
                 <a:latin typeface="ArialMT"/>
                 <a:sym typeface="Wingdings"/>
               </a:rPr>
-              <a:t>Q: How to we change the b1 value from log-odds, to the odds?</a:t>
+              <a:t>Q: What do you think that the b1 represents in the case of the logistic function?</a:t>
             </a:r>
           </a:p>
         </p:txBody>
@@ -3851,13 +3922,16 @@
               <a:tabLst/>
               <a:defRPr/>
             </a:pPr>
-            <a:endParaRPr lang="en-US" sz="1200" baseline="0" dirty="0" smtClean="0">
-              <a:solidFill>
-                <a:prstClr val="black"/>
-              </a:solidFill>
-              <a:latin typeface="ArialMT"/>
-              <a:sym typeface="Wingdings"/>
-            </a:endParaRPr>
+            <a:r>
+              <a:rPr lang="en-US" sz="1200" baseline="0" dirty="0" smtClean="0">
+                <a:solidFill>
+                  <a:prstClr val="black"/>
+                </a:solidFill>
+                <a:latin typeface="ArialMT"/>
+                <a:sym typeface="Wingdings"/>
+              </a:rPr>
+              <a:t>Q: How to we change the b1 value from log-odds, to the odds?</a:t>
+            </a:r>
           </a:p>
         </p:txBody>
       </p:sp>
@@ -4632,36 +4706,13 @@
               <a:tabLst/>
               <a:defRPr/>
             </a:pPr>
-            <a:r>
-              <a:rPr lang="en-US" sz="1200" baseline="0" dirty="0" smtClean="0">
-                <a:solidFill>
-                  <a:prstClr val="black"/>
-                </a:solidFill>
-                <a:latin typeface="ArialMT"/>
-                <a:sym typeface="Wingdings"/>
-              </a:rPr>
-              <a:t>The </a:t>
-            </a:r>
-            <a:r>
-              <a:rPr lang="en-US" sz="1200" baseline="0" dirty="0" err="1" smtClean="0">
-                <a:solidFill>
-                  <a:prstClr val="black"/>
-                </a:solidFill>
-                <a:latin typeface="ArialMT"/>
-                <a:sym typeface="Wingdings"/>
-              </a:rPr>
-              <a:t>logit</a:t>
-            </a:r>
-            <a:r>
-              <a:rPr lang="en-US" sz="1200" baseline="0" dirty="0" smtClean="0">
-                <a:solidFill>
-                  <a:prstClr val="black"/>
-                </a:solidFill>
-                <a:latin typeface="ArialMT"/>
-                <a:sym typeface="Wingdings"/>
-              </a:rPr>
-              <a:t> function</a:t>
-            </a:r>
+            <a:endParaRPr lang="en-US" sz="1200" baseline="0" dirty="0" smtClean="0">
+              <a:solidFill>
+                <a:prstClr val="black"/>
+              </a:solidFill>
+              <a:latin typeface="ArialMT"/>
+              <a:sym typeface="Wingdings"/>
+            </a:endParaRPr>
           </a:p>
         </p:txBody>
       </p:sp>
@@ -4770,7 +4821,27 @@
                 <a:latin typeface="ArialMT"/>
                 <a:sym typeface="Wingdings"/>
               </a:rPr>
-              <a:t>The logistic regression equation</a:t>
+              <a:t>The </a:t>
+            </a:r>
+            <a:r>
+              <a:rPr lang="en-US" sz="1200" baseline="0" dirty="0" err="1" smtClean="0">
+                <a:solidFill>
+                  <a:prstClr val="black"/>
+                </a:solidFill>
+                <a:latin typeface="ArialMT"/>
+                <a:sym typeface="Wingdings"/>
+              </a:rPr>
+              <a:t>logit</a:t>
+            </a:r>
+            <a:r>
+              <a:rPr lang="en-US" sz="1200" baseline="0" dirty="0" smtClean="0">
+                <a:solidFill>
+                  <a:prstClr val="black"/>
+                </a:solidFill>
+                <a:latin typeface="ArialMT"/>
+                <a:sym typeface="Wingdings"/>
+              </a:rPr>
+              <a:t> function</a:t>
             </a:r>
           </a:p>
         </p:txBody>
@@ -4855,9 +4926,32 @@
           <a:bodyPr/>
           <a:lstStyle/>
           <a:p>
-            <a:r>
-              <a:rPr lang="en-US" baseline="0" dirty="0" smtClean="0"/>
-              <a:t> Leave 1 hours for this exercise</a:t>
+            <a:pPr marL="0" marR="0" indent="0" algn="l" defTabSz="457200" rtl="0" eaLnBrk="1" fontAlgn="auto" latinLnBrk="0" hangingPunct="1">
+              <a:lnSpc>
+                <a:spcPct val="100000"/>
+              </a:lnSpc>
+              <a:spcBef>
+                <a:spcPts val="0"/>
+              </a:spcBef>
+              <a:spcAft>
+                <a:spcPts val="0"/>
+              </a:spcAft>
+              <a:buClrTx/>
+              <a:buSzTx/>
+              <a:buFontTx/>
+              <a:buNone/>
+              <a:tabLst/>
+              <a:defRPr/>
+            </a:pPr>
+            <a:r>
+              <a:rPr lang="en-US" sz="1200" baseline="0" dirty="0" smtClean="0">
+                <a:solidFill>
+                  <a:prstClr val="black"/>
+                </a:solidFill>
+                <a:latin typeface="ArialMT"/>
+                <a:sym typeface="Wingdings"/>
+              </a:rPr>
+              <a:t>The logistic regression equation</a:t>
             </a:r>
           </a:p>
         </p:txBody>
@@ -4888,7 +4982,7 @@
     </p:spTree>
     <p:extLst>
       <p:ext uri="{BB962C8B-B14F-4D97-AF65-F5344CB8AC3E}">
-        <p14:creationId xmlns:p14="http://schemas.microsoft.com/office/powerpoint/2010/main" val="158773868"/>
+        <p14:creationId xmlns:p14="http://schemas.microsoft.com/office/powerpoint/2010/main" val="645762702"/>
       </p:ext>
     </p:extLst>
   </p:cSld>
@@ -4942,30 +5036,10 @@
           <a:bodyPr/>
           <a:lstStyle/>
           <a:p>
-            <a:pPr marL="0" marR="0" indent="0" algn="l" defTabSz="457200" rtl="0" eaLnBrk="1" fontAlgn="auto" latinLnBrk="0" hangingPunct="1">
-              <a:lnSpc>
-                <a:spcPct val="100000"/>
-              </a:lnSpc>
-              <a:spcBef>
-                <a:spcPts val="0"/>
-              </a:spcBef>
-              <a:spcAft>
-                <a:spcPts val="0"/>
-              </a:spcAft>
-              <a:buClrTx/>
-              <a:buSzTx/>
-              <a:buFontTx/>
-              <a:buNone/>
-              <a:tabLst/>
-              <a:defRPr/>
-            </a:pPr>
-            <a:endParaRPr lang="en-US" sz="1200" baseline="0" dirty="0" smtClean="0">
-              <a:solidFill>
-                <a:prstClr val="black"/>
-              </a:solidFill>
-              <a:latin typeface="ArialMT"/>
-              <a:sym typeface="Wingdings"/>
-            </a:endParaRPr>
+            <a:r>
+              <a:rPr lang="en-US" baseline="0" dirty="0" smtClean="0"/>
+              <a:t> Leave 1 hours for this exercise</a:t>
+            </a:r>
           </a:p>
         </p:txBody>
       </p:sp>
@@ -4995,7 +5069,7 @@
     </p:spTree>
     <p:extLst>
       <p:ext uri="{BB962C8B-B14F-4D97-AF65-F5344CB8AC3E}">
-        <p14:creationId xmlns:p14="http://schemas.microsoft.com/office/powerpoint/2010/main" val="645762702"/>
+        <p14:creationId xmlns:p14="http://schemas.microsoft.com/office/powerpoint/2010/main" val="158773868"/>
       </p:ext>
     </p:extLst>
   </p:cSld>
@@ -5263,11 +5337,30 @@
           <a:bodyPr/>
           <a:lstStyle/>
           <a:p>
-            <a:r>
-              <a:rPr lang="en-US" dirty="0" smtClean="0"/>
-              <a:t>  </a:t>
-            </a:r>
-            <a:endParaRPr lang="en-US" dirty="0"/>
+            <a:pPr marL="0" marR="0" indent="0" algn="l" defTabSz="457200" rtl="0" eaLnBrk="1" fontAlgn="auto" latinLnBrk="0" hangingPunct="1">
+              <a:lnSpc>
+                <a:spcPct val="100000"/>
+              </a:lnSpc>
+              <a:spcBef>
+                <a:spcPts val="0"/>
+              </a:spcBef>
+              <a:spcAft>
+                <a:spcPts val="0"/>
+              </a:spcAft>
+              <a:buClrTx/>
+              <a:buSzTx/>
+              <a:buFontTx/>
+              <a:buNone/>
+              <a:tabLst/>
+              <a:defRPr/>
+            </a:pPr>
+            <a:endParaRPr lang="en-US" sz="1200" baseline="0" dirty="0" smtClean="0">
+              <a:solidFill>
+                <a:prstClr val="black"/>
+              </a:solidFill>
+              <a:latin typeface="ArialMT"/>
+              <a:sym typeface="Wingdings"/>
+            </a:endParaRPr>
           </a:p>
         </p:txBody>
       </p:sp>
@@ -5297,7 +5390,7 @@
     </p:spTree>
     <p:extLst>
       <p:ext uri="{BB962C8B-B14F-4D97-AF65-F5344CB8AC3E}">
-        <p14:creationId xmlns:p14="http://schemas.microsoft.com/office/powerpoint/2010/main" val="158773868"/>
+        <p14:creationId xmlns:p14="http://schemas.microsoft.com/office/powerpoint/2010/main" val="645762702"/>
       </p:ext>
     </p:extLst>
   </p:cSld>
@@ -5351,33 +5444,11 @@
           <a:bodyPr/>
           <a:lstStyle/>
           <a:p>
-            <a:pPr marL="0" marR="0" indent="0" algn="l" defTabSz="457200" rtl="0" eaLnBrk="1" fontAlgn="auto" latinLnBrk="0" hangingPunct="1">
-              <a:lnSpc>
-                <a:spcPct val="100000"/>
-              </a:lnSpc>
-              <a:spcBef>
-                <a:spcPts val="0"/>
-              </a:spcBef>
-              <a:spcAft>
-                <a:spcPts val="0"/>
-              </a:spcAft>
-              <a:buClrTx/>
-              <a:buSzTx/>
-              <a:buFontTx/>
-              <a:buNone/>
-              <a:tabLst/>
-              <a:defRPr/>
-            </a:pPr>
-            <a:r>
-              <a:rPr lang="en-US" sz="1200" baseline="0" dirty="0" smtClean="0">
-                <a:solidFill>
-                  <a:prstClr val="black"/>
-                </a:solidFill>
-                <a:latin typeface="ArialMT"/>
-                <a:sym typeface="Wingdings"/>
-              </a:rPr>
-              <a:t> </a:t>
-            </a:r>
+            <a:r>
+              <a:rPr lang="en-US" dirty="0" smtClean="0"/>
+              <a:t>  </a:t>
+            </a:r>
+            <a:endParaRPr lang="en-US" dirty="0"/>
           </a:p>
         </p:txBody>
       </p:sp>
@@ -5407,7 +5478,7 @@
     </p:spTree>
     <p:extLst>
       <p:ext uri="{BB962C8B-B14F-4D97-AF65-F5344CB8AC3E}">
-        <p14:creationId xmlns:p14="http://schemas.microsoft.com/office/powerpoint/2010/main" val="645762702"/>
+        <p14:creationId xmlns:p14="http://schemas.microsoft.com/office/powerpoint/2010/main" val="158773868"/>
       </p:ext>
     </p:extLst>
   </p:cSld>
@@ -5478,13 +5549,16 @@
               <a:tabLst/>
               <a:defRPr/>
             </a:pPr>
-            <a:endParaRPr lang="en-US" sz="1200" baseline="0" dirty="0" smtClean="0">
-              <a:solidFill>
-                <a:prstClr val="black"/>
-              </a:solidFill>
-              <a:latin typeface="ArialMT"/>
-              <a:sym typeface="Wingdings"/>
-            </a:endParaRPr>
+            <a:r>
+              <a:rPr lang="en-US" sz="1200" baseline="0" dirty="0" smtClean="0">
+                <a:solidFill>
+                  <a:prstClr val="black"/>
+                </a:solidFill>
+                <a:latin typeface="ArialMT"/>
+                <a:sym typeface="Wingdings"/>
+              </a:rPr>
+              <a:t> </a:t>
+            </a:r>
           </a:p>
         </p:txBody>
       </p:sp>
@@ -5695,16 +5769,13 @@
               <a:tabLst/>
               <a:defRPr/>
             </a:pPr>
-            <a:r>
-              <a:rPr lang="en-US" sz="1200" baseline="0" dirty="0" smtClean="0">
-                <a:solidFill>
-                  <a:prstClr val="black"/>
-                </a:solidFill>
-                <a:latin typeface="ArialMT"/>
-                <a:sym typeface="Wingdings"/>
-              </a:rPr>
-              <a:t> </a:t>
-            </a:r>
+            <a:endParaRPr lang="en-US" sz="1200" baseline="0" dirty="0" smtClean="0">
+              <a:solidFill>
+                <a:prstClr val="black"/>
+              </a:solidFill>
+              <a:latin typeface="ArialMT"/>
+              <a:sym typeface="Wingdings"/>
+            </a:endParaRPr>
           </a:p>
         </p:txBody>
       </p:sp>
@@ -6056,6 +6127,116 @@
             <a:fld id="{ADD4B5B7-85EF-4E48-AC80-2380FACD9C23}" type="slidenum">
               <a:rPr lang="en-US" smtClean="0"/>
               <a:t>53</a:t>
+            </a:fld>
+            <a:endParaRPr lang="en-US"/>
+          </a:p>
+        </p:txBody>
+      </p:sp>
+    </p:spTree>
+    <p:extLst>
+      <p:ext uri="{BB962C8B-B14F-4D97-AF65-F5344CB8AC3E}">
+        <p14:creationId xmlns:p14="http://schemas.microsoft.com/office/powerpoint/2010/main" val="645762702"/>
+      </p:ext>
+    </p:extLst>
+  </p:cSld>
+  <p:clrMapOvr>
+    <a:masterClrMapping/>
+  </p:clrMapOvr>
+</p:notes>
+</file>
+
+<file path=ppt/notesSlides/notesSlide54.xml><?xml version="1.0" encoding="utf-8"?>
+<p:notes xmlns:a="http://schemas.openxmlformats.org/drawingml/2006/main" xmlns:r="http://schemas.openxmlformats.org/officeDocument/2006/relationships" xmlns:p="http://schemas.openxmlformats.org/presentationml/2006/main">
+  <p:cSld>
+    <p:spTree>
+      <p:nvGrpSpPr>
+        <p:cNvPr id="1" name=""/>
+        <p:cNvGrpSpPr/>
+        <p:nvPr/>
+      </p:nvGrpSpPr>
+      <p:grpSpPr>
+        <a:xfrm>
+          <a:off x="0" y="0"/>
+          <a:ext cx="0" cy="0"/>
+          <a:chOff x="0" y="0"/>
+          <a:chExt cx="0" cy="0"/>
+        </a:xfrm>
+      </p:grpSpPr>
+      <p:sp>
+        <p:nvSpPr>
+          <p:cNvPr id="2" name="Slide Image Placeholder 1"/>
+          <p:cNvSpPr>
+            <a:spLocks noGrp="1" noRot="1" noChangeAspect="1"/>
+          </p:cNvSpPr>
+          <p:nvPr>
+            <p:ph type="sldImg"/>
+          </p:nvPr>
+        </p:nvSpPr>
+        <p:spPr/>
+      </p:sp>
+      <p:sp>
+        <p:nvSpPr>
+          <p:cNvPr id="3" name="Notes Placeholder 2"/>
+          <p:cNvSpPr>
+            <a:spLocks noGrp="1"/>
+          </p:cNvSpPr>
+          <p:nvPr>
+            <p:ph type="body" idx="1"/>
+          </p:nvPr>
+        </p:nvSpPr>
+        <p:spPr/>
+        <p:txBody>
+          <a:bodyPr/>
+          <a:lstStyle/>
+          <a:p>
+            <a:pPr marL="0" marR="0" indent="0" algn="l" defTabSz="457200" rtl="0" eaLnBrk="1" fontAlgn="auto" latinLnBrk="0" hangingPunct="1">
+              <a:lnSpc>
+                <a:spcPct val="100000"/>
+              </a:lnSpc>
+              <a:spcBef>
+                <a:spcPts val="0"/>
+              </a:spcBef>
+              <a:spcAft>
+                <a:spcPts val="0"/>
+              </a:spcAft>
+              <a:buClrTx/>
+              <a:buSzTx/>
+              <a:buFontTx/>
+              <a:buNone/>
+              <a:tabLst/>
+              <a:defRPr/>
+            </a:pPr>
+            <a:r>
+              <a:rPr lang="en-US" sz="1200" baseline="0" dirty="0" smtClean="0">
+                <a:solidFill>
+                  <a:prstClr val="black"/>
+                </a:solidFill>
+                <a:latin typeface="ArialMT"/>
+                <a:sym typeface="Wingdings"/>
+              </a:rPr>
+              <a:t> </a:t>
+            </a:r>
+          </a:p>
+        </p:txBody>
+      </p:sp>
+      <p:sp>
+        <p:nvSpPr>
+          <p:cNvPr id="4" name="Slide Number Placeholder 3"/>
+          <p:cNvSpPr>
+            <a:spLocks noGrp="1"/>
+          </p:cNvSpPr>
+          <p:nvPr>
+            <p:ph type="sldNum" sz="quarter" idx="10"/>
+          </p:nvPr>
+        </p:nvSpPr>
+        <p:spPr/>
+        <p:txBody>
+          <a:bodyPr/>
+          <a:lstStyle/>
+          <a:p>
+            <a:fld id="{ADD4B5B7-85EF-4E48-AC80-2380FACD9C23}" type="slidenum">
+              <a:rPr lang="en-US" smtClean="0"/>
+              <a:t>54</a:t>
             </a:fld>
             <a:endParaRPr lang="en-US"/>
           </a:p>
@@ -19214,7 +19395,7 @@
           <a:graphicData uri="http://schemas.openxmlformats.org/presentationml/2006/ole">
             <mc:AlternateContent xmlns:mc="http://schemas.openxmlformats.org/markup-compatibility/2006">
               <mc:Choice xmlns:v="urn:schemas-microsoft-com:vml" Requires="v">
-                <p:oleObj spid="_x0000_s10362" name="Equation" r:id="rId4" imgW="1726920" imgH="419040" progId="Equation.3">
+                <p:oleObj spid="_x0000_s10364" name="Equation" r:id="rId4" imgW="1726920" imgH="419040" progId="Equation.3">
                   <p:embed/>
                 </p:oleObj>
               </mc:Choice>
@@ -19297,7 +19478,7 @@
           <a:graphicData uri="http://schemas.openxmlformats.org/presentationml/2006/ole">
             <mc:AlternateContent xmlns:mc="http://schemas.openxmlformats.org/markup-compatibility/2006">
               <mc:Choice xmlns:v="urn:schemas-microsoft-com:vml" Requires="v">
-                <p:oleObj spid="_x0000_s10363" name="Equation" r:id="rId6" imgW="787320" imgH="228600" progId="Equation.3">
+                <p:oleObj spid="_x0000_s10365" name="Equation" r:id="rId6" imgW="787320" imgH="228600" progId="Equation.3">
                   <p:embed/>
                 </p:oleObj>
               </mc:Choice>
@@ -19552,7 +19733,7 @@
           <a:graphicData uri="http://schemas.openxmlformats.org/presentationml/2006/ole">
             <mc:AlternateContent xmlns:mc="http://schemas.openxmlformats.org/markup-compatibility/2006">
               <mc:Choice xmlns:v="urn:schemas-microsoft-com:vml" Requires="v">
-                <p:oleObj spid="_x0000_s14453" name="Equation" r:id="rId4" imgW="1726920" imgH="419040" progId="Equation.3">
+                <p:oleObj spid="_x0000_s14455" name="Equation" r:id="rId4" imgW="1726920" imgH="419040" progId="Equation.3">
                   <p:embed/>
                 </p:oleObj>
               </mc:Choice>
@@ -19635,7 +19816,7 @@
           <a:graphicData uri="http://schemas.openxmlformats.org/presentationml/2006/ole">
             <mc:AlternateContent xmlns:mc="http://schemas.openxmlformats.org/markup-compatibility/2006">
               <mc:Choice xmlns:v="urn:schemas-microsoft-com:vml" Requires="v">
-                <p:oleObj spid="_x0000_s14454" name="Equation" r:id="rId6" imgW="787320" imgH="228600" progId="Equation.3">
+                <p:oleObj spid="_x0000_s14456" name="Equation" r:id="rId6" imgW="787320" imgH="228600" progId="Equation.3">
                   <p:embed/>
                 </p:oleObj>
               </mc:Choice>
@@ -19942,7 +20123,7 @@
           <a:graphicData uri="http://schemas.openxmlformats.org/presentationml/2006/ole">
             <mc:AlternateContent xmlns:mc="http://schemas.openxmlformats.org/markup-compatibility/2006">
               <mc:Choice xmlns:v="urn:schemas-microsoft-com:vml" Requires="v">
-                <p:oleObj spid="_x0000_s18492" name="Equation" r:id="rId4" imgW="876240" imgH="419040" progId="Equation.3">
+                <p:oleObj spid="_x0000_s18493" name="Equation" r:id="rId4" imgW="876240" imgH="419040" progId="Equation.3">
                   <p:embed/>
                 </p:oleObj>
               </mc:Choice>
@@ -20203,7 +20384,7 @@
           <a:graphicData uri="http://schemas.openxmlformats.org/presentationml/2006/ole">
             <mc:AlternateContent xmlns:mc="http://schemas.openxmlformats.org/markup-compatibility/2006">
               <mc:Choice xmlns:v="urn:schemas-microsoft-com:vml" Requires="v">
-                <p:oleObj spid="_x0000_s19516" name="Equation" r:id="rId4" imgW="876240" imgH="419040" progId="Equation.3">
+                <p:oleObj spid="_x0000_s19517" name="Equation" r:id="rId4" imgW="876240" imgH="419040" progId="Equation.3">
                   <p:embed/>
                 </p:oleObj>
               </mc:Choice>
@@ -20419,7 +20600,7 @@
           <a:graphicData uri="http://schemas.openxmlformats.org/presentationml/2006/ole">
             <mc:AlternateContent xmlns:mc="http://schemas.openxmlformats.org/markup-compatibility/2006">
               <mc:Choice xmlns:v="urn:schemas-microsoft-com:vml" Requires="v">
-                <p:oleObj spid="_x0000_s11382" name="Equation" r:id="rId4" imgW="876240" imgH="419040" progId="Equation.3">
+                <p:oleObj spid="_x0000_s11383" name="Equation" r:id="rId4" imgW="876240" imgH="419040" progId="Equation.3">
                   <p:embed/>
                 </p:oleObj>
               </mc:Choice>
@@ -20717,7 +20898,7 @@
           <a:graphicData uri="http://schemas.openxmlformats.org/presentationml/2006/ole">
             <mc:AlternateContent xmlns:mc="http://schemas.openxmlformats.org/markup-compatibility/2006">
               <mc:Choice xmlns:v="urn:schemas-microsoft-com:vml" Requires="v">
-                <p:oleObj spid="_x0000_s15475" name="Equation" r:id="rId5" imgW="876240" imgH="419040" progId="Equation.3">
+                <p:oleObj spid="_x0000_s15476" name="Equation" r:id="rId5" imgW="876240" imgH="419040" progId="Equation.3">
                   <p:embed/>
                 </p:oleObj>
               </mc:Choice>
@@ -22277,7 +22458,7 @@
           <a:graphicData uri="http://schemas.openxmlformats.org/presentationml/2006/ole">
             <mc:AlternateContent xmlns:mc="http://schemas.openxmlformats.org/markup-compatibility/2006">
               <mc:Choice xmlns:v="urn:schemas-microsoft-com:vml" Requires="v">
-                <p:oleObj spid="_x0000_s31804" name="Equation" r:id="rId4" imgW="825480" imgH="393480" progId="Equation.3">
+                <p:oleObj spid="_x0000_s31805" name="Equation" r:id="rId4" imgW="825480" imgH="393480" progId="Equation.3">
                   <p:embed/>
                 </p:oleObj>
               </mc:Choice>
@@ -22542,7 +22723,7 @@
           <a:graphicData uri="http://schemas.openxmlformats.org/presentationml/2006/ole">
             <mc:AlternateContent xmlns:mc="http://schemas.openxmlformats.org/markup-compatibility/2006">
               <mc:Choice xmlns:v="urn:schemas-microsoft-com:vml" Requires="v">
-                <p:oleObj spid="_x0000_s49188" name="Equation" r:id="rId4" imgW="825480" imgH="393480" progId="Equation.3">
+                <p:oleObj spid="_x0000_s49189" name="Equation" r:id="rId4" imgW="825480" imgH="393480" progId="Equation.3">
                   <p:embed/>
                 </p:oleObj>
               </mc:Choice>
@@ -23206,7 +23387,7 @@
           <a:graphicData uri="http://schemas.openxmlformats.org/presentationml/2006/ole">
             <mc:AlternateContent xmlns:mc="http://schemas.openxmlformats.org/markup-compatibility/2006">
               <mc:Choice xmlns:v="urn:schemas-microsoft-com:vml" Requires="v">
-                <p:oleObj spid="_x0000_s30782" name="Equation" r:id="rId4" imgW="825480" imgH="393480" progId="Equation.3">
+                <p:oleObj spid="_x0000_s30783" name="Equation" r:id="rId4" imgW="825480" imgH="393480" progId="Equation.3">
                   <p:embed/>
                 </p:oleObj>
               </mc:Choice>
@@ -23390,7 +23571,7 @@
           <a:graphicData uri="http://schemas.openxmlformats.org/presentationml/2006/ole">
             <mc:AlternateContent xmlns:mc="http://schemas.openxmlformats.org/markup-compatibility/2006">
               <mc:Choice xmlns:v="urn:schemas-microsoft-com:vml" Requires="v">
-                <p:oleObj spid="_x0000_s28739" name="Equation" r:id="rId4" imgW="1587240" imgH="393480" progId="Equation.3">
+                <p:oleObj spid="_x0000_s28740" name="Equation" r:id="rId4" imgW="1587240" imgH="393480" progId="Equation.3">
                   <p:embed/>
                 </p:oleObj>
               </mc:Choice>
@@ -23914,7 +24095,7 @@
           <a:graphicData uri="http://schemas.openxmlformats.org/presentationml/2006/ole">
             <mc:AlternateContent xmlns:mc="http://schemas.openxmlformats.org/markup-compatibility/2006">
               <mc:Choice xmlns:v="urn:schemas-microsoft-com:vml" Requires="v">
-                <p:oleObj spid="_x0000_s39997" name="Equation" r:id="rId5" imgW="1587240" imgH="393480" progId="Equation.3">
+                <p:oleObj spid="_x0000_s39998" name="Equation" r:id="rId5" imgW="1587240" imgH="393480" progId="Equation.3">
                   <p:embed/>
                 </p:oleObj>
               </mc:Choice>
@@ -24165,7 +24346,7 @@
           <a:graphicData uri="http://schemas.openxmlformats.org/presentationml/2006/ole">
             <mc:AlternateContent xmlns:mc="http://schemas.openxmlformats.org/markup-compatibility/2006">
               <mc:Choice xmlns:v="urn:schemas-microsoft-com:vml" Requires="v">
-                <p:oleObj spid="_x0000_s41014" name="Equation" r:id="rId4" imgW="1815840" imgH="457200" progId="Equation.3">
+                <p:oleObj spid="_x0000_s41015" name="Equation" r:id="rId4" imgW="1815840" imgH="457200" progId="Equation.3">
                   <p:embed/>
                 </p:oleObj>
               </mc:Choice>
@@ -24527,7 +24708,7 @@
           <a:graphicData uri="http://schemas.openxmlformats.org/presentationml/2006/ole">
             <mc:AlternateContent xmlns:mc="http://schemas.openxmlformats.org/markup-compatibility/2006">
               <mc:Choice xmlns:v="urn:schemas-microsoft-com:vml" Requires="v">
-                <p:oleObj spid="_x0000_s35952" name="Equation" r:id="rId4" imgW="1815840" imgH="457200" progId="Equation.3">
+                <p:oleObj spid="_x0000_s35954" name="Equation" r:id="rId4" imgW="1815840" imgH="457200" progId="Equation.3">
                   <p:embed/>
                 </p:oleObj>
               </mc:Choice>
@@ -24597,7 +24778,7 @@
           <p:nvPr>
             <p:extLst>
               <p:ext uri="{D42A27DB-BD31-4B8C-83A1-F6EECF244321}">
-                <p14:modId xmlns:p14="http://schemas.microsoft.com/office/powerpoint/2010/main" val="1057403389"/>
+                <p14:modId xmlns:p14="http://schemas.microsoft.com/office/powerpoint/2010/main" val="1643384013"/>
               </p:ext>
             </p:extLst>
           </p:nvPr>
@@ -24610,7 +24791,7 @@
           <a:graphicData uri="http://schemas.openxmlformats.org/presentationml/2006/ole">
             <mc:AlternateContent xmlns:mc="http://schemas.openxmlformats.org/markup-compatibility/2006">
               <mc:Choice xmlns:v="urn:schemas-microsoft-com:vml" Requires="v">
-                <p:oleObj spid="_x0000_s35953" name="Equation" r:id="rId6" imgW="3340080" imgH="457200" progId="Equation.3">
+                <p:oleObj spid="_x0000_s35955" name="Equation" r:id="rId6" imgW="3340080" imgH="457200" progId="Equation.3">
                   <p:embed/>
                 </p:oleObj>
               </mc:Choice>
@@ -24855,7 +25036,7 @@
           <a:graphicData uri="http://schemas.openxmlformats.org/presentationml/2006/ole">
             <mc:AlternateContent xmlns:mc="http://schemas.openxmlformats.org/markup-compatibility/2006">
               <mc:Choice xmlns:v="urn:schemas-microsoft-com:vml" Requires="v">
-                <p:oleObj spid="_x0000_s34876" name="Equation" r:id="rId4" imgW="2120760" imgH="393480" progId="Equation.3">
+                <p:oleObj spid="_x0000_s34877" name="Equation" r:id="rId4" imgW="2120760" imgH="393480" progId="Equation.3">
                   <p:embed/>
                 </p:oleObj>
               </mc:Choice>
@@ -25033,7 +25214,7 @@
         <p:spPr>
           <a:xfrm>
             <a:off x="566737" y="1104900"/>
-            <a:ext cx="8382000" cy="3785652"/>
+            <a:ext cx="8382000" cy="2400657"/>
           </a:xfrm>
           <a:prstGeom prst="rect">
             <a:avLst/>
@@ -25076,37 +25257,6 @@
               <a:cs typeface="PFDinTextCompPro-Italic"/>
             </a:endParaRPr>
           </a:p>
-          <a:p>
-            <a:pPr algn="l"/>
-            <a:endParaRPr lang="en-US" sz="3000" dirty="0" smtClean="0">
-              <a:latin typeface="PFDinTextCompPro-Italic"/>
-              <a:cs typeface="PFDinTextCompPro-Italic"/>
-            </a:endParaRPr>
-          </a:p>
-          <a:p>
-            <a:pPr algn="l"/>
-            <a:r>
-              <a:rPr lang="en-US" sz="3000" dirty="0">
-                <a:latin typeface="PFDinTextCompPro-Italic"/>
-                <a:cs typeface="PFDinTextCompPro-Italic"/>
-              </a:rPr>
-              <a:t>This simple relationship between the odds ratio and the parameter </a:t>
-            </a:r>
-            <a:r>
-              <a:rPr lang="en-US" sz="3000" i="1" dirty="0">
-                <a:latin typeface="Symbol" charset="2"/>
-                <a:cs typeface="Symbol" charset="2"/>
-              </a:rPr>
-              <a:t>b</a:t>
-            </a:r>
-            <a:r>
-              <a:rPr lang="en-US" sz="3000" dirty="0">
-                <a:latin typeface="PFDinTextCompPro-Italic"/>
-                <a:cs typeface="PFDinTextCompPro-Italic"/>
-              </a:rPr>
-              <a:t> is what makes logistic regression such a powerful tool.</a:t>
-            </a:r>
-          </a:p>
         </p:txBody>
       </p:sp>
       <p:graphicFrame>
@@ -25118,7 +25268,7 @@
           <p:nvPr>
             <p:extLst>
               <p:ext uri="{D42A27DB-BD31-4B8C-83A1-F6EECF244321}">
-                <p14:modId xmlns:p14="http://schemas.microsoft.com/office/powerpoint/2010/main" val="624864292"/>
+                <p14:modId xmlns:p14="http://schemas.microsoft.com/office/powerpoint/2010/main" val="3190169211"/>
               </p:ext>
             </p:extLst>
           </p:nvPr>
@@ -25131,7 +25281,520 @@
           <a:graphicData uri="http://schemas.openxmlformats.org/presentationml/2006/ole">
             <mc:AlternateContent xmlns:mc="http://schemas.openxmlformats.org/markup-compatibility/2006">
               <mc:Choice xmlns:v="urn:schemas-microsoft-com:vml" Requires="v">
-                <p:oleObj spid="_x0000_s37950" name="Equation" r:id="rId4" imgW="2120760" imgH="393480" progId="Equation.3">
+                <p:oleObj spid="_x0000_s50178" name="Equation" r:id="rId4" imgW="2120760" imgH="393480" progId="Equation.3">
+                  <p:embed/>
+                </p:oleObj>
+              </mc:Choice>
+              <mc:Fallback>
+                <p:oleObj name="Equation" r:id="rId4" imgW="2120760" imgH="393480" progId="Equation.3">
+                  <p:embed/>
+                  <p:pic>
+                    <p:nvPicPr>
+                      <p:cNvPr id="0" name=""/>
+                      <p:cNvPicPr>
+                        <a:picLocks noChangeAspect="1" noChangeArrowheads="1"/>
+                      </p:cNvPicPr>
+                      <p:nvPr/>
+                    </p:nvPicPr>
+                    <p:blipFill>
+                      <a:blip r:embed="rId5"/>
+                      <a:srcRect/>
+                      <a:stretch>
+                        <a:fillRect/>
+                      </a:stretch>
+                    </p:blipFill>
+                    <p:spPr bwMode="auto">
+                      <a:xfrm>
+                        <a:off x="1868488" y="2446337"/>
+                        <a:ext cx="5570537" cy="1020763"/>
+                      </a:xfrm>
+                      <a:prstGeom prst="rect">
+                        <a:avLst/>
+                      </a:prstGeom>
+                      <a:noFill/>
+                      <a:ln>
+                        <a:noFill/>
+                      </a:ln>
+                      <a:extLst>
+                        <a:ext uri="{909E8E84-426E-40DD-AFC4-6F175D3DCCD1}">
+                          <a14:hiddenFill xmlns:a14="http://schemas.microsoft.com/office/drawing/2010/main">
+                            <a:solidFill>
+                              <a:srgbClr val="FFFFFF"/>
+                            </a:solidFill>
+                          </a14:hiddenFill>
+                        </a:ext>
+                        <a:ext uri="{91240B29-F687-4F45-9708-019B960494DF}">
+                          <a14:hiddenLine xmlns:a14="http://schemas.microsoft.com/office/drawing/2010/main" w="9525">
+                            <a:solidFill>
+                              <a:srgbClr val="000000"/>
+                            </a:solidFill>
+                            <a:miter lim="800000"/>
+                            <a:headEnd/>
+                            <a:tailEnd/>
+                          </a14:hiddenLine>
+                        </a:ext>
+                      </a:extLst>
+                    </p:spPr>
+                  </p:pic>
+                </p:oleObj>
+              </mc:Fallback>
+            </mc:AlternateContent>
+          </a:graphicData>
+        </a:graphic>
+      </p:graphicFrame>
+      <p:grpSp>
+        <p:nvGrpSpPr>
+          <p:cNvPr id="6" name="Group 26"/>
+          <p:cNvGrpSpPr>
+            <a:grpSpLocks/>
+          </p:cNvGrpSpPr>
+          <p:nvPr/>
+        </p:nvGrpSpPr>
+        <p:grpSpPr bwMode="auto">
+          <a:xfrm>
+            <a:off x="7194851" y="3467100"/>
+            <a:ext cx="1771047" cy="1295400"/>
+            <a:chOff x="0" y="0"/>
+            <a:chExt cx="1280" cy="712"/>
+          </a:xfrm>
+        </p:grpSpPr>
+        <p:pic>
+          <p:nvPicPr>
+            <p:cNvPr id="7" name="Picture 23"/>
+            <p:cNvPicPr>
+              <a:picLocks noChangeAspect="1" noChangeArrowheads="1"/>
+            </p:cNvPicPr>
+            <p:nvPr/>
+          </p:nvPicPr>
+          <p:blipFill>
+            <a:blip r:embed="rId6">
+              <a:extLst>
+                <a:ext uri="{28A0092B-C50C-407E-A947-70E740481C1C}">
+                  <a14:useLocalDpi xmlns:a14="http://schemas.microsoft.com/office/drawing/2010/main" val="0"/>
+                </a:ext>
+              </a:extLst>
+            </a:blip>
+            <a:srcRect/>
+            <a:stretch>
+              <a:fillRect/>
+            </a:stretch>
+          </p:blipFill>
+          <p:spPr bwMode="auto">
+            <a:xfrm>
+              <a:off x="0" y="0"/>
+              <a:ext cx="1280" cy="712"/>
+            </a:xfrm>
+            <a:prstGeom prst="rect">
+              <a:avLst/>
+            </a:prstGeom>
+            <a:noFill/>
+            <a:ln>
+              <a:noFill/>
+            </a:ln>
+            <a:extLst>
+              <a:ext uri="{909E8E84-426E-40DD-AFC4-6F175D3DCCD1}">
+                <a14:hiddenFill xmlns:a14="http://schemas.microsoft.com/office/drawing/2010/main">
+                  <a:solidFill>
+                    <a:srgbClr val="FFFFFF"/>
+                  </a:solidFill>
+                </a14:hiddenFill>
+              </a:ext>
+              <a:ext uri="{91240B29-F687-4F45-9708-019B960494DF}">
+                <a14:hiddenLine xmlns:a14="http://schemas.microsoft.com/office/drawing/2010/main" w="12700">
+                  <a:solidFill>
+                    <a:schemeClr val="tx1"/>
+                  </a:solidFill>
+                  <a:miter lim="800000"/>
+                  <a:headEnd/>
+                  <a:tailEnd/>
+                </a14:hiddenLine>
+              </a:ext>
+            </a:extLst>
+          </p:spPr>
+        </p:pic>
+        <p:sp>
+          <p:nvSpPr>
+            <p:cNvPr id="10" name="Rectangle 24"/>
+            <p:cNvSpPr>
+              <a:spLocks/>
+            </p:cNvSpPr>
+            <p:nvPr/>
+          </p:nvSpPr>
+          <p:spPr bwMode="auto">
+            <a:xfrm>
+              <a:off x="104" y="96"/>
+              <a:ext cx="1056" cy="152"/>
+            </a:xfrm>
+            <a:prstGeom prst="rect">
+              <a:avLst/>
+            </a:prstGeom>
+            <a:noFill/>
+            <a:ln>
+              <a:noFill/>
+            </a:ln>
+            <a:extLst>
+              <a:ext uri="{909E8E84-426E-40DD-AFC4-6F175D3DCCD1}">
+                <a14:hiddenFill xmlns:a14="http://schemas.microsoft.com/office/drawing/2010/main">
+                  <a:solidFill>
+                    <a:srgbClr val="FFFFFF"/>
+                  </a:solidFill>
+                </a14:hiddenFill>
+              </a:ext>
+              <a:ext uri="{91240B29-F687-4F45-9708-019B960494DF}">
+                <a14:hiddenLine xmlns:a14="http://schemas.microsoft.com/office/drawing/2010/main" w="12700">
+                  <a:solidFill>
+                    <a:schemeClr val="tx1"/>
+                  </a:solidFill>
+                  <a:miter lim="800000"/>
+                  <a:headEnd/>
+                  <a:tailEnd/>
+                </a14:hiddenLine>
+              </a:ext>
+            </a:extLst>
+          </p:spPr>
+          <p:txBody>
+            <a:bodyPr lIns="0" tIns="0" rIns="0" bIns="0"/>
+            <a:lstStyle/>
+            <a:p>
+              <a:pPr algn="l">
+                <a:lnSpc>
+                  <a:spcPct val="75000"/>
+                </a:lnSpc>
+              </a:pPr>
+              <a:r>
+                <a:rPr lang="en-US" sz="1800" dirty="0" smtClean="0">
+                  <a:solidFill>
+                    <a:schemeClr val="tx1"/>
+                  </a:solidFill>
+                  <a:latin typeface="PFDinTextCompPro-Bold" charset="0"/>
+                  <a:ea typeface="ＭＳ Ｐゴシック" charset="0"/>
+                  <a:cs typeface="ＭＳ Ｐゴシック" charset="0"/>
+                  <a:sym typeface="PFDinTextCompPro-Bold" charset="0"/>
+                </a:rPr>
+                <a:t>NOTE</a:t>
+              </a:r>
+              <a:endParaRPr lang="en-US" sz="1800" dirty="0">
+                <a:solidFill>
+                  <a:schemeClr val="tx1"/>
+                </a:solidFill>
+                <a:latin typeface="PFDinTextCompPro-Bold" charset="0"/>
+                <a:ea typeface="ＭＳ Ｐゴシック" charset="0"/>
+                <a:cs typeface="ＭＳ Ｐゴシック" charset="0"/>
+                <a:sym typeface="PFDinTextCompPro-Bold" charset="0"/>
+              </a:endParaRPr>
+            </a:p>
+          </p:txBody>
+        </p:sp>
+        <p:sp>
+          <p:nvSpPr>
+            <p:cNvPr id="11" name="Rectangle 25"/>
+            <p:cNvSpPr>
+              <a:spLocks/>
+            </p:cNvSpPr>
+            <p:nvPr/>
+          </p:nvSpPr>
+          <p:spPr bwMode="auto">
+            <a:xfrm>
+              <a:off x="104" y="264"/>
+              <a:ext cx="1056" cy="448"/>
+            </a:xfrm>
+            <a:prstGeom prst="rect">
+              <a:avLst/>
+            </a:prstGeom>
+            <a:noFill/>
+            <a:ln>
+              <a:noFill/>
+            </a:ln>
+            <a:extLst>
+              <a:ext uri="{909E8E84-426E-40DD-AFC4-6F175D3DCCD1}">
+                <a14:hiddenFill xmlns:a14="http://schemas.microsoft.com/office/drawing/2010/main">
+                  <a:solidFill>
+                    <a:srgbClr val="FFFFFF"/>
+                  </a:solidFill>
+                </a14:hiddenFill>
+              </a:ext>
+              <a:ext uri="{91240B29-F687-4F45-9708-019B960494DF}">
+                <a14:hiddenLine xmlns:a14="http://schemas.microsoft.com/office/drawing/2010/main" w="12700">
+                  <a:solidFill>
+                    <a:schemeClr val="tx1"/>
+                  </a:solidFill>
+                  <a:miter lim="800000"/>
+                  <a:headEnd/>
+                  <a:tailEnd/>
+                </a14:hiddenLine>
+              </a:ext>
+            </a:extLst>
+          </p:spPr>
+          <p:txBody>
+            <a:bodyPr lIns="0" tIns="0" rIns="0" bIns="0"/>
+            <a:lstStyle/>
+            <a:p>
+              <a:pPr algn="l"/>
+              <a:r>
+                <a:rPr lang="en-US" sz="1400" dirty="0" smtClean="0">
+                  <a:solidFill>
+                    <a:schemeClr val="tx1"/>
+                  </a:solidFill>
+                  <a:latin typeface="+mn-lt"/>
+                  <a:ea typeface="ＭＳ Ｐゴシック" charset="0"/>
+                  <a:cs typeface="PFDinTextCompPro-Italic"/>
+                  <a:sym typeface="News706 BT" charset="0"/>
+                </a:rPr>
+                <a:t>What is the range of the </a:t>
+              </a:r>
+              <a:r>
+                <a:rPr lang="en-US" sz="1400" dirty="0" err="1" smtClean="0">
+                  <a:solidFill>
+                    <a:schemeClr val="tx1"/>
+                  </a:solidFill>
+                  <a:latin typeface="+mn-lt"/>
+                  <a:ea typeface="ＭＳ Ｐゴシック" charset="0"/>
+                  <a:cs typeface="PFDinTextCompPro-Italic"/>
+                  <a:sym typeface="News706 BT" charset="0"/>
+                </a:rPr>
+                <a:t>logit</a:t>
+              </a:r>
+              <a:r>
+                <a:rPr lang="en-US" sz="1400" dirty="0" smtClean="0">
+                  <a:solidFill>
+                    <a:schemeClr val="tx1"/>
+                  </a:solidFill>
+                  <a:latin typeface="+mn-lt"/>
+                  <a:ea typeface="ＭＳ Ｐゴシック" charset="0"/>
+                  <a:cs typeface="PFDinTextCompPro-Italic"/>
+                  <a:sym typeface="News706 BT" charset="0"/>
+                </a:rPr>
+                <a:t> function?</a:t>
+              </a:r>
+              <a:endParaRPr lang="en-US" sz="1400" dirty="0" smtClean="0">
+                <a:solidFill>
+                  <a:schemeClr val="tx1"/>
+                </a:solidFill>
+                <a:latin typeface="+mn-lt"/>
+                <a:ea typeface="ＭＳ Ｐゴシック" charset="0"/>
+                <a:cs typeface="PFDinTextCompPro-Italic"/>
+                <a:sym typeface="News706 BT" charset="0"/>
+              </a:endParaRPr>
+            </a:p>
+          </p:txBody>
+        </p:sp>
+      </p:grpSp>
+    </p:spTree>
+    <p:extLst>
+      <p:ext uri="{BB962C8B-B14F-4D97-AF65-F5344CB8AC3E}">
+        <p14:creationId xmlns:p14="http://schemas.microsoft.com/office/powerpoint/2010/main" val="186363389"/>
+      </p:ext>
+    </p:extLst>
+  </p:cSld>
+  <p:clrMapOvr>
+    <a:masterClrMapping/>
+  </p:clrMapOvr>
+  <p:transition/>
+  <p:timing>
+    <p:tnLst>
+      <p:par>
+        <p:cTn id="1" dur="indefinite" restart="never" nodeType="tmRoot"/>
+      </p:par>
+    </p:tnLst>
+  </p:timing>
+</p:sld>
+</file>
+
+<file path=ppt/slides/slide33.xml><?xml version="1.0" encoding="utf-8"?>
+<p:sld xmlns:a="http://schemas.openxmlformats.org/drawingml/2006/main" xmlns:r="http://schemas.openxmlformats.org/officeDocument/2006/relationships" xmlns:p="http://schemas.openxmlformats.org/presentationml/2006/main">
+  <p:cSld>
+    <p:spTree>
+      <p:nvGrpSpPr>
+        <p:cNvPr id="1" name=""/>
+        <p:cNvGrpSpPr/>
+        <p:nvPr/>
+      </p:nvGrpSpPr>
+      <p:grpSpPr>
+        <a:xfrm>
+          <a:off x="0" y="0"/>
+          <a:ext cx="0" cy="0"/>
+          <a:chOff x="0" y="0"/>
+          <a:chExt cx="0" cy="0"/>
+        </a:xfrm>
+      </p:grpSpPr>
+      <p:sp>
+        <p:nvSpPr>
+          <p:cNvPr id="4" name="Content Placeholder 3"/>
+          <p:cNvSpPr>
+            <a:spLocks noGrp="1"/>
+          </p:cNvSpPr>
+          <p:nvPr>
+            <p:ph sz="quarter" idx="11"/>
+          </p:nvPr>
+        </p:nvSpPr>
+        <p:spPr>
+          <a:xfrm>
+            <a:off x="414337" y="495300"/>
+            <a:ext cx="6400800" cy="304800"/>
+          </a:xfrm>
+        </p:spPr>
+        <p:txBody>
+          <a:bodyPr/>
+          <a:lstStyle/>
+          <a:p>
+            <a:pPr eaLnBrk="1" hangingPunct="1">
+              <a:lnSpc>
+                <a:spcPts val="2448"/>
+              </a:lnSpc>
+              <a:defRPr/>
+            </a:pPr>
+            <a:r>
+              <a:rPr lang="en-US" dirty="0"/>
+              <a:t>Interpreting results</a:t>
+            </a:r>
+          </a:p>
+        </p:txBody>
+      </p:sp>
+      <p:sp>
+        <p:nvSpPr>
+          <p:cNvPr id="8" name="Slide Number Placeholder 3"/>
+          <p:cNvSpPr>
+            <a:spLocks noGrp="1"/>
+          </p:cNvSpPr>
+          <p:nvPr>
+            <p:ph type="sldNum" sz="quarter" idx="13"/>
+          </p:nvPr>
+        </p:nvSpPr>
+        <p:spPr/>
+        <p:txBody>
+          <a:bodyPr/>
+          <a:lstStyle/>
+          <a:p>
+            <a:pPr>
+              <a:defRPr/>
+            </a:pPr>
+            <a:fld id="{BD5AD749-DAD1-6A4A-A2AA-CB20EAD0AEB7}" type="slidenum">
+              <a:rPr lang="en-US">
+                <a:solidFill>
+                  <a:srgbClr val="000000"/>
+                </a:solidFill>
+              </a:rPr>
+              <a:pPr>
+                <a:defRPr/>
+              </a:pPr>
+              <a:t>33</a:t>
+            </a:fld>
+            <a:endParaRPr lang="en-US">
+              <a:solidFill>
+                <a:srgbClr val="000000"/>
+              </a:solidFill>
+            </a:endParaRPr>
+          </a:p>
+        </p:txBody>
+      </p:sp>
+      <p:sp>
+        <p:nvSpPr>
+          <p:cNvPr id="9" name="TextBox 8"/>
+          <p:cNvSpPr txBox="1"/>
+          <p:nvPr/>
+        </p:nvSpPr>
+        <p:spPr>
+          <a:xfrm>
+            <a:off x="566737" y="1104900"/>
+            <a:ext cx="8382000" cy="3785652"/>
+          </a:xfrm>
+          <a:prstGeom prst="rect">
+            <a:avLst/>
+          </a:prstGeom>
+          <a:noFill/>
+        </p:spPr>
+        <p:txBody>
+          <a:bodyPr wrap="square" rtlCol="0">
+            <a:spAutoFit/>
+          </a:bodyPr>
+          <a:lstStyle/>
+          <a:p>
+            <a:pPr algn="l"/>
+            <a:r>
+              <a:rPr lang="en-US" sz="3000" dirty="0" smtClean="0">
+                <a:latin typeface="PFDinTextCompPro-Italic"/>
+                <a:cs typeface="PFDinTextCompPro-Italic"/>
+              </a:rPr>
+              <a:t>Notice if we take the logarithm of the odds, we return a linear equation</a:t>
+            </a:r>
+          </a:p>
+          <a:p>
+            <a:pPr algn="l"/>
+            <a:endParaRPr lang="en-US" sz="3000" dirty="0" smtClean="0">
+              <a:latin typeface="PFDinTextCompPro-Italic"/>
+              <a:cs typeface="PFDinTextCompPro-Italic"/>
+            </a:endParaRPr>
+          </a:p>
+          <a:p>
+            <a:pPr algn="l"/>
+            <a:endParaRPr lang="en-US" sz="3000" dirty="0" smtClean="0">
+              <a:latin typeface="PFDinTextCompPro-Italic"/>
+              <a:cs typeface="PFDinTextCompPro-Italic"/>
+            </a:endParaRPr>
+          </a:p>
+          <a:p>
+            <a:pPr algn="l"/>
+            <a:endParaRPr lang="en-US" sz="3000" dirty="0" smtClean="0">
+              <a:latin typeface="PFDinTextCompPro-Italic"/>
+              <a:cs typeface="PFDinTextCompPro-Italic"/>
+            </a:endParaRPr>
+          </a:p>
+          <a:p>
+            <a:pPr algn="l"/>
+            <a:endParaRPr lang="en-US" sz="3000" dirty="0" smtClean="0">
+              <a:latin typeface="PFDinTextCompPro-Italic"/>
+              <a:cs typeface="PFDinTextCompPro-Italic"/>
+            </a:endParaRPr>
+          </a:p>
+          <a:p>
+            <a:pPr algn="l"/>
+            <a:r>
+              <a:rPr lang="en-US" sz="3000" dirty="0">
+                <a:latin typeface="PFDinTextCompPro-Italic"/>
+                <a:cs typeface="PFDinTextCompPro-Italic"/>
+              </a:rPr>
+              <a:t>This simple relationship between the odds ratio and the parameter </a:t>
+            </a:r>
+            <a:r>
+              <a:rPr lang="en-US" sz="3000" i="1" dirty="0">
+                <a:latin typeface="Symbol" charset="2"/>
+                <a:cs typeface="Symbol" charset="2"/>
+              </a:rPr>
+              <a:t>b</a:t>
+            </a:r>
+            <a:r>
+              <a:rPr lang="en-US" sz="3000" dirty="0">
+                <a:latin typeface="PFDinTextCompPro-Italic"/>
+                <a:cs typeface="PFDinTextCompPro-Italic"/>
+              </a:rPr>
+              <a:t> is what makes logistic regression such a powerful tool.</a:t>
+            </a:r>
+          </a:p>
+        </p:txBody>
+      </p:sp>
+      <p:graphicFrame>
+        <p:nvGraphicFramePr>
+          <p:cNvPr id="5" name="Object 4"/>
+          <p:cNvGraphicFramePr>
+            <a:graphicFrameLocks noChangeAspect="1"/>
+          </p:cNvGraphicFramePr>
+          <p:nvPr>
+            <p:extLst>
+              <p:ext uri="{D42A27DB-BD31-4B8C-83A1-F6EECF244321}">
+                <p14:modId xmlns:p14="http://schemas.microsoft.com/office/powerpoint/2010/main" val="624864292"/>
+              </p:ext>
+            </p:extLst>
+          </p:nvPr>
+        </p:nvGraphicFramePr>
+        <p:xfrm>
+          <a:off x="1868488" y="2446337"/>
+          <a:ext cx="5570537" cy="1020763"/>
+        </p:xfrm>
+        <a:graphic>
+          <a:graphicData uri="http://schemas.openxmlformats.org/presentationml/2006/ole">
+            <mc:AlternateContent xmlns:mc="http://schemas.openxmlformats.org/markup-compatibility/2006">
+              <mc:Choice xmlns:v="urn:schemas-microsoft-com:vml" Requires="v">
+                <p:oleObj spid="_x0000_s37951" name="Equation" r:id="rId4" imgW="2120760" imgH="393480" progId="Equation.3">
                   <p:embed/>
                 </p:oleObj>
               </mc:Choice>
@@ -25213,175 +25876,6 @@
 </p:sld>
 </file>
 
-<file path=ppt/slides/slide33.xml><?xml version="1.0" encoding="utf-8"?>
-<p:sld xmlns:a="http://schemas.openxmlformats.org/drawingml/2006/main" xmlns:r="http://schemas.openxmlformats.org/officeDocument/2006/relationships" xmlns:p="http://schemas.openxmlformats.org/presentationml/2006/main">
-  <p:cSld>
-    <p:spTree>
-      <p:nvGrpSpPr>
-        <p:cNvPr id="1" name=""/>
-        <p:cNvGrpSpPr/>
-        <p:nvPr/>
-      </p:nvGrpSpPr>
-      <p:grpSpPr>
-        <a:xfrm>
-          <a:off x="0" y="0"/>
-          <a:ext cx="0" cy="0"/>
-          <a:chOff x="0" y="0"/>
-          <a:chExt cx="0" cy="0"/>
-        </a:xfrm>
-      </p:grpSpPr>
-      <p:sp>
-        <p:nvSpPr>
-          <p:cNvPr id="4" name="Content Placeholder 3"/>
-          <p:cNvSpPr>
-            <a:spLocks noGrp="1"/>
-          </p:cNvSpPr>
-          <p:nvPr>
-            <p:ph sz="quarter" idx="11"/>
-          </p:nvPr>
-        </p:nvSpPr>
-        <p:spPr>
-          <a:xfrm>
-            <a:off x="414337" y="495300"/>
-            <a:ext cx="6400800" cy="304800"/>
-          </a:xfrm>
-        </p:spPr>
-        <p:txBody>
-          <a:bodyPr/>
-          <a:lstStyle/>
-          <a:p>
-            <a:pPr eaLnBrk="1" hangingPunct="1">
-              <a:lnSpc>
-                <a:spcPts val="2448"/>
-              </a:lnSpc>
-              <a:defRPr/>
-            </a:pPr>
-            <a:r>
-              <a:rPr lang="en-US" dirty="0" smtClean="0"/>
-              <a:t>Interpreting results</a:t>
-            </a:r>
-            <a:endParaRPr lang="en-US" dirty="0"/>
-          </a:p>
-        </p:txBody>
-      </p:sp>
-      <p:sp>
-        <p:nvSpPr>
-          <p:cNvPr id="8" name="Slide Number Placeholder 3"/>
-          <p:cNvSpPr>
-            <a:spLocks noGrp="1"/>
-          </p:cNvSpPr>
-          <p:nvPr>
-            <p:ph type="sldNum" sz="quarter" idx="13"/>
-          </p:nvPr>
-        </p:nvSpPr>
-        <p:spPr/>
-        <p:txBody>
-          <a:bodyPr/>
-          <a:lstStyle/>
-          <a:p>
-            <a:pPr>
-              <a:defRPr/>
-            </a:pPr>
-            <a:fld id="{BD5AD749-DAD1-6A4A-A2AA-CB20EAD0AEB7}" type="slidenum">
-              <a:rPr lang="en-US"/>
-              <a:pPr>
-                <a:defRPr/>
-              </a:pPr>
-              <a:t>33</a:t>
-            </a:fld>
-            <a:endParaRPr lang="en-US"/>
-          </a:p>
-        </p:txBody>
-      </p:sp>
-      <p:sp>
-        <p:nvSpPr>
-          <p:cNvPr id="9" name="TextBox 8"/>
-          <p:cNvSpPr txBox="1"/>
-          <p:nvPr/>
-        </p:nvSpPr>
-        <p:spPr>
-          <a:xfrm>
-            <a:off x="566737" y="1104900"/>
-            <a:ext cx="8382000" cy="1015663"/>
-          </a:xfrm>
-          <a:prstGeom prst="rect">
-            <a:avLst/>
-          </a:prstGeom>
-          <a:noFill/>
-        </p:spPr>
-        <p:txBody>
-          <a:bodyPr wrap="square" rtlCol="0">
-            <a:spAutoFit/>
-          </a:bodyPr>
-          <a:lstStyle/>
-          <a:p>
-            <a:pPr algn="l"/>
-            <a:r>
-              <a:rPr lang="en-US" sz="3000" dirty="0" smtClean="0">
-                <a:latin typeface="PFDinTextCompPro-Italic"/>
-                <a:cs typeface="PFDinTextCompPro-Italic"/>
-              </a:rPr>
-              <a:t>In linear regression, the parameter </a:t>
-            </a:r>
-            <a:r>
-              <a:rPr lang="en-US" sz="3000" i="1" dirty="0" smtClean="0">
-                <a:latin typeface="Symbol" charset="2"/>
-                <a:cs typeface="Symbol" charset="2"/>
-              </a:rPr>
-              <a:t>b</a:t>
-            </a:r>
-            <a:r>
-              <a:rPr lang="en-US" sz="3000" i="1" baseline="-25000" dirty="0" smtClean="0">
-                <a:latin typeface="Symbol" charset="2"/>
-                <a:cs typeface="Symbol" charset="2"/>
-              </a:rPr>
-              <a:t>1</a:t>
-            </a:r>
-            <a:r>
-              <a:rPr lang="en-US" sz="3000" dirty="0" smtClean="0">
-                <a:latin typeface="PFDinTextCompPro-Italic"/>
-                <a:cs typeface="PFDinTextCompPro-Italic"/>
-              </a:rPr>
-              <a:t> represents the change in the </a:t>
-            </a:r>
-            <a:r>
-              <a:rPr lang="en-US" sz="3000" b="1" dirty="0" smtClean="0">
-                <a:latin typeface="PFDinTextCompPro-Italic"/>
-                <a:cs typeface="PFDinTextCompPro-Italic"/>
-              </a:rPr>
-              <a:t>response variable </a:t>
-            </a:r>
-            <a:r>
-              <a:rPr lang="en-US" sz="3000" dirty="0" smtClean="0">
-                <a:latin typeface="PFDinTextCompPro-Italic"/>
-                <a:cs typeface="PFDinTextCompPro-Italic"/>
-              </a:rPr>
-              <a:t>for a unit change in x.</a:t>
-            </a:r>
-          </a:p>
-        </p:txBody>
-      </p:sp>
-    </p:spTree>
-    <p:extLst>
-      <p:ext uri="{BB962C8B-B14F-4D97-AF65-F5344CB8AC3E}">
-        <p14:creationId xmlns:p14="http://schemas.microsoft.com/office/powerpoint/2010/main" val="2143786739"/>
-      </p:ext>
-    </p:extLst>
-  </p:cSld>
-  <p:clrMapOvr>
-    <a:masterClrMapping/>
-  </p:clrMapOvr>
-  <p:transition/>
-  <p:timing>
-    <p:tnLst>
-      <p:par>
-        <p:cTn id="1" dur="indefinite" restart="never" nodeType="tmRoot"/>
-      </p:par>
-    </p:tnLst>
-  </p:timing>
-</p:sld>
-</file>
-
 <file path=ppt/slides/slide34.xml><?xml version="1.0" encoding="utf-8"?>
 <p:sld xmlns:a="http://schemas.openxmlformats.org/drawingml/2006/main" xmlns:r="http://schemas.openxmlformats.org/officeDocument/2006/relationships" xmlns:p="http://schemas.openxmlformats.org/presentationml/2006/main">
   <p:cSld>
@@ -25471,7 +25965,7 @@
         <p:spPr>
           <a:xfrm>
             <a:off x="566737" y="1104900"/>
-            <a:ext cx="8382000" cy="2400657"/>
+            <a:ext cx="8382000" cy="1015663"/>
           </a:xfrm>
           <a:prstGeom prst="rect">
             <a:avLst/>
@@ -25528,64 +26022,12 @@
               <a:t>for a unit change in x.</a:t>
             </a:r>
           </a:p>
-          <a:p>
-            <a:pPr algn="l"/>
-            <a:endParaRPr lang="en-US" sz="3000" dirty="0">
-              <a:latin typeface="PFDinTextCompPro-Italic"/>
-              <a:cs typeface="PFDinTextCompPro-Italic"/>
-            </a:endParaRPr>
-          </a:p>
-          <a:p>
-            <a:pPr algn="l"/>
-            <a:r>
-              <a:rPr lang="en-US" sz="3000" dirty="0" smtClean="0">
-                <a:latin typeface="PFDinTextCompPro-Italic"/>
-                <a:cs typeface="PFDinTextCompPro-Italic"/>
-              </a:rPr>
-              <a:t>In logistic regression, </a:t>
-            </a:r>
-            <a:r>
-              <a:rPr lang="en-US" sz="3000" i="1" dirty="0">
-                <a:latin typeface="Symbol" charset="2"/>
-                <a:cs typeface="Symbol" charset="2"/>
-              </a:rPr>
-              <a:t>b</a:t>
-            </a:r>
-            <a:r>
-              <a:rPr lang="en-US" sz="3000" i="1" baseline="-25000" dirty="0">
-                <a:latin typeface="Symbol" charset="2"/>
-                <a:cs typeface="Symbol" charset="2"/>
-              </a:rPr>
-              <a:t>1</a:t>
-            </a:r>
-            <a:r>
-              <a:rPr lang="en-US" sz="3000" dirty="0" smtClean="0">
-                <a:latin typeface="PFDinTextCompPro-Italic"/>
-                <a:cs typeface="PFDinTextCompPro-Italic"/>
-              </a:rPr>
-              <a:t> represents the change in the </a:t>
-            </a:r>
-            <a:r>
-              <a:rPr lang="en-US" sz="3000" b="1" dirty="0" smtClean="0">
-                <a:latin typeface="PFDinTextCompPro-Italic"/>
-                <a:cs typeface="PFDinTextCompPro-Italic"/>
-              </a:rPr>
-              <a:t>log-odds </a:t>
-            </a:r>
-            <a:r>
-              <a:rPr lang="en-US" sz="3000" dirty="0" smtClean="0">
-                <a:latin typeface="PFDinTextCompPro-Italic"/>
-                <a:cs typeface="PFDinTextCompPro-Italic"/>
-              </a:rPr>
-              <a:t>for a unit change in x.</a:t>
-            </a:r>
-          </a:p>
         </p:txBody>
       </p:sp>
     </p:spTree>
     <p:extLst>
       <p:ext uri="{BB962C8B-B14F-4D97-AF65-F5344CB8AC3E}">
-        <p14:creationId xmlns:p14="http://schemas.microsoft.com/office/powerpoint/2010/main" val="1473302683"/>
+        <p14:creationId xmlns:p14="http://schemas.microsoft.com/office/powerpoint/2010/main" val="2143786739"/>
       </p:ext>
     </p:extLst>
   </p:cSld>
@@ -25692,6 +26134,227 @@
         <p:spPr>
           <a:xfrm>
             <a:off x="566737" y="1104900"/>
+            <a:ext cx="8382000" cy="2400657"/>
+          </a:xfrm>
+          <a:prstGeom prst="rect">
+            <a:avLst/>
+          </a:prstGeom>
+          <a:noFill/>
+        </p:spPr>
+        <p:txBody>
+          <a:bodyPr wrap="square" rtlCol="0">
+            <a:spAutoFit/>
+          </a:bodyPr>
+          <a:lstStyle/>
+          <a:p>
+            <a:pPr algn="l"/>
+            <a:r>
+              <a:rPr lang="en-US" sz="3000" dirty="0" smtClean="0">
+                <a:latin typeface="PFDinTextCompPro-Italic"/>
+                <a:cs typeface="PFDinTextCompPro-Italic"/>
+              </a:rPr>
+              <a:t>In linear regression, the parameter </a:t>
+            </a:r>
+            <a:r>
+              <a:rPr lang="en-US" sz="3000" i="1" dirty="0" smtClean="0">
+                <a:latin typeface="Symbol" charset="2"/>
+                <a:cs typeface="Symbol" charset="2"/>
+              </a:rPr>
+              <a:t>b</a:t>
+            </a:r>
+            <a:r>
+              <a:rPr lang="en-US" sz="3000" i="1" baseline="-25000" dirty="0" smtClean="0">
+                <a:latin typeface="Symbol" charset="2"/>
+                <a:cs typeface="Symbol" charset="2"/>
+              </a:rPr>
+              <a:t>1</a:t>
+            </a:r>
+            <a:r>
+              <a:rPr lang="en-US" sz="3000" dirty="0" smtClean="0">
+                <a:latin typeface="PFDinTextCompPro-Italic"/>
+                <a:cs typeface="PFDinTextCompPro-Italic"/>
+              </a:rPr>
+              <a:t> represents the change in the </a:t>
+            </a:r>
+            <a:r>
+              <a:rPr lang="en-US" sz="3000" b="1" dirty="0" smtClean="0">
+                <a:latin typeface="PFDinTextCompPro-Italic"/>
+                <a:cs typeface="PFDinTextCompPro-Italic"/>
+              </a:rPr>
+              <a:t>response variable </a:t>
+            </a:r>
+            <a:r>
+              <a:rPr lang="en-US" sz="3000" dirty="0" smtClean="0">
+                <a:latin typeface="PFDinTextCompPro-Italic"/>
+                <a:cs typeface="PFDinTextCompPro-Italic"/>
+              </a:rPr>
+              <a:t>for a unit change in x.</a:t>
+            </a:r>
+          </a:p>
+          <a:p>
+            <a:pPr algn="l"/>
+            <a:endParaRPr lang="en-US" sz="3000" dirty="0">
+              <a:latin typeface="PFDinTextCompPro-Italic"/>
+              <a:cs typeface="PFDinTextCompPro-Italic"/>
+            </a:endParaRPr>
+          </a:p>
+          <a:p>
+            <a:pPr algn="l"/>
+            <a:r>
+              <a:rPr lang="en-US" sz="3000" dirty="0" smtClean="0">
+                <a:latin typeface="PFDinTextCompPro-Italic"/>
+                <a:cs typeface="PFDinTextCompPro-Italic"/>
+              </a:rPr>
+              <a:t>In logistic regression, </a:t>
+            </a:r>
+            <a:r>
+              <a:rPr lang="en-US" sz="3000" i="1" dirty="0">
+                <a:latin typeface="Symbol" charset="2"/>
+                <a:cs typeface="Symbol" charset="2"/>
+              </a:rPr>
+              <a:t>b</a:t>
+            </a:r>
+            <a:r>
+              <a:rPr lang="en-US" sz="3000" i="1" baseline="-25000" dirty="0">
+                <a:latin typeface="Symbol" charset="2"/>
+                <a:cs typeface="Symbol" charset="2"/>
+              </a:rPr>
+              <a:t>1</a:t>
+            </a:r>
+            <a:r>
+              <a:rPr lang="en-US" sz="3000" dirty="0" smtClean="0">
+                <a:latin typeface="PFDinTextCompPro-Italic"/>
+                <a:cs typeface="PFDinTextCompPro-Italic"/>
+              </a:rPr>
+              <a:t> represents the change in the </a:t>
+            </a:r>
+            <a:r>
+              <a:rPr lang="en-US" sz="3000" b="1" dirty="0" smtClean="0">
+                <a:latin typeface="PFDinTextCompPro-Italic"/>
+                <a:cs typeface="PFDinTextCompPro-Italic"/>
+              </a:rPr>
+              <a:t>log-odds </a:t>
+            </a:r>
+            <a:r>
+              <a:rPr lang="en-US" sz="3000" dirty="0" smtClean="0">
+                <a:latin typeface="PFDinTextCompPro-Italic"/>
+                <a:cs typeface="PFDinTextCompPro-Italic"/>
+              </a:rPr>
+              <a:t>for a unit change in x.</a:t>
+            </a:r>
+          </a:p>
+        </p:txBody>
+      </p:sp>
+    </p:spTree>
+    <p:extLst>
+      <p:ext uri="{BB962C8B-B14F-4D97-AF65-F5344CB8AC3E}">
+        <p14:creationId xmlns:p14="http://schemas.microsoft.com/office/powerpoint/2010/main" val="1473302683"/>
+      </p:ext>
+    </p:extLst>
+  </p:cSld>
+  <p:clrMapOvr>
+    <a:masterClrMapping/>
+  </p:clrMapOvr>
+  <p:transition/>
+  <p:timing>
+    <p:tnLst>
+      <p:par>
+        <p:cTn id="1" dur="indefinite" restart="never" nodeType="tmRoot"/>
+      </p:par>
+    </p:tnLst>
+  </p:timing>
+</p:sld>
+</file>
+
+<file path=ppt/slides/slide36.xml><?xml version="1.0" encoding="utf-8"?>
+<p:sld xmlns:a="http://schemas.openxmlformats.org/drawingml/2006/main" xmlns:r="http://schemas.openxmlformats.org/officeDocument/2006/relationships" xmlns:p="http://schemas.openxmlformats.org/presentationml/2006/main">
+  <p:cSld>
+    <p:spTree>
+      <p:nvGrpSpPr>
+        <p:cNvPr id="1" name=""/>
+        <p:cNvGrpSpPr/>
+        <p:nvPr/>
+      </p:nvGrpSpPr>
+      <p:grpSpPr>
+        <a:xfrm>
+          <a:off x="0" y="0"/>
+          <a:ext cx="0" cy="0"/>
+          <a:chOff x="0" y="0"/>
+          <a:chExt cx="0" cy="0"/>
+        </a:xfrm>
+      </p:grpSpPr>
+      <p:sp>
+        <p:nvSpPr>
+          <p:cNvPr id="4" name="Content Placeholder 3"/>
+          <p:cNvSpPr>
+            <a:spLocks noGrp="1"/>
+          </p:cNvSpPr>
+          <p:nvPr>
+            <p:ph sz="quarter" idx="11"/>
+          </p:nvPr>
+        </p:nvSpPr>
+        <p:spPr>
+          <a:xfrm>
+            <a:off x="414337" y="495300"/>
+            <a:ext cx="6400800" cy="304800"/>
+          </a:xfrm>
+        </p:spPr>
+        <p:txBody>
+          <a:bodyPr/>
+          <a:lstStyle/>
+          <a:p>
+            <a:pPr eaLnBrk="1" hangingPunct="1">
+              <a:lnSpc>
+                <a:spcPts val="2448"/>
+              </a:lnSpc>
+              <a:defRPr/>
+            </a:pPr>
+            <a:r>
+              <a:rPr lang="en-US" dirty="0" smtClean="0"/>
+              <a:t>Interpreting results</a:t>
+            </a:r>
+            <a:endParaRPr lang="en-US" dirty="0"/>
+          </a:p>
+        </p:txBody>
+      </p:sp>
+      <p:sp>
+        <p:nvSpPr>
+          <p:cNvPr id="8" name="Slide Number Placeholder 3"/>
+          <p:cNvSpPr>
+            <a:spLocks noGrp="1"/>
+          </p:cNvSpPr>
+          <p:nvPr>
+            <p:ph type="sldNum" sz="quarter" idx="13"/>
+          </p:nvPr>
+        </p:nvSpPr>
+        <p:spPr/>
+        <p:txBody>
+          <a:bodyPr/>
+          <a:lstStyle/>
+          <a:p>
+            <a:pPr>
+              <a:defRPr/>
+            </a:pPr>
+            <a:fld id="{BD5AD749-DAD1-6A4A-A2AA-CB20EAD0AEB7}" type="slidenum">
+              <a:rPr lang="en-US"/>
+              <a:pPr>
+                <a:defRPr/>
+              </a:pPr>
+              <a:t>36</a:t>
+            </a:fld>
+            <a:endParaRPr lang="en-US"/>
+          </a:p>
+        </p:txBody>
+      </p:sp>
+      <p:sp>
+        <p:nvSpPr>
+          <p:cNvPr id="9" name="TextBox 8"/>
+          <p:cNvSpPr txBox="1"/>
+          <p:nvPr/>
+        </p:nvSpPr>
+        <p:spPr>
+          <a:xfrm>
+            <a:off x="566737" y="1104900"/>
             <a:ext cx="8382000" cy="3785652"/>
           </a:xfrm>
           <a:prstGeom prst="rect">
@@ -25856,7 +26519,7 @@
           <a:graphicData uri="http://schemas.openxmlformats.org/presentationml/2006/ole">
             <mc:AlternateContent xmlns:mc="http://schemas.openxmlformats.org/markup-compatibility/2006">
               <mc:Choice xmlns:v="urn:schemas-microsoft-com:vml" Requires="v">
-                <p:oleObj spid="_x0000_s44078" name="Equation" r:id="rId4" imgW="215640" imgH="203040" progId="Equation.3">
+                <p:oleObj spid="_x0000_s44079" name="Equation" r:id="rId4" imgW="215640" imgH="203040" progId="Equation.3">
                   <p:embed/>
                 </p:oleObj>
               </mc:Choice>
@@ -25919,161 +26582,6 @@
 </p:sld>
 </file>
 
-<file path=ppt/slides/slide36.xml><?xml version="1.0" encoding="utf-8"?>
-<p:sld xmlns:a="http://schemas.openxmlformats.org/drawingml/2006/main" xmlns:r="http://schemas.openxmlformats.org/officeDocument/2006/relationships" xmlns:p="http://schemas.openxmlformats.org/presentationml/2006/main">
-  <p:cSld>
-    <p:spTree>
-      <p:nvGrpSpPr>
-        <p:cNvPr id="1" name=""/>
-        <p:cNvGrpSpPr/>
-        <p:nvPr/>
-      </p:nvGrpSpPr>
-      <p:grpSpPr>
-        <a:xfrm>
-          <a:off x="0" y="0"/>
-          <a:ext cx="0" cy="0"/>
-          <a:chOff x="0" y="0"/>
-          <a:chExt cx="0" cy="0"/>
-        </a:xfrm>
-      </p:grpSpPr>
-      <p:sp>
-        <p:nvSpPr>
-          <p:cNvPr id="4" name="Content Placeholder 3"/>
-          <p:cNvSpPr>
-            <a:spLocks noGrp="1"/>
-          </p:cNvSpPr>
-          <p:nvPr>
-            <p:ph sz="quarter" idx="11"/>
-          </p:nvPr>
-        </p:nvSpPr>
-        <p:spPr>
-          <a:xfrm>
-            <a:off x="414337" y="495300"/>
-            <a:ext cx="6400800" cy="304800"/>
-          </a:xfrm>
-        </p:spPr>
-        <p:txBody>
-          <a:bodyPr/>
-          <a:lstStyle/>
-          <a:p>
-            <a:pPr eaLnBrk="1" hangingPunct="1">
-              <a:lnSpc>
-                <a:spcPts val="2448"/>
-              </a:lnSpc>
-              <a:defRPr/>
-            </a:pPr>
-            <a:r>
-              <a:rPr lang="en-US" dirty="0" smtClean="0"/>
-              <a:t>Interpreting results</a:t>
-            </a:r>
-            <a:endParaRPr lang="en-US" dirty="0"/>
-          </a:p>
-        </p:txBody>
-      </p:sp>
-      <p:sp>
-        <p:nvSpPr>
-          <p:cNvPr id="8" name="Slide Number Placeholder 3"/>
-          <p:cNvSpPr>
-            <a:spLocks noGrp="1"/>
-          </p:cNvSpPr>
-          <p:nvPr>
-            <p:ph type="sldNum" sz="quarter" idx="13"/>
-          </p:nvPr>
-        </p:nvSpPr>
-        <p:spPr/>
-        <p:txBody>
-          <a:bodyPr/>
-          <a:lstStyle/>
-          <a:p>
-            <a:pPr>
-              <a:defRPr/>
-            </a:pPr>
-            <a:fld id="{BD5AD749-DAD1-6A4A-A2AA-CB20EAD0AEB7}" type="slidenum">
-              <a:rPr lang="en-US"/>
-              <a:pPr>
-                <a:defRPr/>
-              </a:pPr>
-              <a:t>36</a:t>
-            </a:fld>
-            <a:endParaRPr lang="en-US"/>
-          </a:p>
-        </p:txBody>
-      </p:sp>
-      <p:sp>
-        <p:nvSpPr>
-          <p:cNvPr id="9" name="TextBox 8"/>
-          <p:cNvSpPr txBox="1"/>
-          <p:nvPr/>
-        </p:nvSpPr>
-        <p:spPr>
-          <a:xfrm>
-            <a:off x="566737" y="1104900"/>
-            <a:ext cx="8382000" cy="1477328"/>
-          </a:xfrm>
-          <a:prstGeom prst="rect">
-            <a:avLst/>
-          </a:prstGeom>
-          <a:noFill/>
-        </p:spPr>
-        <p:txBody>
-          <a:bodyPr wrap="square" rtlCol="0">
-            <a:spAutoFit/>
-          </a:bodyPr>
-          <a:lstStyle/>
-          <a:p>
-            <a:pPr algn="l"/>
-            <a:r>
-              <a:rPr lang="en-US" sz="3000" dirty="0" smtClean="0">
-                <a:latin typeface="PFDinTextCompPro-Italic"/>
-                <a:cs typeface="PFDinTextCompPro-Italic"/>
-              </a:rPr>
-              <a:t>Q: How to determine whether a coefficient is significant?</a:t>
-            </a:r>
-          </a:p>
-          <a:p>
-            <a:pPr algn="l"/>
-            <a:endParaRPr lang="en-US" sz="3000" dirty="0" smtClean="0">
-              <a:latin typeface="PFDinTextCompPro-Italic"/>
-              <a:cs typeface="PFDinTextCompPro-Italic"/>
-            </a:endParaRPr>
-          </a:p>
-          <a:p>
-            <a:pPr algn="l"/>
-            <a:r>
-              <a:rPr lang="en-US" sz="3000" dirty="0" smtClean="0">
-                <a:latin typeface="PFDinTextCompPro-Italic"/>
-                <a:cs typeface="PFDinTextCompPro-Italic"/>
-              </a:rPr>
-              <a:t>A: This is based off of the p-value, just as with the linear regression</a:t>
-            </a:r>
-            <a:endParaRPr lang="en-US" sz="3000" dirty="0">
-              <a:latin typeface="PFDinTextCompPro-Italic"/>
-              <a:cs typeface="PFDinTextCompPro-Italic"/>
-            </a:endParaRPr>
-          </a:p>
-        </p:txBody>
-      </p:sp>
-    </p:spTree>
-    <p:extLst>
-      <p:ext uri="{BB962C8B-B14F-4D97-AF65-F5344CB8AC3E}">
-        <p14:creationId xmlns:p14="http://schemas.microsoft.com/office/powerpoint/2010/main" val="2998962859"/>
-      </p:ext>
-    </p:extLst>
-  </p:cSld>
-  <p:clrMapOvr>
-    <a:masterClrMapping/>
-  </p:clrMapOvr>
-  <p:transition/>
-  <p:timing>
-    <p:tnLst>
-      <p:par>
-        <p:cTn id="1" dur="indefinite" restart="never" nodeType="tmRoot"/>
-      </p:par>
-    </p:tnLst>
-  </p:timing>
-</p:sld>
-</file>
-
 <file path=ppt/slides/slide37.xml><?xml version="1.0" encoding="utf-8"?>
 <p:sld xmlns:a="http://schemas.openxmlformats.org/drawingml/2006/main" xmlns:r="http://schemas.openxmlformats.org/officeDocument/2006/relationships" xmlns:p="http://schemas.openxmlformats.org/presentationml/2006/main">
   <p:cSld>
@@ -26178,26 +26686,40 @@
           <a:p>
             <a:pPr algn="l"/>
             <a:r>
-              <a:rPr lang="en-US" sz="3000" b="1" dirty="0">
+              <a:rPr lang="en-US" sz="3000" dirty="0" smtClean="0">
                 <a:latin typeface="PFDinTextCompPro-Italic"/>
                 <a:cs typeface="PFDinTextCompPro-Italic"/>
               </a:rPr>
-              <a:t>Example: </a:t>
-            </a:r>
-            <a:r>
-              <a:rPr lang="en-US" sz="3000" dirty="0">
+              <a:t>Q: How to determine whether a coefficient is significant?</a:t>
+            </a:r>
+          </a:p>
+          <a:p>
+            <a:pPr algn="l"/>
+            <a:endParaRPr lang="en-US" sz="3000" dirty="0" smtClean="0">
+              <a:latin typeface="PFDinTextCompPro-Italic"/>
+              <a:cs typeface="PFDinTextCompPro-Italic"/>
+            </a:endParaRPr>
+          </a:p>
+          <a:p>
+            <a:pPr algn="l"/>
+            <a:r>
+              <a:rPr lang="en-US" sz="3000" dirty="0" smtClean="0">
                 <a:latin typeface="PFDinTextCompPro-Italic"/>
                 <a:cs typeface="PFDinTextCompPro-Italic"/>
               </a:rPr>
-              <a:t>Suppose we are interested in mobile purchase behavior. Let y be a class label denoting purchase/no purchase, and let x denote whether phone was an iPhone.</a:t>
-            </a:r>
+              <a:t>A: This is based off of the p-value, just as with the linear regression</a:t>
+            </a:r>
+            <a:endParaRPr lang="en-US" sz="3000" dirty="0">
+              <a:latin typeface="PFDinTextCompPro-Italic"/>
+              <a:cs typeface="PFDinTextCompPro-Italic"/>
+            </a:endParaRPr>
           </a:p>
         </p:txBody>
       </p:sp>
     </p:spTree>
     <p:extLst>
       <p:ext uri="{BB962C8B-B14F-4D97-AF65-F5344CB8AC3E}">
-        <p14:creationId xmlns:p14="http://schemas.microsoft.com/office/powerpoint/2010/main" val="1966038255"/>
+        <p14:creationId xmlns:p14="http://schemas.microsoft.com/office/powerpoint/2010/main" val="2998962859"/>
       </p:ext>
     </p:extLst>
   </p:cSld>
@@ -26304,7 +26826,7 @@
         <p:spPr>
           <a:xfrm>
             <a:off x="566737" y="1104900"/>
-            <a:ext cx="8382000" cy="2400657"/>
+            <a:ext cx="8382000" cy="1477328"/>
           </a:xfrm>
           <a:prstGeom prst="rect">
             <a:avLst/>
@@ -26333,50 +26855,12 @@
               <a:t>Suppose we are interested in mobile purchase behavior. Let y be a class label denoting purchase/no purchase, and let x denote whether phone was an iPhone.</a:t>
             </a:r>
           </a:p>
-          <a:p>
-            <a:pPr algn="l"/>
-            <a:endParaRPr lang="en-US" sz="3000" dirty="0">
-              <a:latin typeface="PFDinTextCompPro-Italic"/>
-              <a:cs typeface="PFDinTextCompPro-Italic"/>
-            </a:endParaRPr>
-          </a:p>
-          <a:p>
-            <a:pPr algn="l"/>
-            <a:r>
-              <a:rPr lang="en-US" sz="3000" dirty="0" smtClean="0">
-                <a:latin typeface="PFDinTextCompPro-Italic"/>
-                <a:cs typeface="PFDinTextCompPro-Italic"/>
-              </a:rPr>
-              <a:t>We perform a logistic regression, and we get </a:t>
-            </a:r>
-            <a:r>
-              <a:rPr lang="en-US" sz="3000" i="1" dirty="0" smtClean="0">
-                <a:latin typeface="Symbol" charset="2"/>
-                <a:cs typeface="Symbol" charset="2"/>
-              </a:rPr>
-              <a:t>b</a:t>
-            </a:r>
-            <a:r>
-              <a:rPr lang="en-US" sz="3000" i="1" baseline="-25000" dirty="0" smtClean="0">
-                <a:latin typeface="Symbol" charset="2"/>
-                <a:cs typeface="Symbol" charset="2"/>
-              </a:rPr>
-              <a:t>1 </a:t>
-            </a:r>
-            <a:r>
-              <a:rPr lang="en-US" sz="3000" dirty="0" smtClean="0">
-                <a:latin typeface="PFDinTextCompPro-Italic"/>
-                <a:cs typeface="PFDinTextCompPro-Italic"/>
-              </a:rPr>
-              <a:t>= 0.693. </a:t>
-            </a:r>
-          </a:p>
         </p:txBody>
       </p:sp>
     </p:spTree>
     <p:extLst>
       <p:ext uri="{BB962C8B-B14F-4D97-AF65-F5344CB8AC3E}">
-        <p14:creationId xmlns:p14="http://schemas.microsoft.com/office/powerpoint/2010/main" val="1173799544"/>
+        <p14:creationId xmlns:p14="http://schemas.microsoft.com/office/powerpoint/2010/main" val="1966038255"/>
       </p:ext>
     </p:extLst>
   </p:cSld>
@@ -26483,7 +26967,7 @@
         <p:spPr>
           <a:xfrm>
             <a:off x="566737" y="1104900"/>
-            <a:ext cx="8382000" cy="3323987"/>
+            <a:ext cx="8382000" cy="2400657"/>
           </a:xfrm>
           <a:prstGeom prst="rect">
             <a:avLst/>
@@ -26550,29 +27034,12 @@
               <a:t>= 0.693. </a:t>
             </a:r>
           </a:p>
-          <a:p>
-            <a:pPr algn="l"/>
-            <a:endParaRPr lang="en-US" sz="3000" dirty="0">
-              <a:latin typeface="PFDinTextCompPro-Italic"/>
-              <a:cs typeface="PFDinTextCompPro-Italic"/>
-            </a:endParaRPr>
-          </a:p>
-          <a:p>
-            <a:pPr algn="l"/>
-            <a:r>
-              <a:rPr lang="en-US" sz="3000" dirty="0" smtClean="0">
-                <a:latin typeface="PFDinTextCompPro-Italic"/>
-                <a:cs typeface="PFDinTextCompPro-Italic"/>
-              </a:rPr>
-              <a:t>Q: What does this mean?</a:t>
-            </a:r>
-          </a:p>
         </p:txBody>
       </p:sp>
     </p:spTree>
     <p:extLst>
       <p:ext uri="{BB962C8B-B14F-4D97-AF65-F5344CB8AC3E}">
-        <p14:creationId xmlns:p14="http://schemas.microsoft.com/office/powerpoint/2010/main" val="2020803717"/>
+        <p14:creationId xmlns:p14="http://schemas.microsoft.com/office/powerpoint/2010/main" val="1173799544"/>
       </p:ext>
     </p:extLst>
   </p:cSld>
@@ -27029,7 +27496,7 @@
         <p:spPr>
           <a:xfrm>
             <a:off x="566737" y="1104900"/>
-            <a:ext cx="8382000" cy="3785652"/>
+            <a:ext cx="8382000" cy="3323987"/>
           </a:xfrm>
           <a:prstGeom prst="rect">
             <a:avLst/>
@@ -27044,46 +27511,18 @@
           <a:p>
             <a:pPr algn="l"/>
             <a:r>
-              <a:rPr lang="en-US" sz="3000" b="1" dirty="0" smtClean="0">
+              <a:rPr lang="en-US" sz="3000" b="1" dirty="0">
                 <a:latin typeface="PFDinTextCompPro-Italic"/>
                 <a:cs typeface="PFDinTextCompPro-Italic"/>
               </a:rPr>
               <a:t>Example: </a:t>
-            </a:r>
-            <a:r>
-              <a:rPr lang="en-US" sz="3000" dirty="0" smtClean="0">
-                <a:latin typeface="PFDinTextCompPro-Italic"/>
-                <a:cs typeface="PFDinTextCompPro-Italic"/>
-              </a:rPr>
-              <a:t>Suppose </a:t>
             </a:r>
             <a:r>
               <a:rPr lang="en-US" sz="3000" dirty="0">
                 <a:latin typeface="PFDinTextCompPro-Italic"/>
                 <a:cs typeface="PFDinTextCompPro-Italic"/>
               </a:rPr>
-              <a:t>we are interested in </a:t>
-            </a:r>
-            <a:r>
-              <a:rPr lang="en-US" sz="3000" dirty="0" smtClean="0">
-                <a:latin typeface="PFDinTextCompPro-Italic"/>
-                <a:cs typeface="PFDinTextCompPro-Italic"/>
-              </a:rPr>
-              <a:t>mobile purchase behavior. </a:t>
-            </a:r>
-            <a:r>
-              <a:rPr lang="en-US" sz="3000" dirty="0">
-                <a:latin typeface="PFDinTextCompPro-Italic"/>
-                <a:cs typeface="PFDinTextCompPro-Italic"/>
-              </a:rPr>
-              <a:t>Let y be a class label denoting purchase/no purchase, and let x denote </a:t>
-            </a:r>
-            <a:r>
-              <a:rPr lang="en-US" sz="3000" dirty="0" smtClean="0">
-                <a:latin typeface="PFDinTextCompPro-Italic"/>
-                <a:cs typeface="PFDinTextCompPro-Italic"/>
-              </a:rPr>
-              <a:t>whether phone was an iPhone.</a:t>
+              <a:t>Suppose we are interested in mobile purchase behavior. Let y be a class label denoting purchase/no purchase, and let x denote whether phone was an iPhone.</a:t>
             </a:r>
           </a:p>
           <a:p>
@@ -27138,21 +27577,7 @@
                 <a:latin typeface="PFDinTextCompPro-Italic"/>
                 <a:cs typeface="PFDinTextCompPro-Italic"/>
               </a:rPr>
-              <a:t>In this case the odds ratio is </a:t>
-            </a:r>
-            <a:r>
-              <a:rPr lang="en-US" sz="3000" dirty="0" err="1" smtClean="0">
-                <a:latin typeface="PFDinTextCompPro-Italic"/>
-                <a:cs typeface="PFDinTextCompPro-Italic"/>
-              </a:rPr>
-              <a:t>exp</a:t>
-            </a:r>
-            <a:r>
-              <a:rPr lang="en-US" sz="3000" dirty="0" smtClean="0">
-                <a:latin typeface="PFDinTextCompPro-Italic"/>
-                <a:cs typeface="PFDinTextCompPro-Italic"/>
-              </a:rPr>
-              <a:t>(0.693) = 2, meaning the likelihood of purchase is twice as high if the phone is an iPhone.</a:t>
+              <a:t>Q: What does this mean?</a:t>
             </a:r>
           </a:p>
         </p:txBody>
@@ -27160,7 +27585,7 @@
     </p:spTree>
     <p:extLst>
       <p:ext uri="{BB962C8B-B14F-4D97-AF65-F5344CB8AC3E}">
-        <p14:creationId xmlns:p14="http://schemas.microsoft.com/office/powerpoint/2010/main" val="386753769"/>
+        <p14:creationId xmlns:p14="http://schemas.microsoft.com/office/powerpoint/2010/main" val="2020803717"/>
       </p:ext>
     </p:extLst>
   </p:cSld>
@@ -27267,6 +27692,244 @@
         <p:spPr>
           <a:xfrm>
             <a:off x="566737" y="1104900"/>
+            <a:ext cx="8382000" cy="3785652"/>
+          </a:xfrm>
+          <a:prstGeom prst="rect">
+            <a:avLst/>
+          </a:prstGeom>
+          <a:noFill/>
+        </p:spPr>
+        <p:txBody>
+          <a:bodyPr wrap="square" rtlCol="0">
+            <a:spAutoFit/>
+          </a:bodyPr>
+          <a:lstStyle/>
+          <a:p>
+            <a:pPr algn="l"/>
+            <a:r>
+              <a:rPr lang="en-US" sz="3000" b="1" dirty="0" smtClean="0">
+                <a:latin typeface="PFDinTextCompPro-Italic"/>
+                <a:cs typeface="PFDinTextCompPro-Italic"/>
+              </a:rPr>
+              <a:t>Example: </a:t>
+            </a:r>
+            <a:r>
+              <a:rPr lang="en-US" sz="3000" dirty="0" smtClean="0">
+                <a:latin typeface="PFDinTextCompPro-Italic"/>
+                <a:cs typeface="PFDinTextCompPro-Italic"/>
+              </a:rPr>
+              <a:t>Suppose </a:t>
+            </a:r>
+            <a:r>
+              <a:rPr lang="en-US" sz="3000" dirty="0">
+                <a:latin typeface="PFDinTextCompPro-Italic"/>
+                <a:cs typeface="PFDinTextCompPro-Italic"/>
+              </a:rPr>
+              <a:t>we are interested in </a:t>
+            </a:r>
+            <a:r>
+              <a:rPr lang="en-US" sz="3000" dirty="0" smtClean="0">
+                <a:latin typeface="PFDinTextCompPro-Italic"/>
+                <a:cs typeface="PFDinTextCompPro-Italic"/>
+              </a:rPr>
+              <a:t>mobile purchase behavior. </a:t>
+            </a:r>
+            <a:r>
+              <a:rPr lang="en-US" sz="3000" dirty="0">
+                <a:latin typeface="PFDinTextCompPro-Italic"/>
+                <a:cs typeface="PFDinTextCompPro-Italic"/>
+              </a:rPr>
+              <a:t>Let y be a class label denoting purchase/no purchase, and let x denote </a:t>
+            </a:r>
+            <a:r>
+              <a:rPr lang="en-US" sz="3000" dirty="0" smtClean="0">
+                <a:latin typeface="PFDinTextCompPro-Italic"/>
+                <a:cs typeface="PFDinTextCompPro-Italic"/>
+              </a:rPr>
+              <a:t>whether phone was an iPhone.</a:t>
+            </a:r>
+          </a:p>
+          <a:p>
+            <a:pPr algn="l"/>
+            <a:endParaRPr lang="en-US" sz="3000" dirty="0">
+              <a:latin typeface="PFDinTextCompPro-Italic"/>
+              <a:cs typeface="PFDinTextCompPro-Italic"/>
+            </a:endParaRPr>
+          </a:p>
+          <a:p>
+            <a:pPr algn="l"/>
+            <a:r>
+              <a:rPr lang="en-US" sz="3000" dirty="0" smtClean="0">
+                <a:latin typeface="PFDinTextCompPro-Italic"/>
+                <a:cs typeface="PFDinTextCompPro-Italic"/>
+              </a:rPr>
+              <a:t>We perform a logistic regression, and we get </a:t>
+            </a:r>
+            <a:r>
+              <a:rPr lang="en-US" sz="3000" i="1" dirty="0" smtClean="0">
+                <a:latin typeface="Symbol" charset="2"/>
+                <a:cs typeface="Symbol" charset="2"/>
+              </a:rPr>
+              <a:t>b</a:t>
+            </a:r>
+            <a:r>
+              <a:rPr lang="en-US" sz="3000" i="1" baseline="-25000" dirty="0" smtClean="0">
+                <a:latin typeface="Symbol" charset="2"/>
+                <a:cs typeface="Symbol" charset="2"/>
+              </a:rPr>
+              <a:t>1 </a:t>
+            </a:r>
+            <a:r>
+              <a:rPr lang="en-US" sz="3000" dirty="0" smtClean="0">
+                <a:latin typeface="PFDinTextCompPro-Italic"/>
+                <a:cs typeface="PFDinTextCompPro-Italic"/>
+              </a:rPr>
+              <a:t>= 0.693. </a:t>
+            </a:r>
+          </a:p>
+          <a:p>
+            <a:pPr algn="l"/>
+            <a:endParaRPr lang="en-US" sz="3000" dirty="0">
+              <a:latin typeface="PFDinTextCompPro-Italic"/>
+              <a:cs typeface="PFDinTextCompPro-Italic"/>
+            </a:endParaRPr>
+          </a:p>
+          <a:p>
+            <a:pPr algn="l"/>
+            <a:r>
+              <a:rPr lang="en-US" sz="3000" dirty="0" smtClean="0">
+                <a:latin typeface="PFDinTextCompPro-Italic"/>
+                <a:cs typeface="PFDinTextCompPro-Italic"/>
+              </a:rPr>
+              <a:t>In this case the odds ratio is </a:t>
+            </a:r>
+            <a:r>
+              <a:rPr lang="en-US" sz="3000" dirty="0" err="1" smtClean="0">
+                <a:latin typeface="PFDinTextCompPro-Italic"/>
+                <a:cs typeface="PFDinTextCompPro-Italic"/>
+              </a:rPr>
+              <a:t>exp</a:t>
+            </a:r>
+            <a:r>
+              <a:rPr lang="en-US" sz="3000" dirty="0" smtClean="0">
+                <a:latin typeface="PFDinTextCompPro-Italic"/>
+                <a:cs typeface="PFDinTextCompPro-Italic"/>
+              </a:rPr>
+              <a:t>(0.693) = 2, meaning the likelihood of purchase is twice as high if the phone is an iPhone.</a:t>
+            </a:r>
+          </a:p>
+        </p:txBody>
+      </p:sp>
+    </p:spTree>
+    <p:extLst>
+      <p:ext uri="{BB962C8B-B14F-4D97-AF65-F5344CB8AC3E}">
+        <p14:creationId xmlns:p14="http://schemas.microsoft.com/office/powerpoint/2010/main" val="386753769"/>
+      </p:ext>
+    </p:extLst>
+  </p:cSld>
+  <p:clrMapOvr>
+    <a:masterClrMapping/>
+  </p:clrMapOvr>
+  <p:transition/>
+  <p:timing>
+    <p:tnLst>
+      <p:par>
+        <p:cTn id="1" dur="indefinite" restart="never" nodeType="tmRoot"/>
+      </p:par>
+    </p:tnLst>
+  </p:timing>
+</p:sld>
+</file>
+
+<file path=ppt/slides/slide42.xml><?xml version="1.0" encoding="utf-8"?>
+<p:sld xmlns:a="http://schemas.openxmlformats.org/drawingml/2006/main" xmlns:r="http://schemas.openxmlformats.org/officeDocument/2006/relationships" xmlns:p="http://schemas.openxmlformats.org/presentationml/2006/main">
+  <p:cSld>
+    <p:spTree>
+      <p:nvGrpSpPr>
+        <p:cNvPr id="1" name=""/>
+        <p:cNvGrpSpPr/>
+        <p:nvPr/>
+      </p:nvGrpSpPr>
+      <p:grpSpPr>
+        <a:xfrm>
+          <a:off x="0" y="0"/>
+          <a:ext cx="0" cy="0"/>
+          <a:chOff x="0" y="0"/>
+          <a:chExt cx="0" cy="0"/>
+        </a:xfrm>
+      </p:grpSpPr>
+      <p:sp>
+        <p:nvSpPr>
+          <p:cNvPr id="4" name="Content Placeholder 3"/>
+          <p:cNvSpPr>
+            <a:spLocks noGrp="1"/>
+          </p:cNvSpPr>
+          <p:nvPr>
+            <p:ph sz="quarter" idx="11"/>
+          </p:nvPr>
+        </p:nvSpPr>
+        <p:spPr>
+          <a:xfrm>
+            <a:off x="414337" y="495300"/>
+            <a:ext cx="6400800" cy="304800"/>
+          </a:xfrm>
+        </p:spPr>
+        <p:txBody>
+          <a:bodyPr/>
+          <a:lstStyle/>
+          <a:p>
+            <a:pPr eaLnBrk="1" hangingPunct="1">
+              <a:lnSpc>
+                <a:spcPts val="2448"/>
+              </a:lnSpc>
+              <a:defRPr/>
+            </a:pPr>
+            <a:r>
+              <a:rPr lang="en-US" dirty="0" smtClean="0"/>
+              <a:t>Interpreting results</a:t>
+            </a:r>
+            <a:endParaRPr lang="en-US" dirty="0"/>
+          </a:p>
+        </p:txBody>
+      </p:sp>
+      <p:sp>
+        <p:nvSpPr>
+          <p:cNvPr id="8" name="Slide Number Placeholder 3"/>
+          <p:cNvSpPr>
+            <a:spLocks noGrp="1"/>
+          </p:cNvSpPr>
+          <p:nvPr>
+            <p:ph type="sldNum" sz="quarter" idx="13"/>
+          </p:nvPr>
+        </p:nvSpPr>
+        <p:spPr/>
+        <p:txBody>
+          <a:bodyPr/>
+          <a:lstStyle/>
+          <a:p>
+            <a:pPr>
+              <a:defRPr/>
+            </a:pPr>
+            <a:fld id="{BD5AD749-DAD1-6A4A-A2AA-CB20EAD0AEB7}" type="slidenum">
+              <a:rPr lang="en-US"/>
+              <a:pPr>
+                <a:defRPr/>
+              </a:pPr>
+              <a:t>42</a:t>
+            </a:fld>
+            <a:endParaRPr lang="en-US"/>
+          </a:p>
+        </p:txBody>
+      </p:sp>
+      <p:sp>
+        <p:nvSpPr>
+          <p:cNvPr id="9" name="TextBox 8"/>
+          <p:cNvSpPr txBox="1"/>
+          <p:nvPr/>
+        </p:nvSpPr>
+        <p:spPr>
+          <a:xfrm>
+            <a:off x="566737" y="1104900"/>
             <a:ext cx="8382000" cy="1015663"/>
           </a:xfrm>
           <a:prstGeom prst="rect">
@@ -27313,7 +27976,7 @@
           <a:graphicData uri="http://schemas.openxmlformats.org/presentationml/2006/ole">
             <mc:AlternateContent xmlns:mc="http://schemas.openxmlformats.org/markup-compatibility/2006">
               <mc:Choice xmlns:v="urn:schemas-microsoft-com:vml" Requires="v">
-                <p:oleObj spid="_x0000_s47146" name="Equation" r:id="rId4" imgW="2425680" imgH="393480" progId="Equation.3">
+                <p:oleObj spid="_x0000_s47147" name="Equation" r:id="rId4" imgW="2425680" imgH="393480" progId="Equation.3">
                   <p:embed/>
                 </p:oleObj>
               </mc:Choice>
@@ -27480,7 +28143,7 @@
 </p:sld>
 </file>
 
-<file path=ppt/slides/slide42.xml><?xml version="1.0" encoding="utf-8"?>
+<file path=ppt/slides/slide43.xml><?xml version="1.0" encoding="utf-8"?>
 <p:sld xmlns:a="http://schemas.openxmlformats.org/drawingml/2006/main" xmlns:r="http://schemas.openxmlformats.org/officeDocument/2006/relationships" xmlns:p="http://schemas.openxmlformats.org/presentationml/2006/main">
   <p:cSld>
     <p:spTree>
@@ -27554,7 +28217,7 @@
               <a:pPr>
                 <a:defRPr/>
               </a:pPr>
-              <a:t>42</a:t>
+              <a:t>43</a:t>
             </a:fld>
             <a:endParaRPr lang="en-US"/>
           </a:p>
@@ -27615,7 +28278,7 @@
           <a:graphicData uri="http://schemas.openxmlformats.org/presentationml/2006/ole">
             <mc:AlternateContent xmlns:mc="http://schemas.openxmlformats.org/markup-compatibility/2006">
               <mc:Choice xmlns:v="urn:schemas-microsoft-com:vml" Requires="v">
-                <p:oleObj spid="_x0000_s48208" name="Equation" r:id="rId4" imgW="2425680" imgH="393480" progId="Equation.3">
+                <p:oleObj spid="_x0000_s48210" name="Equation" r:id="rId4" imgW="2425680" imgH="393480" progId="Equation.3">
                   <p:embed/>
                 </p:oleObj>
               </mc:Choice>
@@ -27698,7 +28361,7 @@
           <a:graphicData uri="http://schemas.openxmlformats.org/presentationml/2006/ole">
             <mc:AlternateContent xmlns:mc="http://schemas.openxmlformats.org/markup-compatibility/2006">
               <mc:Choice xmlns:v="urn:schemas-microsoft-com:vml" Requires="v">
-                <p:oleObj spid="_x0000_s48209" name="Equation" r:id="rId6" imgW="1523880" imgH="444240" progId="Equation.3">
+                <p:oleObj spid="_x0000_s48211" name="Equation" r:id="rId6" imgW="1523880" imgH="444240" progId="Equation.3">
                   <p:embed/>
                 </p:oleObj>
               </mc:Choice>
@@ -27858,7 +28521,7 @@
 </p:sld>
 </file>
 
-<file path=ppt/slides/slide43.xml><?xml version="1.0" encoding="utf-8"?>
+<file path=ppt/slides/slide44.xml><?xml version="1.0" encoding="utf-8"?>
 <p:sld xmlns:a="http://schemas.openxmlformats.org/drawingml/2006/main" xmlns:r="http://schemas.openxmlformats.org/officeDocument/2006/relationships" xmlns:p="http://schemas.openxmlformats.org/presentationml/2006/main">
   <p:cSld>
     <p:spTree>
@@ -27968,7 +28631,7 @@
 </p:sld>
 </file>
 
-<file path=ppt/slides/slide44.xml><?xml version="1.0" encoding="utf-8"?>
+<file path=ppt/slides/slide45.xml><?xml version="1.0" encoding="utf-8"?>
 <p:sld xmlns:a="http://schemas.openxmlformats.org/drawingml/2006/main" xmlns:r="http://schemas.openxmlformats.org/officeDocument/2006/relationships" xmlns:p="http://schemas.openxmlformats.org/presentationml/2006/main">
   <p:cSld>
     <p:spTree>
@@ -28042,7 +28705,7 @@
               <a:pPr>
                 <a:defRPr/>
               </a:pPr>
-              <a:t>44</a:t>
+              <a:t>45</a:t>
             </a:fld>
             <a:endParaRPr lang="en-US"/>
           </a:p>
@@ -28274,211 +28937,6 @@
 </p:sld>
 </file>
 
-<file path=ppt/slides/slide45.xml><?xml version="1.0" encoding="utf-8"?>
-<p:sld xmlns:a="http://schemas.openxmlformats.org/drawingml/2006/main" xmlns:r="http://schemas.openxmlformats.org/officeDocument/2006/relationships" xmlns:p="http://schemas.openxmlformats.org/presentationml/2006/main">
-  <p:cSld>
-    <p:spTree>
-      <p:nvGrpSpPr>
-        <p:cNvPr id="1" name=""/>
-        <p:cNvGrpSpPr/>
-        <p:nvPr/>
-      </p:nvGrpSpPr>
-      <p:grpSpPr>
-        <a:xfrm>
-          <a:off x="0" y="0"/>
-          <a:ext cx="0" cy="0"/>
-          <a:chOff x="0" y="0"/>
-          <a:chExt cx="0" cy="0"/>
-        </a:xfrm>
-      </p:grpSpPr>
-      <p:sp>
-        <p:nvSpPr>
-          <p:cNvPr id="4" name="Content Placeholder 3"/>
-          <p:cNvSpPr>
-            <a:spLocks noGrp="1"/>
-          </p:cNvSpPr>
-          <p:nvPr>
-            <p:ph sz="quarter" idx="11"/>
-          </p:nvPr>
-        </p:nvSpPr>
-        <p:spPr>
-          <a:xfrm>
-            <a:off x="414337" y="495300"/>
-            <a:ext cx="6400800" cy="304800"/>
-          </a:xfrm>
-        </p:spPr>
-        <p:txBody>
-          <a:bodyPr/>
-          <a:lstStyle/>
-          <a:p>
-            <a:pPr eaLnBrk="1" hangingPunct="1">
-              <a:lnSpc>
-                <a:spcPts val="2448"/>
-              </a:lnSpc>
-              <a:defRPr/>
-            </a:pPr>
-            <a:r>
-              <a:rPr lang="en-US" dirty="0"/>
-              <a:t>EXERCISE</a:t>
-            </a:r>
-          </a:p>
-        </p:txBody>
-      </p:sp>
-      <p:sp>
-        <p:nvSpPr>
-          <p:cNvPr id="8" name="Slide Number Placeholder 3"/>
-          <p:cNvSpPr>
-            <a:spLocks noGrp="1"/>
-          </p:cNvSpPr>
-          <p:nvPr>
-            <p:ph type="sldNum" sz="quarter" idx="13"/>
-          </p:nvPr>
-        </p:nvSpPr>
-        <p:spPr/>
-        <p:txBody>
-          <a:bodyPr/>
-          <a:lstStyle/>
-          <a:p>
-            <a:pPr>
-              <a:defRPr/>
-            </a:pPr>
-            <a:fld id="{BD5AD749-DAD1-6A4A-A2AA-CB20EAD0AEB7}" type="slidenum">
-              <a:rPr lang="en-US"/>
-              <a:pPr>
-                <a:defRPr/>
-              </a:pPr>
-              <a:t>45</a:t>
-            </a:fld>
-            <a:endParaRPr lang="en-US"/>
-          </a:p>
-        </p:txBody>
-      </p:sp>
-      <p:sp>
-        <p:nvSpPr>
-          <p:cNvPr id="9" name="TextBox 8"/>
-          <p:cNvSpPr txBox="1"/>
-          <p:nvPr/>
-        </p:nvSpPr>
-        <p:spPr>
-          <a:xfrm>
-            <a:off x="566737" y="1104900"/>
-            <a:ext cx="8382000" cy="2677656"/>
-          </a:xfrm>
-          <a:prstGeom prst="rect">
-            <a:avLst/>
-          </a:prstGeom>
-          <a:noFill/>
-        </p:spPr>
-        <p:txBody>
-          <a:bodyPr wrap="square" rtlCol="0">
-            <a:spAutoFit/>
-          </a:bodyPr>
-          <a:lstStyle/>
-          <a:p>
-            <a:pPr algn="l"/>
-            <a:r>
-              <a:rPr lang="en-US" sz="2400" b="1" dirty="0" smtClean="0">
-                <a:latin typeface="PFDinTextCompPro-Italic"/>
-                <a:cs typeface="PFDinTextCompPro-Italic"/>
-              </a:rPr>
-              <a:t>Part I: Exploration</a:t>
-            </a:r>
-          </a:p>
-          <a:p>
-            <a:pPr marL="514350" indent="-514350" algn="l">
-              <a:buAutoNum type="arabicParenR"/>
-            </a:pPr>
-            <a:r>
-              <a:rPr lang="en-US" sz="2400" dirty="0" smtClean="0">
-                <a:latin typeface="PFDinTextCompPro-Italic"/>
-                <a:cs typeface="PFDinTextCompPro-Italic"/>
-              </a:rPr>
-              <a:t>Read in Default.csv and convert all data to numeric</a:t>
-            </a:r>
-          </a:p>
-          <a:p>
-            <a:pPr marL="514350" indent="-514350" algn="l">
-              <a:buAutoNum type="arabicParenR"/>
-            </a:pPr>
-            <a:r>
-              <a:rPr lang="en-US" sz="2400" dirty="0" smtClean="0">
-                <a:latin typeface="PFDinTextCompPro-Italic"/>
-                <a:cs typeface="PFDinTextCompPro-Italic"/>
-              </a:rPr>
-              <a:t>Split the data into train and test sets</a:t>
-            </a:r>
-          </a:p>
-          <a:p>
-            <a:pPr marL="514350" indent="-514350" algn="l">
-              <a:buAutoNum type="arabicParenR"/>
-            </a:pPr>
-            <a:r>
-              <a:rPr lang="en-US" sz="2400" dirty="0" smtClean="0">
-                <a:latin typeface="PFDinTextCompPro-Italic"/>
-                <a:cs typeface="PFDinTextCompPro-Italic"/>
-              </a:rPr>
-              <a:t>Create a histogram of all variables</a:t>
-            </a:r>
-          </a:p>
-          <a:p>
-            <a:pPr marL="514350" indent="-514350" algn="l">
-              <a:buAutoNum type="arabicParenR"/>
-            </a:pPr>
-            <a:r>
-              <a:rPr lang="en-US" sz="2400" dirty="0" smtClean="0">
-                <a:latin typeface="PFDinTextCompPro-Italic"/>
-                <a:cs typeface="PFDinTextCompPro-Italic"/>
-              </a:rPr>
-              <a:t>Create a scatter plot of the income vs. balance</a:t>
-            </a:r>
-          </a:p>
-          <a:p>
-            <a:pPr marL="514350" indent="-514350" algn="l">
-              <a:buAutoNum type="arabicParenR"/>
-            </a:pPr>
-            <a:r>
-              <a:rPr lang="en-US" sz="2400" dirty="0" smtClean="0">
-                <a:latin typeface="PFDinTextCompPro-Italic"/>
-                <a:cs typeface="PFDinTextCompPro-Italic"/>
-              </a:rPr>
-              <a:t>Mark defaults with a different color (and symbol)</a:t>
-            </a:r>
-          </a:p>
-          <a:p>
-            <a:pPr marL="514350" indent="-514350" algn="l">
-              <a:buAutoNum type="arabicParenR"/>
-            </a:pPr>
-            <a:r>
-              <a:rPr lang="en-US" sz="2400" dirty="0" smtClean="0">
-                <a:latin typeface="PFDinTextCompPro-Italic"/>
-                <a:cs typeface="PFDinTextCompPro-Italic"/>
-              </a:rPr>
-              <a:t>What can you infer from this plot?</a:t>
-            </a:r>
-          </a:p>
-        </p:txBody>
-      </p:sp>
-    </p:spTree>
-    <p:extLst>
-      <p:ext uri="{BB962C8B-B14F-4D97-AF65-F5344CB8AC3E}">
-        <p14:creationId xmlns:p14="http://schemas.microsoft.com/office/powerpoint/2010/main" val="669638077"/>
-      </p:ext>
-    </p:extLst>
-  </p:cSld>
-  <p:clrMapOvr>
-    <a:masterClrMapping/>
-  </p:clrMapOvr>
-  <p:transition/>
-  <p:timing>
-    <p:tnLst>
-      <p:par>
-        <p:cTn id="1" dur="indefinite" restart="never" nodeType="tmRoot"/>
-      </p:par>
-    </p:tnLst>
-  </p:timing>
-</p:sld>
-</file>
-
 <file path=ppt/slides/slide46.xml><?xml version="1.0" encoding="utf-8"?>
 <p:sld xmlns:a="http://schemas.openxmlformats.org/drawingml/2006/main" xmlns:r="http://schemas.openxmlformats.org/officeDocument/2006/relationships" xmlns:p="http://schemas.openxmlformats.org/presentationml/2006/main">
   <p:cSld>
@@ -28567,7 +29025,7 @@
         <p:spPr>
           <a:xfrm>
             <a:off x="566737" y="1104900"/>
-            <a:ext cx="8382000" cy="3416320"/>
+            <a:ext cx="8382000" cy="2677656"/>
           </a:xfrm>
           <a:prstGeom prst="rect">
             <a:avLst/>
@@ -28586,7 +29044,7 @@
                 <a:latin typeface="PFDinTextCompPro-Italic"/>
                 <a:cs typeface="PFDinTextCompPro-Italic"/>
               </a:rPr>
-              <a:t>Part II: Logistic Regression</a:t>
+              <a:t>Part I: Exploration</a:t>
             </a:r>
           </a:p>
           <a:p>
@@ -28598,84 +29056,47 @@
                 <a:latin typeface="PFDinTextCompPro-Italic"/>
                 <a:cs typeface="PFDinTextCompPro-Italic"/>
               </a:rPr>
-              <a:t>Run a logistic regression on the balance variable </a:t>
-            </a:r>
-          </a:p>
-          <a:p>
-            <a:pPr marL="1138238" lvl="1" indent="-514350" algn="l">
-              <a:buFont typeface="Arial" panose="020B0604020202020204" pitchFamily="34" charset="0"/>
-              <a:buChar char="•"/>
+              <a:t>Read in Default.csv and convert all data to numeric</a:t>
+            </a:r>
+          </a:p>
+          <a:p>
+            <a:pPr marL="514350" indent="-514350" algn="l">
+              <a:buAutoNum type="arabicParenR"/>
             </a:pPr>
             <a:r>
               <a:rPr lang="en-US" sz="2400" dirty="0" smtClean="0">
                 <a:latin typeface="PFDinTextCompPro-Italic"/>
                 <a:cs typeface="PFDinTextCompPro-Italic"/>
               </a:rPr>
-              <a:t>Use the training set</a:t>
-            </a:r>
-          </a:p>
-          <a:p>
-            <a:pPr marL="1138238" lvl="1" indent="-514350" algn="l">
-              <a:buFont typeface="Arial" panose="020B0604020202020204" pitchFamily="34" charset="0"/>
-              <a:buChar char="•"/>
+              <a:t>Split the data into train and test sets</a:t>
+            </a:r>
+          </a:p>
+          <a:p>
+            <a:pPr marL="514350" indent="-514350" algn="l">
+              <a:buAutoNum type="arabicParenR"/>
             </a:pPr>
             <a:r>
               <a:rPr lang="en-US" sz="2400" dirty="0" smtClean="0">
                 <a:latin typeface="PFDinTextCompPro-Italic"/>
                 <a:cs typeface="PFDinTextCompPro-Italic"/>
               </a:rPr>
-              <a:t>Use the </a:t>
-            </a:r>
-            <a:r>
-              <a:rPr lang="en-US" sz="1200" dirty="0" err="1" smtClean="0">
-                <a:latin typeface="Courier MonoThai" panose="02070309020205020404" pitchFamily="49" charset="0"/>
-                <a:cs typeface="Courier MonoThai" panose="02070309020205020404" pitchFamily="49" charset="0"/>
-              </a:rPr>
-              <a:t>statsmodels.formula.api</a:t>
-            </a:r>
-            <a:r>
-              <a:rPr lang="en-US" sz="1200" smtClean="0">
-                <a:latin typeface="Courier MonoThai" panose="02070309020205020404" pitchFamily="49" charset="0"/>
-                <a:cs typeface="Courier MonoThai" panose="02070309020205020404" pitchFamily="49" charset="0"/>
-              </a:rPr>
-              <a:t> </a:t>
-            </a:r>
-            <a:r>
-              <a:rPr lang="en-US" sz="2400" smtClean="0">
-                <a:latin typeface="PFDinTextCompPro-Italic"/>
-                <a:cs typeface="PFDinTextCompPro-Italic"/>
-              </a:rPr>
-              <a:t>module and </a:t>
-            </a:r>
-            <a:r>
-              <a:rPr lang="en-US" sz="1200" dirty="0" err="1" smtClean="0">
-                <a:latin typeface="Courier MonoThai" panose="02070309020205020404" pitchFamily="49" charset="0"/>
-                <a:cs typeface="Courier MonoThai" panose="02070309020205020404" pitchFamily="49" charset="0"/>
-              </a:rPr>
-              <a:t>smf.logit</a:t>
-            </a:r>
-            <a:r>
-              <a:rPr lang="en-US" sz="1200" dirty="0" smtClean="0">
-                <a:latin typeface="Courier MonoThai" panose="02070309020205020404" pitchFamily="49" charset="0"/>
-                <a:cs typeface="Courier MonoThai" panose="02070309020205020404" pitchFamily="49" charset="0"/>
-              </a:rPr>
-              <a:t>() </a:t>
-            </a:r>
+              <a:t>Create a histogram of all variables</a:t>
+            </a:r>
+          </a:p>
+          <a:p>
+            <a:pPr marL="514350" indent="-514350" algn="l">
+              <a:buAutoNum type="arabicParenR"/>
+            </a:pPr>
             <a:r>
               <a:rPr lang="en-US" sz="2400" dirty="0" smtClean="0">
                 <a:latin typeface="PFDinTextCompPro-Italic"/>
                 <a:cs typeface="PFDinTextCompPro-Italic"/>
               </a:rPr>
-              <a:t>function</a:t>
-            </a:r>
-            <a:endParaRPr lang="en-US" sz="2400" dirty="0">
-              <a:latin typeface="PFDinTextCompPro-Italic"/>
-              <a:cs typeface="PFDinTextCompPro-Italic"/>
-            </a:endParaRPr>
+              <a:t>Create a scatter plot of the income vs. balance</a:t>
+            </a:r>
           </a:p>
           <a:p>
             <a:pPr marL="514350" indent="-514350" algn="l">
-              <a:buFont typeface="+mj-lt"/>
               <a:buAutoNum type="arabicParenR"/>
             </a:pPr>
             <a:r>
@@ -28683,73 +29104,19 @@
                 <a:latin typeface="PFDinTextCompPro-Italic"/>
                 <a:cs typeface="PFDinTextCompPro-Italic"/>
               </a:rPr>
-              <a:t>Is the </a:t>
-            </a:r>
-            <a:r>
-              <a:rPr lang="en-US" sz="2400" dirty="0" smtClean="0">
-                <a:latin typeface="Symbol" panose="05050102010706020507" pitchFamily="18" charset="2"/>
-                <a:cs typeface="PFDinTextCompPro-Italic"/>
-              </a:rPr>
-              <a:t>b</a:t>
-            </a:r>
+              <a:t>Mark defaults with a different color (and symbol)</a:t>
+            </a:r>
+          </a:p>
+          <a:p>
+            <a:pPr marL="514350" indent="-514350" algn="l">
+              <a:buAutoNum type="arabicParenR"/>
+            </a:pPr>
             <a:r>
               <a:rPr lang="en-US" sz="2400" dirty="0" smtClean="0">
                 <a:latin typeface="PFDinTextCompPro-Italic"/>
                 <a:cs typeface="PFDinTextCompPro-Italic"/>
               </a:rPr>
-              <a:t>  value associated with balance significant?</a:t>
-            </a:r>
-          </a:p>
-          <a:p>
-            <a:pPr marL="514350" indent="-514350" algn="l">
-              <a:buFont typeface="+mj-lt"/>
-              <a:buAutoNum type="arabicParenR"/>
-            </a:pPr>
-            <a:r>
-              <a:rPr lang="en-US" sz="2400" dirty="0" smtClean="0">
-                <a:latin typeface="PFDinTextCompPro-Italic"/>
-                <a:cs typeface="PFDinTextCompPro-Italic"/>
-              </a:rPr>
-              <a:t>Predict the probability of default for someone with a balance of $1.2k and $1.5k</a:t>
-            </a:r>
-          </a:p>
-          <a:p>
-            <a:pPr marL="514350" indent="-514350" algn="l">
-              <a:buFont typeface="+mj-lt"/>
-              <a:buAutoNum type="arabicParenR"/>
-            </a:pPr>
-            <a:r>
-              <a:rPr lang="en-US" sz="2400" dirty="0" smtClean="0">
-                <a:latin typeface="PFDinTextCompPro-Italic"/>
-                <a:cs typeface="PFDinTextCompPro-Italic"/>
-              </a:rPr>
-              <a:t>Plot the fitted logistic function overtop of the data points</a:t>
-            </a:r>
-          </a:p>
-          <a:p>
-            <a:pPr marL="514350" indent="-514350" algn="l">
-              <a:buFont typeface="+mj-lt"/>
-              <a:buAutoNum type="arabicParenR"/>
-            </a:pPr>
-            <a:r>
-              <a:rPr lang="en-US" sz="2400" dirty="0" smtClean="0">
-                <a:latin typeface="PFDinTextCompPro-Italic"/>
-                <a:cs typeface="PFDinTextCompPro-Italic"/>
-              </a:rPr>
-              <a:t>Create predictions using the test set</a:t>
-            </a:r>
-          </a:p>
-          <a:p>
-            <a:pPr marL="514350" indent="-514350" algn="l">
-              <a:buFont typeface="+mj-lt"/>
-              <a:buAutoNum type="arabicParenR"/>
-            </a:pPr>
-            <a:r>
-              <a:rPr lang="en-US" sz="2400" dirty="0" smtClean="0">
-                <a:latin typeface="PFDinTextCompPro-Italic"/>
-                <a:cs typeface="PFDinTextCompPro-Italic"/>
-              </a:rPr>
-              <a:t>Compute the overall accuracy, the sensitivity and specificity</a:t>
+              <a:t>What can you infer from this plot?</a:t>
             </a:r>
           </a:p>
         </p:txBody>
@@ -28757,7 +29124,7 @@
     </p:spTree>
     <p:extLst>
       <p:ext uri="{BB962C8B-B14F-4D97-AF65-F5344CB8AC3E}">
-        <p14:creationId xmlns:p14="http://schemas.microsoft.com/office/powerpoint/2010/main" val="1528058976"/>
+        <p14:creationId xmlns:p14="http://schemas.microsoft.com/office/powerpoint/2010/main" val="669638077"/>
       </p:ext>
     </p:extLst>
   </p:cSld>
@@ -28794,20 +29161,48 @@
       </p:grpSpPr>
       <p:sp>
         <p:nvSpPr>
-          <p:cNvPr id="2" name="Title 1"/>
+          <p:cNvPr id="4" name="Content Placeholder 3"/>
           <p:cNvSpPr>
             <a:spLocks noGrp="1"/>
           </p:cNvSpPr>
           <p:nvPr>
-            <p:ph type="title"/>
+            <p:ph sz="quarter" idx="11"/>
           </p:nvPr>
         </p:nvSpPr>
         <p:spPr>
           <a:xfrm>
-            <a:off x="347663" y="3238500"/>
-            <a:ext cx="8426450" cy="1828800"/>
+            <a:off x="414337" y="495300"/>
+            <a:ext cx="6400800" cy="304800"/>
           </a:xfrm>
         </p:spPr>
+        <p:txBody>
+          <a:bodyPr/>
+          <a:lstStyle/>
+          <a:p>
+            <a:pPr eaLnBrk="1" hangingPunct="1">
+              <a:lnSpc>
+                <a:spcPts val="2448"/>
+              </a:lnSpc>
+              <a:defRPr/>
+            </a:pPr>
+            <a:r>
+              <a:rPr lang="en-US" dirty="0"/>
+              <a:t>EXERCISE</a:t>
+            </a:r>
+          </a:p>
+        </p:txBody>
+      </p:sp>
+      <p:sp>
+        <p:nvSpPr>
+          <p:cNvPr id="8" name="Slide Number Placeholder 3"/>
+          <p:cNvSpPr>
+            <a:spLocks noGrp="1"/>
+          </p:cNvSpPr>
+          <p:nvPr>
+            <p:ph type="sldNum" sz="quarter" idx="13"/>
+          </p:nvPr>
+        </p:nvSpPr>
+        <p:spPr/>
         <p:txBody>
           <a:bodyPr/>
           <a:lstStyle/>
@@ -28815,66 +29210,217 @@
             <a:pPr>
               <a:defRPr/>
             </a:pPr>
-            <a:r>
-              <a:rPr lang="en-US" sz="7500" dirty="0" smtClean="0"/>
-              <a:t/>
-            </a:r>
-            <a:br>
-              <a:rPr lang="en-US" sz="7500" dirty="0" smtClean="0"/>
-            </a:br>
-            <a:r>
-              <a:rPr lang="en-US" sz="7500" dirty="0" smtClean="0"/>
-              <a:t>III. Q&amp;A</a:t>
-            </a:r>
-            <a:endParaRPr lang="en-US" sz="7500" dirty="0"/>
-          </a:p>
-        </p:txBody>
-      </p:sp>
-      <p:sp>
-        <p:nvSpPr>
-          <p:cNvPr id="4" name="Content Placeholder 3"/>
-          <p:cNvSpPr>
-            <a:spLocks noGrp="1"/>
-          </p:cNvSpPr>
-          <p:nvPr>
-            <p:ph sz="quarter" idx="11"/>
-          </p:nvPr>
+            <a:fld id="{BD5AD749-DAD1-6A4A-A2AA-CB20EAD0AEB7}" type="slidenum">
+              <a:rPr lang="en-US"/>
+              <a:pPr>
+                <a:defRPr/>
+              </a:pPr>
+              <a:t>47</a:t>
+            </a:fld>
+            <a:endParaRPr lang="en-US"/>
+          </a:p>
+        </p:txBody>
+      </p:sp>
+      <p:sp>
+        <p:nvSpPr>
+          <p:cNvPr id="9" name="TextBox 8"/>
+          <p:cNvSpPr txBox="1"/>
+          <p:nvPr/>
         </p:nvSpPr>
         <p:spPr>
           <a:xfrm>
-            <a:off x="371475" y="495300"/>
-            <a:ext cx="6400800" cy="304800"/>
+            <a:off x="566737" y="1104900"/>
+            <a:ext cx="8382000" cy="3416320"/>
           </a:xfrm>
+          <a:prstGeom prst="rect">
+            <a:avLst/>
+          </a:prstGeom>
+          <a:noFill/>
         </p:spPr>
         <p:txBody>
-          <a:bodyPr wrap="square" lIns="91440" tIns="45720" rIns="91440" bIns="45720" numCol="1" anchor="t" anchorCtr="0" compatLnSpc="1">
-            <a:prstTxWarp prst="textNoShape">
-              <a:avLst/>
-            </a:prstTxWarp>
+          <a:bodyPr wrap="square" rtlCol="0">
+            <a:spAutoFit/>
           </a:bodyPr>
           <a:lstStyle/>
           <a:p>
-            <a:pPr marL="0" indent="0"/>
-            <a:r>
-              <a:rPr lang="en-US" cap="none" dirty="0" smtClean="0">
-                <a:latin typeface="PFDinTextCompPro-Bold" charset="0"/>
-                <a:ea typeface="ヒラギノ角ゴ ProN W3" charset="0"/>
-                <a:cs typeface="ヒラギノ角ゴ ProN W3" charset="0"/>
-              </a:rPr>
-              <a:t>INTRO TO DATA SCIENCE</a:t>
-            </a:r>
-            <a:endParaRPr lang="en-US" cap="none" dirty="0">
-              <a:latin typeface="PFDinTextCompPro-Bold" charset="0"/>
-              <a:ea typeface="ヒラギノ角ゴ ProN W3" charset="0"/>
-              <a:cs typeface="ヒラギノ角ゴ ProN W3" charset="0"/>
+            <a:pPr algn="l"/>
+            <a:r>
+              <a:rPr lang="en-US" sz="2400" b="1" dirty="0" smtClean="0">
+                <a:latin typeface="PFDinTextCompPro-Italic"/>
+                <a:cs typeface="PFDinTextCompPro-Italic"/>
+              </a:rPr>
+              <a:t>Part II: Logistic Regression</a:t>
+            </a:r>
+          </a:p>
+          <a:p>
+            <a:pPr marL="514350" indent="-514350" algn="l">
+              <a:buAutoNum type="arabicParenR"/>
+            </a:pPr>
+            <a:r>
+              <a:rPr lang="en-US" sz="2400" dirty="0" smtClean="0">
+                <a:latin typeface="PFDinTextCompPro-Italic"/>
+                <a:cs typeface="PFDinTextCompPro-Italic"/>
+              </a:rPr>
+              <a:t>Run a logistic regression on the balance variable </a:t>
+            </a:r>
+          </a:p>
+          <a:p>
+            <a:pPr marL="1138238" lvl="1" indent="-514350" algn="l">
+              <a:buFont typeface="Arial" panose="020B0604020202020204" pitchFamily="34" charset="0"/>
+              <a:buChar char="•"/>
+            </a:pPr>
+            <a:r>
+              <a:rPr lang="en-US" sz="2400" dirty="0" smtClean="0">
+                <a:latin typeface="PFDinTextCompPro-Italic"/>
+                <a:cs typeface="PFDinTextCompPro-Italic"/>
+              </a:rPr>
+              <a:t>Use the training set</a:t>
+            </a:r>
+          </a:p>
+          <a:p>
+            <a:pPr marL="1138238" lvl="1" indent="-514350" algn="l">
+              <a:buFont typeface="Arial" panose="020B0604020202020204" pitchFamily="34" charset="0"/>
+              <a:buChar char="•"/>
+            </a:pPr>
+            <a:r>
+              <a:rPr lang="en-US" sz="2400" dirty="0" smtClean="0">
+                <a:latin typeface="PFDinTextCompPro-Italic"/>
+                <a:cs typeface="PFDinTextCompPro-Italic"/>
+              </a:rPr>
+              <a:t>Use the </a:t>
+            </a:r>
+            <a:r>
+              <a:rPr lang="en-US" sz="1200" dirty="0" err="1" smtClean="0">
+                <a:latin typeface="Courier MonoThai" panose="02070309020205020404" pitchFamily="49" charset="0"/>
+                <a:cs typeface="Courier MonoThai" panose="02070309020205020404" pitchFamily="49" charset="0"/>
+              </a:rPr>
+              <a:t>statsmodels.formula.api</a:t>
+            </a:r>
+            <a:r>
+              <a:rPr lang="en-US" sz="1200" smtClean="0">
+                <a:latin typeface="Courier MonoThai" panose="02070309020205020404" pitchFamily="49" charset="0"/>
+                <a:cs typeface="Courier MonoThai" panose="02070309020205020404" pitchFamily="49" charset="0"/>
+              </a:rPr>
+              <a:t> </a:t>
+            </a:r>
+            <a:r>
+              <a:rPr lang="en-US" sz="2400" smtClean="0">
+                <a:latin typeface="PFDinTextCompPro-Italic"/>
+                <a:cs typeface="PFDinTextCompPro-Italic"/>
+              </a:rPr>
+              <a:t>module and </a:t>
+            </a:r>
+            <a:r>
+              <a:rPr lang="en-US" sz="1200" dirty="0" err="1" smtClean="0">
+                <a:latin typeface="Courier MonoThai" panose="02070309020205020404" pitchFamily="49" charset="0"/>
+                <a:cs typeface="Courier MonoThai" panose="02070309020205020404" pitchFamily="49" charset="0"/>
+              </a:rPr>
+              <a:t>smf.logit</a:t>
+            </a:r>
+            <a:r>
+              <a:rPr lang="en-US" sz="1200" dirty="0" smtClean="0">
+                <a:latin typeface="Courier MonoThai" panose="02070309020205020404" pitchFamily="49" charset="0"/>
+                <a:cs typeface="Courier MonoThai" panose="02070309020205020404" pitchFamily="49" charset="0"/>
+              </a:rPr>
+              <a:t>() </a:t>
+            </a:r>
+            <a:r>
+              <a:rPr lang="en-US" sz="2400" dirty="0" smtClean="0">
+                <a:latin typeface="PFDinTextCompPro-Italic"/>
+                <a:cs typeface="PFDinTextCompPro-Italic"/>
+              </a:rPr>
+              <a:t>function</a:t>
+            </a:r>
+            <a:endParaRPr lang="en-US" sz="2400" dirty="0">
+              <a:latin typeface="PFDinTextCompPro-Italic"/>
+              <a:cs typeface="PFDinTextCompPro-Italic"/>
             </a:endParaRPr>
+          </a:p>
+          <a:p>
+            <a:pPr marL="514350" indent="-514350" algn="l">
+              <a:buFont typeface="+mj-lt"/>
+              <a:buAutoNum type="arabicParenR"/>
+            </a:pPr>
+            <a:r>
+              <a:rPr lang="en-US" sz="2400" dirty="0" smtClean="0">
+                <a:latin typeface="PFDinTextCompPro-Italic"/>
+                <a:cs typeface="PFDinTextCompPro-Italic"/>
+              </a:rPr>
+              <a:t>Is the </a:t>
+            </a:r>
+            <a:r>
+              <a:rPr lang="en-US" sz="2400" dirty="0" smtClean="0">
+                <a:latin typeface="Symbol" panose="05050102010706020507" pitchFamily="18" charset="2"/>
+                <a:cs typeface="PFDinTextCompPro-Italic"/>
+              </a:rPr>
+              <a:t>b</a:t>
+            </a:r>
+            <a:r>
+              <a:rPr lang="en-US" sz="2400" dirty="0" smtClean="0">
+                <a:latin typeface="PFDinTextCompPro-Italic"/>
+                <a:cs typeface="PFDinTextCompPro-Italic"/>
+              </a:rPr>
+              <a:t>  value associated with balance significant?</a:t>
+            </a:r>
+          </a:p>
+          <a:p>
+            <a:pPr marL="514350" indent="-514350" algn="l">
+              <a:buFont typeface="+mj-lt"/>
+              <a:buAutoNum type="arabicParenR"/>
+            </a:pPr>
+            <a:r>
+              <a:rPr lang="en-US" sz="2400" dirty="0" smtClean="0">
+                <a:latin typeface="PFDinTextCompPro-Italic"/>
+                <a:cs typeface="PFDinTextCompPro-Italic"/>
+              </a:rPr>
+              <a:t>Predict the probability of default for someone with a balance of $1.2k and $1.5k</a:t>
+            </a:r>
+          </a:p>
+          <a:p>
+            <a:pPr marL="514350" indent="-514350" algn="l">
+              <a:buFont typeface="+mj-lt"/>
+              <a:buAutoNum type="arabicParenR"/>
+            </a:pPr>
+            <a:r>
+              <a:rPr lang="en-US" sz="2400" dirty="0" smtClean="0">
+                <a:latin typeface="PFDinTextCompPro-Italic"/>
+                <a:cs typeface="PFDinTextCompPro-Italic"/>
+              </a:rPr>
+              <a:t>Plot the fitted logistic function overtop of the data points</a:t>
+            </a:r>
+          </a:p>
+          <a:p>
+            <a:pPr marL="514350" indent="-514350" algn="l">
+              <a:buFont typeface="+mj-lt"/>
+              <a:buAutoNum type="arabicParenR"/>
+            </a:pPr>
+            <a:r>
+              <a:rPr lang="en-US" sz="2400" dirty="0" smtClean="0">
+                <a:latin typeface="PFDinTextCompPro-Italic"/>
+                <a:cs typeface="PFDinTextCompPro-Italic"/>
+              </a:rPr>
+              <a:t>Create predictions using the test set</a:t>
+            </a:r>
+          </a:p>
+          <a:p>
+            <a:pPr marL="514350" indent="-514350" algn="l">
+              <a:buFont typeface="+mj-lt"/>
+              <a:buAutoNum type="arabicParenR"/>
+            </a:pPr>
+            <a:r>
+              <a:rPr lang="en-US" sz="2400" dirty="0" smtClean="0">
+                <a:latin typeface="PFDinTextCompPro-Italic"/>
+                <a:cs typeface="PFDinTextCompPro-Italic"/>
+              </a:rPr>
+              <a:t>Compute the overall accuracy, the sensitivity and specificity</a:t>
+            </a:r>
           </a:p>
         </p:txBody>
       </p:sp>
     </p:spTree>
     <p:extLst>
       <p:ext uri="{BB962C8B-B14F-4D97-AF65-F5344CB8AC3E}">
-        <p14:creationId xmlns:p14="http://schemas.microsoft.com/office/powerpoint/2010/main" val="3656152759"/>
+        <p14:creationId xmlns:p14="http://schemas.microsoft.com/office/powerpoint/2010/main" val="1528058976"/>
       </p:ext>
     </p:extLst>
   </p:cSld>
@@ -28911,156 +29457,87 @@
       </p:grpSpPr>
       <p:sp>
         <p:nvSpPr>
-          <p:cNvPr id="4" name="Content Placeholder 3"/>
+          <p:cNvPr id="2" name="Title 1"/>
           <p:cNvSpPr>
             <a:spLocks noGrp="1"/>
           </p:cNvSpPr>
           <p:nvPr>
-            <p:ph sz="quarter" idx="11"/>
+            <p:ph type="title"/>
           </p:nvPr>
         </p:nvSpPr>
         <p:spPr>
           <a:xfrm>
-            <a:off x="414337" y="495300"/>
+            <a:off x="347663" y="3238500"/>
+            <a:ext cx="8426450" cy="1828800"/>
+          </a:xfrm>
+        </p:spPr>
+        <p:txBody>
+          <a:bodyPr/>
+          <a:lstStyle/>
+          <a:p>
+            <a:pPr>
+              <a:defRPr/>
+            </a:pPr>
+            <a:r>
+              <a:rPr lang="en-US" sz="7500" dirty="0" smtClean="0"/>
+              <a:t/>
+            </a:r>
+            <a:br>
+              <a:rPr lang="en-US" sz="7500" dirty="0" smtClean="0"/>
+            </a:br>
+            <a:r>
+              <a:rPr lang="en-US" sz="7500" dirty="0" smtClean="0"/>
+              <a:t>III. Q&amp;A</a:t>
+            </a:r>
+            <a:endParaRPr lang="en-US" sz="7500" dirty="0"/>
+          </a:p>
+        </p:txBody>
+      </p:sp>
+      <p:sp>
+        <p:nvSpPr>
+          <p:cNvPr id="4" name="Content Placeholder 3"/>
+          <p:cNvSpPr>
+            <a:spLocks noGrp="1"/>
+          </p:cNvSpPr>
+          <p:nvPr>
+            <p:ph sz="quarter" idx="11"/>
+          </p:nvPr>
+        </p:nvSpPr>
+        <p:spPr>
+          <a:xfrm>
+            <a:off x="371475" y="495300"/>
             <a:ext cx="6400800" cy="304800"/>
           </a:xfrm>
         </p:spPr>
         <p:txBody>
-          <a:bodyPr/>
-          <a:lstStyle/>
-          <a:p>
-            <a:pPr eaLnBrk="1" hangingPunct="1">
-              <a:lnSpc>
-                <a:spcPts val="2448"/>
-              </a:lnSpc>
-              <a:defRPr/>
-            </a:pPr>
-            <a:r>
-              <a:rPr lang="en-US" dirty="0" smtClean="0"/>
-              <a:t>Q&amp;A</a:t>
-            </a:r>
-            <a:endParaRPr lang="en-US" dirty="0"/>
-          </a:p>
-        </p:txBody>
-      </p:sp>
-      <p:sp>
-        <p:nvSpPr>
-          <p:cNvPr id="8" name="Slide Number Placeholder 3"/>
-          <p:cNvSpPr>
-            <a:spLocks noGrp="1"/>
-          </p:cNvSpPr>
-          <p:nvPr>
-            <p:ph type="sldNum" sz="quarter" idx="13"/>
-          </p:nvPr>
-        </p:nvSpPr>
-        <p:spPr/>
-        <p:txBody>
-          <a:bodyPr/>
-          <a:lstStyle/>
-          <a:p>
-            <a:pPr>
-              <a:defRPr/>
-            </a:pPr>
-            <a:fld id="{BD5AD749-DAD1-6A4A-A2AA-CB20EAD0AEB7}" type="slidenum">
-              <a:rPr lang="en-US"/>
-              <a:pPr>
-                <a:defRPr/>
-              </a:pPr>
-              <a:t>48</a:t>
-            </a:fld>
-            <a:endParaRPr lang="en-US"/>
-          </a:p>
-        </p:txBody>
-      </p:sp>
-      <p:sp>
-        <p:nvSpPr>
-          <p:cNvPr id="9" name="TextBox 8"/>
-          <p:cNvSpPr txBox="1"/>
-          <p:nvPr/>
-        </p:nvSpPr>
-        <p:spPr>
-          <a:xfrm>
-            <a:off x="566737" y="1104900"/>
-            <a:ext cx="8382000" cy="2400657"/>
-          </a:xfrm>
-          <a:prstGeom prst="rect">
-            <a:avLst/>
-          </a:prstGeom>
-          <a:noFill/>
-        </p:spPr>
-        <p:txBody>
-          <a:bodyPr wrap="square" rtlCol="0">
-            <a:spAutoFit/>
+          <a:bodyPr wrap="square" lIns="91440" tIns="45720" rIns="91440" bIns="45720" numCol="1" anchor="t" anchorCtr="0" compatLnSpc="1">
+            <a:prstTxWarp prst="textNoShape">
+              <a:avLst/>
+            </a:prstTxWarp>
           </a:bodyPr>
           <a:lstStyle/>
           <a:p>
-            <a:pPr algn="l"/>
-            <a:r>
-              <a:rPr lang="en-US" sz="3000" dirty="0" smtClean="0">
-                <a:latin typeface="PFDinTextCompPro-Italic"/>
-                <a:cs typeface="PFDinTextCompPro-Italic"/>
-              </a:rPr>
-              <a:t>Q: What is a Generalized Linear Model (GLM)?</a:t>
-            </a:r>
-          </a:p>
-          <a:p>
-            <a:pPr algn="l"/>
-            <a:endParaRPr lang="en-US" sz="3000" dirty="0">
-              <a:latin typeface="PFDinTextCompPro-Italic"/>
-              <a:cs typeface="PFDinTextCompPro-Italic"/>
+            <a:pPr marL="0" indent="0"/>
+            <a:r>
+              <a:rPr lang="en-US" cap="none" dirty="0" smtClean="0">
+                <a:latin typeface="PFDinTextCompPro-Bold" charset="0"/>
+                <a:ea typeface="ヒラギノ角ゴ ProN W3" charset="0"/>
+                <a:cs typeface="ヒラギノ角ゴ ProN W3" charset="0"/>
+              </a:rPr>
+              <a:t>INTRO TO DATA SCIENCE</a:t>
+            </a:r>
+            <a:endParaRPr lang="en-US" cap="none" dirty="0">
+              <a:latin typeface="PFDinTextCompPro-Bold" charset="0"/>
+              <a:ea typeface="ヒラギノ角ゴ ProN W3" charset="0"/>
+              <a:cs typeface="ヒラギノ角ゴ ProN W3" charset="0"/>
             </a:endParaRPr>
-          </a:p>
-          <a:p>
-            <a:pPr algn="l"/>
-            <a:r>
-              <a:rPr lang="en-US" sz="3000" dirty="0" smtClean="0">
-                <a:latin typeface="PFDinTextCompPro-Italic"/>
-                <a:cs typeface="PFDinTextCompPro-Italic"/>
-              </a:rPr>
-              <a:t>A: Briefly</a:t>
-            </a:r>
-            <a:r>
-              <a:rPr lang="en-US" sz="3000" dirty="0">
-                <a:latin typeface="PFDinTextCompPro-Italic"/>
-                <a:cs typeface="PFDinTextCompPro-Italic"/>
-              </a:rPr>
-              <a:t>, GLMs generalize the distribution of the </a:t>
-            </a:r>
-            <a:r>
-              <a:rPr lang="en-US" sz="3000" b="1" dirty="0">
-                <a:latin typeface="PFDinTextCompPro-Italic"/>
-                <a:cs typeface="PFDinTextCompPro-Italic"/>
-              </a:rPr>
-              <a:t>error term</a:t>
-            </a:r>
-            <a:r>
-              <a:rPr lang="en-US" sz="3000" dirty="0">
-                <a:latin typeface="PFDinTextCompPro-Italic"/>
-                <a:cs typeface="PFDinTextCompPro-Italic"/>
-              </a:rPr>
-              <a:t>, and allow the conditional mean of the response variable to be related to the linear model by a </a:t>
-            </a:r>
-            <a:r>
-              <a:rPr lang="en-US" sz="3000" dirty="0">
-                <a:latin typeface="PFDinTextCompPro-Medium"/>
-                <a:cs typeface="PFDinTextCompPro-Medium"/>
-              </a:rPr>
-              <a:t>link function</a:t>
-            </a:r>
-            <a:r>
-              <a:rPr lang="en-US" sz="3000" dirty="0" smtClean="0">
-                <a:latin typeface="PFDinTextCompPro-Italic"/>
-                <a:cs typeface="PFDinTextCompPro-Italic"/>
-              </a:rPr>
-              <a:t>.</a:t>
-            </a:r>
           </a:p>
         </p:txBody>
       </p:sp>
     </p:spTree>
     <p:extLst>
       <p:ext uri="{BB962C8B-B14F-4D97-AF65-F5344CB8AC3E}">
-        <p14:creationId xmlns:p14="http://schemas.microsoft.com/office/powerpoint/2010/main" val="646098562"/>
+        <p14:creationId xmlns:p14="http://schemas.microsoft.com/office/powerpoint/2010/main" val="3656152759"/>
       </p:ext>
     </p:extLst>
   </p:cSld>
@@ -29186,7 +29663,7 @@
                 <a:latin typeface="PFDinTextCompPro-Italic"/>
                 <a:cs typeface="PFDinTextCompPro-Italic"/>
               </a:rPr>
-              <a:t>Q: What is the error distribution and link function for the logistic regression?</a:t>
+              <a:t>Q: What is a Generalized Linear Model (GLM)?</a:t>
             </a:r>
           </a:p>
           <a:p>
@@ -29203,55 +29680,40 @@
                 <a:latin typeface="PFDinTextCompPro-Italic"/>
                 <a:cs typeface="PFDinTextCompPro-Italic"/>
               </a:rPr>
-              <a:t>A: The error term follows </a:t>
+              <a:t>A: Briefly</a:t>
             </a:r>
             <a:r>
               <a:rPr lang="en-US" sz="3000" dirty="0">
                 <a:latin typeface="PFDinTextCompPro-Italic"/>
                 <a:cs typeface="PFDinTextCompPro-Italic"/>
               </a:rPr>
-              <a:t>a </a:t>
+              <a:t>, GLMs generalize the distribution of the </a:t>
+            </a:r>
+            <a:r>
+              <a:rPr lang="en-US" sz="3000" b="1" dirty="0">
+                <a:latin typeface="PFDinTextCompPro-Italic"/>
+                <a:cs typeface="PFDinTextCompPro-Italic"/>
+              </a:rPr>
+              <a:t>error term</a:t>
+            </a:r>
+            <a:r>
+              <a:rPr lang="en-US" sz="3000" dirty="0">
+                <a:latin typeface="PFDinTextCompPro-Italic"/>
+                <a:cs typeface="PFDinTextCompPro-Italic"/>
+              </a:rPr>
+              <a:t>, and allow the conditional mean of the response variable to be related to the linear model by a </a:t>
+            </a:r>
+            <a:r>
+              <a:rPr lang="en-US" sz="3000" dirty="0">
+                <a:latin typeface="PFDinTextCompPro-Medium"/>
+                <a:cs typeface="PFDinTextCompPro-Medium"/>
+              </a:rPr>
+              <a:t>link function</a:t>
             </a:r>
             <a:r>
               <a:rPr lang="en-US" sz="3000" dirty="0" smtClean="0">
                 <a:latin typeface="PFDinTextCompPro-Italic"/>
                 <a:cs typeface="PFDinTextCompPro-Italic"/>
-                <a:hlinkClick r:id="rId3"/>
-              </a:rPr>
-              <a:t>Bernoulli distribution</a:t>
-            </a:r>
-            <a:r>
-              <a:rPr lang="en-US" sz="3000" dirty="0" smtClean="0">
-                <a:latin typeface="PFDinTextCompPro-Italic"/>
-                <a:cs typeface="PFDinTextCompPro-Italic"/>
-              </a:rPr>
-              <a:t>, </a:t>
-            </a:r>
-            <a:r>
-              <a:rPr lang="en-US" sz="3000" dirty="0">
-                <a:latin typeface="PFDinTextCompPro-Italic"/>
-                <a:cs typeface="PFDinTextCompPro-Italic"/>
-              </a:rPr>
-              <a:t>and the </a:t>
-            </a:r>
-            <a:r>
-              <a:rPr lang="en-US" sz="3000" dirty="0" err="1">
-                <a:latin typeface="PFDinTextCompPro-Italic"/>
-                <a:cs typeface="PFDinTextCompPro-Italic"/>
-              </a:rPr>
-              <a:t>logit</a:t>
-            </a:r>
-            <a:r>
-              <a:rPr lang="en-US" sz="3000" dirty="0">
-                <a:latin typeface="PFDinTextCompPro-Italic"/>
-                <a:cs typeface="PFDinTextCompPro-Italic"/>
-              </a:rPr>
-              <a:t> is the link function that connects us to the linear predictor</a:t>
-            </a:r>
-            <a:r>
-              <a:rPr lang="en-US" sz="3000" dirty="0" smtClean="0">
-                <a:latin typeface="PFDinTextCompPro-Italic"/>
-                <a:cs typeface="PFDinTextCompPro-Italic"/>
               </a:rPr>
               <a:t>.</a:t>
             </a:r>
@@ -29261,7 +29723,7 @@
     </p:spTree>
     <p:extLst>
       <p:ext uri="{BB962C8B-B14F-4D97-AF65-F5344CB8AC3E}">
-        <p14:creationId xmlns:p14="http://schemas.microsoft.com/office/powerpoint/2010/main" val="3296712583"/>
+        <p14:creationId xmlns:p14="http://schemas.microsoft.com/office/powerpoint/2010/main" val="646098562"/>
       </p:ext>
     </p:extLst>
   </p:cSld>
@@ -29761,21 +30223,7 @@
                 <a:latin typeface="PFDinTextCompPro-Italic"/>
                 <a:cs typeface="PFDinTextCompPro-Italic"/>
               </a:rPr>
-              <a:t>Q: Is the </a:t>
-            </a:r>
-            <a:r>
-              <a:rPr lang="en-US" sz="3000" dirty="0" err="1" smtClean="0">
-                <a:latin typeface="PFDinTextCompPro-Italic"/>
-                <a:cs typeface="PFDinTextCompPro-Italic"/>
-              </a:rPr>
-              <a:t>logit</a:t>
-            </a:r>
-            <a:r>
-              <a:rPr lang="en-US" sz="3000" dirty="0" smtClean="0">
-                <a:latin typeface="PFDinTextCompPro-Italic"/>
-                <a:cs typeface="PFDinTextCompPro-Italic"/>
-              </a:rPr>
-              <a:t> the only link function used for the Bernoulli distribution?</a:t>
+              <a:t>Q: What is the error distribution and link function for the logistic regression?</a:t>
             </a:r>
           </a:p>
           <a:p>
@@ -29792,63 +30240,65 @@
                 <a:latin typeface="PFDinTextCompPro-Italic"/>
                 <a:cs typeface="PFDinTextCompPro-Italic"/>
               </a:rPr>
-              <a:t>A: No, other link functions include the </a:t>
-            </a:r>
-            <a:r>
-              <a:rPr lang="en-US" sz="3000" dirty="0" err="1" smtClean="0">
+              <a:t>A: The error term follows </a:t>
+            </a:r>
+            <a:r>
+              <a:rPr lang="en-US" sz="3000" dirty="0">
+                <a:latin typeface="PFDinTextCompPro-Italic"/>
+                <a:cs typeface="PFDinTextCompPro-Italic"/>
+              </a:rPr>
+              <a:t>a </a:t>
+            </a:r>
+            <a:r>
+              <a:rPr lang="en-US" sz="3000" dirty="0" smtClean="0">
                 <a:latin typeface="PFDinTextCompPro-Italic"/>
                 <a:cs typeface="PFDinTextCompPro-Italic"/>
                 <a:hlinkClick r:id="rId3"/>
               </a:rPr>
-              <a:t>probit</a:t>
+              <a:t>Bernoulli distribution</a:t>
             </a:r>
             <a:r>
               <a:rPr lang="en-US" sz="3000" dirty="0" smtClean="0">
                 <a:latin typeface="PFDinTextCompPro-Italic"/>
                 <a:cs typeface="PFDinTextCompPro-Italic"/>
               </a:rPr>
-              <a:t> the </a:t>
-            </a:r>
-            <a:r>
-              <a:rPr lang="en-US" sz="3000" dirty="0" err="1" smtClean="0">
+              <a:t>, </a:t>
+            </a:r>
+            <a:r>
+              <a:rPr lang="en-US" sz="3000" dirty="0">
                 <a:latin typeface="PFDinTextCompPro-Italic"/>
                 <a:cs typeface="PFDinTextCompPro-Italic"/>
-                <a:hlinkClick r:id="rId4"/>
-              </a:rPr>
-              <a:t>tobit</a:t>
+              </a:rPr>
+              <a:t>and the </a:t>
+            </a:r>
+            <a:r>
+              <a:rPr lang="en-US" sz="3000" dirty="0" err="1">
+                <a:latin typeface="PFDinTextCompPro-Italic"/>
+                <a:cs typeface="PFDinTextCompPro-Italic"/>
+              </a:rPr>
+              <a:t>logit</a:t>
+            </a:r>
+            <a:r>
+              <a:rPr lang="en-US" sz="3000" dirty="0">
+                <a:latin typeface="PFDinTextCompPro-Italic"/>
+                <a:cs typeface="PFDinTextCompPro-Italic"/>
+              </a:rPr>
+              <a:t> is the link function that connects us to the linear predictor</a:t>
             </a:r>
             <a:r>
               <a:rPr lang="en-US" sz="3000" dirty="0" smtClean="0">
                 <a:latin typeface="PFDinTextCompPro-Italic"/>
                 <a:cs typeface="PFDinTextCompPro-Italic"/>
               </a:rPr>
-              <a:t> model. However, the </a:t>
-            </a:r>
-            <a:r>
-              <a:rPr lang="en-US" sz="3000" dirty="0" err="1" smtClean="0">
-                <a:latin typeface="PFDinTextCompPro-Italic"/>
-                <a:cs typeface="PFDinTextCompPro-Italic"/>
-              </a:rPr>
-              <a:t>logit</a:t>
-            </a:r>
-            <a:r>
-              <a:rPr lang="en-US" sz="3000" dirty="0" smtClean="0">
-                <a:latin typeface="PFDinTextCompPro-Italic"/>
-                <a:cs typeface="PFDinTextCompPro-Italic"/>
-              </a:rPr>
-              <a:t> simplifies things nicely and is probably the most commonly used.</a:t>
-            </a:r>
-            <a:endParaRPr lang="en-US" sz="3000" b="1" dirty="0" smtClean="0">
-              <a:latin typeface="PFDinTextCompPro-Italic"/>
-              <a:cs typeface="PFDinTextCompPro-Italic"/>
-            </a:endParaRPr>
+              <a:t>.</a:t>
+            </a:r>
           </a:p>
         </p:txBody>
       </p:sp>
     </p:spTree>
     <p:extLst>
       <p:ext uri="{BB962C8B-B14F-4D97-AF65-F5344CB8AC3E}">
-        <p14:creationId xmlns:p14="http://schemas.microsoft.com/office/powerpoint/2010/main" val="1280717532"/>
+        <p14:creationId xmlns:p14="http://schemas.microsoft.com/office/powerpoint/2010/main" val="3296712583"/>
       </p:ext>
     </p:extLst>
   </p:cSld>
@@ -29955,6 +30405,219 @@
         <p:spPr>
           <a:xfrm>
             <a:off x="566737" y="1104900"/>
+            <a:ext cx="8382000" cy="2400657"/>
+          </a:xfrm>
+          <a:prstGeom prst="rect">
+            <a:avLst/>
+          </a:prstGeom>
+          <a:noFill/>
+        </p:spPr>
+        <p:txBody>
+          <a:bodyPr wrap="square" rtlCol="0">
+            <a:spAutoFit/>
+          </a:bodyPr>
+          <a:lstStyle/>
+          <a:p>
+            <a:pPr algn="l"/>
+            <a:r>
+              <a:rPr lang="en-US" sz="3000" dirty="0" smtClean="0">
+                <a:latin typeface="PFDinTextCompPro-Italic"/>
+                <a:cs typeface="PFDinTextCompPro-Italic"/>
+              </a:rPr>
+              <a:t>Q: Is the </a:t>
+            </a:r>
+            <a:r>
+              <a:rPr lang="en-US" sz="3000" dirty="0" err="1" smtClean="0">
+                <a:latin typeface="PFDinTextCompPro-Italic"/>
+                <a:cs typeface="PFDinTextCompPro-Italic"/>
+              </a:rPr>
+              <a:t>logit</a:t>
+            </a:r>
+            <a:r>
+              <a:rPr lang="en-US" sz="3000" dirty="0" smtClean="0">
+                <a:latin typeface="PFDinTextCompPro-Italic"/>
+                <a:cs typeface="PFDinTextCompPro-Italic"/>
+              </a:rPr>
+              <a:t> the only link function used for the Bernoulli distribution?</a:t>
+            </a:r>
+          </a:p>
+          <a:p>
+            <a:pPr algn="l"/>
+            <a:endParaRPr lang="en-US" sz="3000" dirty="0">
+              <a:latin typeface="PFDinTextCompPro-Italic"/>
+              <a:cs typeface="PFDinTextCompPro-Italic"/>
+            </a:endParaRPr>
+          </a:p>
+          <a:p>
+            <a:pPr algn="l"/>
+            <a:r>
+              <a:rPr lang="en-US" sz="3000" dirty="0" smtClean="0">
+                <a:latin typeface="PFDinTextCompPro-Italic"/>
+                <a:cs typeface="PFDinTextCompPro-Italic"/>
+              </a:rPr>
+              <a:t>A: No, other link functions include the </a:t>
+            </a:r>
+            <a:r>
+              <a:rPr lang="en-US" sz="3000" dirty="0" err="1" smtClean="0">
+                <a:latin typeface="PFDinTextCompPro-Italic"/>
+                <a:cs typeface="PFDinTextCompPro-Italic"/>
+                <a:hlinkClick r:id="rId3"/>
+              </a:rPr>
+              <a:t>probit</a:t>
+            </a:r>
+            <a:r>
+              <a:rPr lang="en-US" sz="3000" dirty="0" smtClean="0">
+                <a:latin typeface="PFDinTextCompPro-Italic"/>
+                <a:cs typeface="PFDinTextCompPro-Italic"/>
+              </a:rPr>
+              <a:t> the </a:t>
+            </a:r>
+            <a:r>
+              <a:rPr lang="en-US" sz="3000" dirty="0" err="1" smtClean="0">
+                <a:latin typeface="PFDinTextCompPro-Italic"/>
+                <a:cs typeface="PFDinTextCompPro-Italic"/>
+                <a:hlinkClick r:id="rId4"/>
+              </a:rPr>
+              <a:t>tobit</a:t>
+            </a:r>
+            <a:r>
+              <a:rPr lang="en-US" sz="3000" dirty="0" smtClean="0">
+                <a:latin typeface="PFDinTextCompPro-Italic"/>
+                <a:cs typeface="PFDinTextCompPro-Italic"/>
+              </a:rPr>
+              <a:t> model. However, the </a:t>
+            </a:r>
+            <a:r>
+              <a:rPr lang="en-US" sz="3000" dirty="0" err="1" smtClean="0">
+                <a:latin typeface="PFDinTextCompPro-Italic"/>
+                <a:cs typeface="PFDinTextCompPro-Italic"/>
+              </a:rPr>
+              <a:t>logit</a:t>
+            </a:r>
+            <a:r>
+              <a:rPr lang="en-US" sz="3000" dirty="0" smtClean="0">
+                <a:latin typeface="PFDinTextCompPro-Italic"/>
+                <a:cs typeface="PFDinTextCompPro-Italic"/>
+              </a:rPr>
+              <a:t> simplifies things nicely and is probably the most commonly used.</a:t>
+            </a:r>
+            <a:endParaRPr lang="en-US" sz="3000" b="1" dirty="0" smtClean="0">
+              <a:latin typeface="PFDinTextCompPro-Italic"/>
+              <a:cs typeface="PFDinTextCompPro-Italic"/>
+            </a:endParaRPr>
+          </a:p>
+        </p:txBody>
+      </p:sp>
+    </p:spTree>
+    <p:extLst>
+      <p:ext uri="{BB962C8B-B14F-4D97-AF65-F5344CB8AC3E}">
+        <p14:creationId xmlns:p14="http://schemas.microsoft.com/office/powerpoint/2010/main" val="1280717532"/>
+      </p:ext>
+    </p:extLst>
+  </p:cSld>
+  <p:clrMapOvr>
+    <a:masterClrMapping/>
+  </p:clrMapOvr>
+  <p:transition/>
+  <p:timing>
+    <p:tnLst>
+      <p:par>
+        <p:cTn id="1" dur="indefinite" restart="never" nodeType="tmRoot"/>
+      </p:par>
+    </p:tnLst>
+  </p:timing>
+</p:sld>
+</file>
+
+<file path=ppt/slides/slide52.xml><?xml version="1.0" encoding="utf-8"?>
+<p:sld xmlns:a="http://schemas.openxmlformats.org/drawingml/2006/main" xmlns:r="http://schemas.openxmlformats.org/officeDocument/2006/relationships" xmlns:p="http://schemas.openxmlformats.org/presentationml/2006/main">
+  <p:cSld>
+    <p:spTree>
+      <p:nvGrpSpPr>
+        <p:cNvPr id="1" name=""/>
+        <p:cNvGrpSpPr/>
+        <p:nvPr/>
+      </p:nvGrpSpPr>
+      <p:grpSpPr>
+        <a:xfrm>
+          <a:off x="0" y="0"/>
+          <a:ext cx="0" cy="0"/>
+          <a:chOff x="0" y="0"/>
+          <a:chExt cx="0" cy="0"/>
+        </a:xfrm>
+      </p:grpSpPr>
+      <p:sp>
+        <p:nvSpPr>
+          <p:cNvPr id="4" name="Content Placeholder 3"/>
+          <p:cNvSpPr>
+            <a:spLocks noGrp="1"/>
+          </p:cNvSpPr>
+          <p:nvPr>
+            <p:ph sz="quarter" idx="11"/>
+          </p:nvPr>
+        </p:nvSpPr>
+        <p:spPr>
+          <a:xfrm>
+            <a:off x="414337" y="495300"/>
+            <a:ext cx="6400800" cy="304800"/>
+          </a:xfrm>
+        </p:spPr>
+        <p:txBody>
+          <a:bodyPr/>
+          <a:lstStyle/>
+          <a:p>
+            <a:pPr eaLnBrk="1" hangingPunct="1">
+              <a:lnSpc>
+                <a:spcPts val="2448"/>
+              </a:lnSpc>
+              <a:defRPr/>
+            </a:pPr>
+            <a:r>
+              <a:rPr lang="en-US" dirty="0" smtClean="0"/>
+              <a:t>Q&amp;A</a:t>
+            </a:r>
+            <a:endParaRPr lang="en-US" dirty="0"/>
+          </a:p>
+        </p:txBody>
+      </p:sp>
+      <p:sp>
+        <p:nvSpPr>
+          <p:cNvPr id="8" name="Slide Number Placeholder 3"/>
+          <p:cNvSpPr>
+            <a:spLocks noGrp="1"/>
+          </p:cNvSpPr>
+          <p:nvPr>
+            <p:ph type="sldNum" sz="quarter" idx="13"/>
+          </p:nvPr>
+        </p:nvSpPr>
+        <p:spPr/>
+        <p:txBody>
+          <a:bodyPr/>
+          <a:lstStyle/>
+          <a:p>
+            <a:pPr>
+              <a:defRPr/>
+            </a:pPr>
+            <a:fld id="{BD5AD749-DAD1-6A4A-A2AA-CB20EAD0AEB7}" type="slidenum">
+              <a:rPr lang="en-US"/>
+              <a:pPr>
+                <a:defRPr/>
+              </a:pPr>
+              <a:t>52</a:t>
+            </a:fld>
+            <a:endParaRPr lang="en-US"/>
+          </a:p>
+        </p:txBody>
+      </p:sp>
+      <p:sp>
+        <p:nvSpPr>
+          <p:cNvPr id="9" name="TextBox 8"/>
+          <p:cNvSpPr txBox="1"/>
+          <p:nvPr/>
+        </p:nvSpPr>
+        <p:spPr>
+          <a:xfrm>
+            <a:off x="566737" y="1104900"/>
             <a:ext cx="8382000" cy="3323987"/>
           </a:xfrm>
           <a:prstGeom prst="rect">
@@ -30042,7 +30705,7 @@
           <a:graphicData uri="http://schemas.openxmlformats.org/presentationml/2006/ole">
             <mc:AlternateContent xmlns:mc="http://schemas.openxmlformats.org/markup-compatibility/2006">
               <mc:Choice xmlns:v="urn:schemas-microsoft-com:vml" Requires="v">
-                <p:oleObj spid="_x0000_s43146" name="Equation" r:id="rId4" imgW="634680" imgH="419040" progId="Equation.3">
+                <p:oleObj spid="_x0000_s43149" name="Equation" r:id="rId4" imgW="634680" imgH="419040" progId="Equation.3">
                   <p:embed/>
                 </p:oleObj>
               </mc:Choice>
@@ -30125,7 +30788,7 @@
           <a:graphicData uri="http://schemas.openxmlformats.org/presentationml/2006/ole">
             <mc:AlternateContent xmlns:mc="http://schemas.openxmlformats.org/markup-compatibility/2006">
               <mc:Choice xmlns:v="urn:schemas-microsoft-com:vml" Requires="v">
-                <p:oleObj spid="_x0000_s43147" name="Equation" r:id="rId6" imgW="685800" imgH="393480" progId="Equation.3">
+                <p:oleObj spid="_x0000_s43150" name="Equation" r:id="rId6" imgW="685800" imgH="393480" progId="Equation.3">
                   <p:embed/>
                 </p:oleObj>
               </mc:Choice>
@@ -30208,7 +30871,7 @@
           <a:graphicData uri="http://schemas.openxmlformats.org/presentationml/2006/ole">
             <mc:AlternateContent xmlns:mc="http://schemas.openxmlformats.org/markup-compatibility/2006">
               <mc:Choice xmlns:v="urn:schemas-microsoft-com:vml" Requires="v">
-                <p:oleObj spid="_x0000_s43148" name="Equation" r:id="rId8" imgW="444240" imgH="393480" progId="Equation.3">
+                <p:oleObj spid="_x0000_s43151" name="Equation" r:id="rId8" imgW="444240" imgH="393480" progId="Equation.3">
                   <p:embed/>
                 </p:oleObj>
               </mc:Choice>
@@ -30290,7 +30953,7 @@
 </p:sld>
 </file>
 
-<file path=ppt/slides/slide52.xml><?xml version="1.0" encoding="utf-8"?>
+<file path=ppt/slides/slide53.xml><?xml version="1.0" encoding="utf-8"?>
 <p:sld xmlns:a="http://schemas.openxmlformats.org/drawingml/2006/main" xmlns:r="http://schemas.openxmlformats.org/officeDocument/2006/relationships" xmlns:p="http://schemas.openxmlformats.org/presentationml/2006/main">
   <p:cSld>
     <p:spTree>
@@ -30364,7 +31027,7 @@
               <a:pPr>
                 <a:defRPr/>
               </a:pPr>
-              <a:t>52</a:t>
+              <a:t>53</a:t>
             </a:fld>
             <a:endParaRPr lang="en-US"/>
           </a:p>
@@ -30479,7 +31142,7 @@
 </p:sld>
 </file>
 
-<file path=ppt/slides/slide53.xml><?xml version="1.0" encoding="utf-8"?>
+<file path=ppt/slides/slide54.xml><?xml version="1.0" encoding="utf-8"?>
 <p:sld xmlns:a="http://schemas.openxmlformats.org/drawingml/2006/main" xmlns:r="http://schemas.openxmlformats.org/officeDocument/2006/relationships" xmlns:p="http://schemas.openxmlformats.org/presentationml/2006/main">
   <p:cSld>
     <p:spTree>
@@ -30553,7 +31216,7 @@
               <a:pPr>
                 <a:defRPr/>
               </a:pPr>
-              <a:t>53</a:t>
+              <a:t>54</a:t>
             </a:fld>
             <a:endParaRPr lang="en-US"/>
           </a:p>

</xml_diff>